<commit_message>
Saving files before refreshing line endings
</commit_message>
<xml_diff>
--- a/doc/Outils annotation mask segmentation 2021 Vincent Le Falher.pptx
+++ b/doc/Outils annotation mask segmentation 2021 Vincent Le Falher.pptx
@@ -1,120 +1,3 @@
-
-<file path=ppt/presentation.xml><?xml version="1.0" encoding="utf-8"?>
-<p:presentation xmlns:a="http://schemas.openxmlformats.org/drawingml/2006/main" xmlns:r="http://schemas.openxmlformats.org/officeDocument/2006/relationships" xmlns:p="http://schemas.openxmlformats.org/presentationml/2006/main" saveSubsetFonts="1">
-  <p:sldMasterIdLst>
-    <p:sldMasterId id="2147483648" r:id="rId1"/>
-  </p:sldMasterIdLst>
-  <p:sldIdLst>
-    <p:sldId id="256" r:id="rId2"/>
-    <p:sldId id="257" r:id="rId3"/>
-    <p:sldId id="258" r:id="rId4"/>
-    <p:sldId id="259" r:id="rId5"/>
-    <p:sldId id="260" r:id="rId6"/>
-  </p:sldIdLst>
-  <p:sldSz cx="12192000" cy="6858000"/>
-  <p:notesSz cx="6858000" cy="9144000"/>
-  <p:defaultTextStyle>
-    <a:defPPr>
-      <a:defRPr lang="en-US"/>
-    </a:defPPr>
-    <a:lvl1pPr marL="0" algn="l" defTabSz="914400" rtl="0" eaLnBrk="1" latinLnBrk="0" hangingPunct="1">
-      <a:defRPr sz="1800" kern="1200">
-        <a:solidFill>
-          <a:schemeClr val="tx1"/>
-        </a:solidFill>
-        <a:latin typeface="+mn-lt"/>
-        <a:ea typeface="+mn-ea"/>
-        <a:cs typeface="+mn-cs"/>
-      </a:defRPr>
-    </a:lvl1pPr>
-    <a:lvl2pPr marL="457200" algn="l" defTabSz="914400" rtl="0" eaLnBrk="1" latinLnBrk="0" hangingPunct="1">
-      <a:defRPr sz="1800" kern="1200">
-        <a:solidFill>
-          <a:schemeClr val="tx1"/>
-        </a:solidFill>
-        <a:latin typeface="+mn-lt"/>
-        <a:ea typeface="+mn-ea"/>
-        <a:cs typeface="+mn-cs"/>
-      </a:defRPr>
-    </a:lvl2pPr>
-    <a:lvl3pPr marL="914400" algn="l" defTabSz="914400" rtl="0" eaLnBrk="1" latinLnBrk="0" hangingPunct="1">
-      <a:defRPr sz="1800" kern="1200">
-        <a:solidFill>
-          <a:schemeClr val="tx1"/>
-        </a:solidFill>
-        <a:latin typeface="+mn-lt"/>
-        <a:ea typeface="+mn-ea"/>
-        <a:cs typeface="+mn-cs"/>
-      </a:defRPr>
-    </a:lvl3pPr>
-    <a:lvl4pPr marL="1371600" algn="l" defTabSz="914400" rtl="0" eaLnBrk="1" latinLnBrk="0" hangingPunct="1">
-      <a:defRPr sz="1800" kern="1200">
-        <a:solidFill>
-          <a:schemeClr val="tx1"/>
-        </a:solidFill>
-        <a:latin typeface="+mn-lt"/>
-        <a:ea typeface="+mn-ea"/>
-        <a:cs typeface="+mn-cs"/>
-      </a:defRPr>
-    </a:lvl4pPr>
-    <a:lvl5pPr marL="1828800" algn="l" defTabSz="914400" rtl="0" eaLnBrk="1" latinLnBrk="0" hangingPunct="1">
-      <a:defRPr sz="1800" kern="1200">
-        <a:solidFill>
-          <a:schemeClr val="tx1"/>
-        </a:solidFill>
-        <a:latin typeface="+mn-lt"/>
-        <a:ea typeface="+mn-ea"/>
-        <a:cs typeface="+mn-cs"/>
-      </a:defRPr>
-    </a:lvl5pPr>
-    <a:lvl6pPr marL="2286000" algn="l" defTabSz="914400" rtl="0" eaLnBrk="1" latinLnBrk="0" hangingPunct="1">
-      <a:defRPr sz="1800" kern="1200">
-        <a:solidFill>
-          <a:schemeClr val="tx1"/>
-        </a:solidFill>
-        <a:latin typeface="+mn-lt"/>
-        <a:ea typeface="+mn-ea"/>
-        <a:cs typeface="+mn-cs"/>
-      </a:defRPr>
-    </a:lvl6pPr>
-    <a:lvl7pPr marL="2743200" algn="l" defTabSz="914400" rtl="0" eaLnBrk="1" latinLnBrk="0" hangingPunct="1">
-      <a:defRPr sz="1800" kern="1200">
-        <a:solidFill>
-          <a:schemeClr val="tx1"/>
-        </a:solidFill>
-        <a:latin typeface="+mn-lt"/>
-        <a:ea typeface="+mn-ea"/>
-        <a:cs typeface="+mn-cs"/>
-      </a:defRPr>
-    </a:lvl7pPr>
-    <a:lvl8pPr marL="3200400" algn="l" defTabSz="914400" rtl="0" eaLnBrk="1" latinLnBrk="0" hangingPunct="1">
-      <a:defRPr sz="1800" kern="1200">
-        <a:solidFill>
-          <a:schemeClr val="tx1"/>
-        </a:solidFill>
-        <a:latin typeface="+mn-lt"/>
-        <a:ea typeface="+mn-ea"/>
-        <a:cs typeface="+mn-cs"/>
-      </a:defRPr>
-    </a:lvl8pPr>
-    <a:lvl9pPr marL="3657600" algn="l" defTabSz="914400" rtl="0" eaLnBrk="1" latinLnBrk="0" hangingPunct="1">
-      <a:defRPr sz="1800" kern="1200">
-        <a:solidFill>
-          <a:schemeClr val="tx1"/>
-        </a:solidFill>
-        <a:latin typeface="+mn-lt"/>
-        <a:ea typeface="+mn-ea"/>
-        <a:cs typeface="+mn-cs"/>
-      </a:defRPr>
-    </a:lvl9pPr>
-  </p:defaultTextStyle>
-  <p:extLst>
-    <p:ext uri="{EFAFB233-063F-42B5-8137-9DF3F51BA10A}">
-      <p15:sldGuideLst xmlns:p15="http://schemas.microsoft.com/office/powerpoint/2012/main"/>
-    </p:ext>
-  </p:extLst>
-</p:presentation>
-</file>
 
 <file path=ppt/slideLayouts/slideLayout1.xml><?xml version="1.0" encoding="utf-8"?>
 <p:sldLayout xmlns:a="http://schemas.openxmlformats.org/drawingml/2006/main" xmlns:r="http://schemas.openxmlformats.org/officeDocument/2006/relationships" xmlns:p="http://schemas.openxmlformats.org/presentationml/2006/main" type="title" preserve="1">
@@ -2956,566 +2839,6 @@
 </p:sldMaster>
 </file>
 
-<file path=ppt/slides/slide1.xml><?xml version="1.0" encoding="utf-8"?>
-<p:sld xmlns:a="http://schemas.openxmlformats.org/drawingml/2006/main" xmlns:r="http://schemas.openxmlformats.org/officeDocument/2006/relationships" xmlns:p="http://schemas.openxmlformats.org/presentationml/2006/main">
-  <p:cSld>
-    <p:spTree>
-      <p:nvGrpSpPr>
-        <p:cNvPr id="1" name=""/>
-        <p:cNvGrpSpPr/>
-        <p:nvPr/>
-      </p:nvGrpSpPr>
-      <p:grpSpPr>
-        <a:xfrm>
-          <a:off x="0" y="0"/>
-          <a:ext cx="0" cy="0"/>
-          <a:chOff x="0" y="0"/>
-          <a:chExt cx="0" cy="0"/>
-        </a:xfrm>
-      </p:grpSpPr>
-      <p:sp>
-        <p:nvSpPr>
-          <p:cNvPr id="2" name="Title 1"/>
-          <p:cNvSpPr>
-            <a:spLocks noGrp="1"/>
-          </p:cNvSpPr>
-          <p:nvPr>
-            <p:ph type="ctrTitle"/>
-            <p:custDataLst>
-              <p:tags r:id="rId1"/>
-            </p:custDataLst>
-          </p:nvPr>
-        </p:nvSpPr>
-        <p:spPr>
-          <a:xfrm>
-            <a:off x="1524000" y="603682"/>
-            <a:ext cx="9144000" cy="3231471"/>
-          </a:xfrm>
-        </p:spPr>
-        <p:txBody>
-          <a:bodyPr>
-            <a:normAutofit fontScale="90000"/>
-          </a:bodyPr>
-          <a:lstStyle/>
-          <a:p>
-            <a:r>
-              <a:rPr lang="fr-FR" dirty="0" smtClean="0"/>
-              <a:t>Outils </a:t>
-            </a:r>
-            <a:br>
-              <a:rPr lang="fr-FR" dirty="0" smtClean="0"/>
-            </a:br>
-            <a:r>
-              <a:rPr lang="fr-FR" dirty="0" smtClean="0"/>
-              <a:t>d’annotation (</a:t>
-            </a:r>
-            <a:r>
-              <a:rPr lang="fr-FR" dirty="0" err="1" smtClean="0"/>
-              <a:t>mask</a:t>
-            </a:r>
-            <a:r>
-              <a:rPr lang="fr-FR" dirty="0" smtClean="0"/>
-              <a:t>)</a:t>
-            </a:r>
-            <a:br>
-              <a:rPr lang="fr-FR" dirty="0" smtClean="0"/>
-            </a:br>
-            <a:r>
-              <a:rPr lang="fr-FR" dirty="0" smtClean="0"/>
-              <a:t>Segmentation</a:t>
-            </a:r>
-            <a:br>
-              <a:rPr lang="fr-FR" dirty="0" smtClean="0"/>
-            </a:br>
-            <a:r>
-              <a:rPr lang="fr-FR" dirty="0" smtClean="0"/>
-              <a:t>pour le Active Learning</a:t>
-            </a:r>
-            <a:endParaRPr lang="en-CA" dirty="0"/>
-          </a:p>
-        </p:txBody>
-      </p:sp>
-      <p:sp>
-        <p:nvSpPr>
-          <p:cNvPr id="3" name="Subtitle 2"/>
-          <p:cNvSpPr>
-            <a:spLocks noGrp="1"/>
-          </p:cNvSpPr>
-          <p:nvPr>
-            <p:ph type="subTitle" idx="1"/>
-            <p:custDataLst>
-              <p:tags r:id="rId2"/>
-            </p:custDataLst>
-          </p:nvPr>
-        </p:nvSpPr>
-        <p:spPr>
-          <a:xfrm>
-            <a:off x="1524000" y="4785064"/>
-            <a:ext cx="9144000" cy="472736"/>
-          </a:xfrm>
-        </p:spPr>
-        <p:txBody>
-          <a:bodyPr/>
-          <a:lstStyle/>
-          <a:p>
-            <a:r>
-              <a:rPr lang="en-CA" dirty="0" smtClean="0"/>
-              <a:t>Pixel annotation </a:t>
-            </a:r>
-            <a:r>
-              <a:rPr lang="en-CA" dirty="0"/>
-              <a:t>ground </a:t>
-            </a:r>
-            <a:r>
-              <a:rPr lang="en-CA" dirty="0" smtClean="0"/>
-              <a:t>truth</a:t>
-            </a:r>
-            <a:endParaRPr lang="en-CA" dirty="0"/>
-          </a:p>
-        </p:txBody>
-      </p:sp>
-      <p:sp>
-        <p:nvSpPr>
-          <p:cNvPr id="4" name="TextBox 3"/>
-          <p:cNvSpPr txBox="1"/>
-          <p:nvPr>
-            <p:custDataLst>
-              <p:tags r:id="rId3"/>
-            </p:custDataLst>
-          </p:nvPr>
-        </p:nvSpPr>
-        <p:spPr>
-          <a:xfrm>
-            <a:off x="7039992" y="5610687"/>
-            <a:ext cx="2565647" cy="369332"/>
-          </a:xfrm>
-          <a:prstGeom prst="rect">
-            <a:avLst/>
-          </a:prstGeom>
-          <a:noFill/>
-        </p:spPr>
-        <p:txBody>
-          <a:bodyPr wrap="square" rtlCol="0">
-            <a:spAutoFit/>
-          </a:bodyPr>
-          <a:lstStyle/>
-          <a:p>
-            <a:r>
-              <a:rPr lang="fr-FR" dirty="0" smtClean="0"/>
-              <a:t>Vincent Le Falher (2021)</a:t>
-            </a:r>
-            <a:endParaRPr lang="en-CA" dirty="0"/>
-          </a:p>
-        </p:txBody>
-      </p:sp>
-    </p:spTree>
-    <p:extLst>
-      <p:ext uri="{BB962C8B-B14F-4D97-AF65-F5344CB8AC3E}">
-        <p14:creationId xmlns:p14="http://schemas.microsoft.com/office/powerpoint/2010/main" val="2468621629"/>
-      </p:ext>
-    </p:extLst>
-  </p:cSld>
-  <p:clrMapOvr>
-    <a:masterClrMapping/>
-  </p:clrMapOvr>
-  <p:timing>
-    <p:tnLst>
-      <p:par>
-        <p:cTn id="1" dur="indefinite" restart="never" nodeType="tmRoot"/>
-      </p:par>
-    </p:tnLst>
-  </p:timing>
-</p:sld>
-</file>
-
-<file path=ppt/slides/slide2.xml><?xml version="1.0" encoding="utf-8"?>
-<p:sld xmlns:a="http://schemas.openxmlformats.org/drawingml/2006/main" xmlns:r="http://schemas.openxmlformats.org/officeDocument/2006/relationships" xmlns:p="http://schemas.openxmlformats.org/presentationml/2006/main">
-  <p:cSld>
-    <p:spTree>
-      <p:nvGrpSpPr>
-        <p:cNvPr id="1" name=""/>
-        <p:cNvGrpSpPr/>
-        <p:nvPr/>
-      </p:nvGrpSpPr>
-      <p:grpSpPr>
-        <a:xfrm>
-          <a:off x="0" y="0"/>
-          <a:ext cx="0" cy="0"/>
-          <a:chOff x="0" y="0"/>
-          <a:chExt cx="0" cy="0"/>
-        </a:xfrm>
-      </p:grpSpPr>
-      <p:sp>
-        <p:nvSpPr>
-          <p:cNvPr id="2" name="Title 1"/>
-          <p:cNvSpPr>
-            <a:spLocks noGrp="1"/>
-          </p:cNvSpPr>
-          <p:nvPr>
-            <p:ph type="title"/>
-            <p:custDataLst>
-              <p:tags r:id="rId1"/>
-            </p:custDataLst>
-          </p:nvPr>
-        </p:nvSpPr>
-        <p:spPr>
-          <a:xfrm>
-            <a:off x="838200" y="151120"/>
-            <a:ext cx="10515600" cy="700195"/>
-          </a:xfrm>
-        </p:spPr>
-        <p:txBody>
-          <a:bodyPr/>
-          <a:lstStyle/>
-          <a:p>
-            <a:r>
-              <a:rPr lang="fr-FR" dirty="0" smtClean="0"/>
-              <a:t>Offres rencontrées</a:t>
-            </a:r>
-            <a:endParaRPr lang="en-CA" dirty="0"/>
-          </a:p>
-        </p:txBody>
-      </p:sp>
-      <p:sp>
-        <p:nvSpPr>
-          <p:cNvPr id="3" name="Content Placeholder 2"/>
-          <p:cNvSpPr>
-            <a:spLocks noGrp="1"/>
-          </p:cNvSpPr>
-          <p:nvPr>
-            <p:ph idx="1"/>
-            <p:custDataLst>
-              <p:tags r:id="rId2"/>
-            </p:custDataLst>
-          </p:nvPr>
-        </p:nvSpPr>
-        <p:spPr>
-          <a:xfrm>
-            <a:off x="6036816" y="1816748"/>
-            <a:ext cx="5316984" cy="3394444"/>
-          </a:xfrm>
-        </p:spPr>
-        <p:style>
-          <a:lnRef idx="2">
-            <a:schemeClr val="accent2"/>
-          </a:lnRef>
-          <a:fillRef idx="1">
-            <a:schemeClr val="lt1"/>
-          </a:fillRef>
-          <a:effectRef idx="0">
-            <a:schemeClr val="accent2"/>
-          </a:effectRef>
-          <a:fontRef idx="minor">
-            <a:schemeClr val="dk1"/>
-          </a:fontRef>
-        </p:style>
-        <p:txBody>
-          <a:bodyPr/>
-          <a:lstStyle/>
-          <a:p>
-            <a:r>
-              <a:rPr lang="fr-FR" dirty="0" smtClean="0"/>
-              <a:t>Ouvert libre</a:t>
-            </a:r>
-          </a:p>
-          <a:p>
-            <a:pPr lvl="1"/>
-            <a:r>
-              <a:rPr lang="fr-FR" dirty="0" smtClean="0"/>
-              <a:t>MIL </a:t>
-            </a:r>
-          </a:p>
-          <a:p>
-            <a:pPr lvl="1"/>
-            <a:r>
-              <a:rPr lang="fr-FR" dirty="0" smtClean="0"/>
-              <a:t>Apache 2.0</a:t>
-            </a:r>
-          </a:p>
-          <a:p>
-            <a:r>
-              <a:rPr lang="fr-FR" dirty="0" smtClean="0"/>
-              <a:t>Licence payant mois / utilisateur</a:t>
-            </a:r>
-          </a:p>
-          <a:p>
-            <a:r>
-              <a:rPr lang="fr-FR" dirty="0" smtClean="0"/>
-              <a:t>Crédits</a:t>
-            </a:r>
-          </a:p>
-          <a:p>
-            <a:r>
-              <a:rPr lang="fr-FR" dirty="0" smtClean="0"/>
-              <a:t>Gratuit communauté universitaire / recherche</a:t>
-            </a:r>
-            <a:endParaRPr lang="en-CA" dirty="0"/>
-          </a:p>
-        </p:txBody>
-      </p:sp>
-      <p:sp>
-        <p:nvSpPr>
-          <p:cNvPr id="4" name="Content Placeholder 2"/>
-          <p:cNvSpPr txBox="1">
-            <a:spLocks/>
-          </p:cNvSpPr>
-          <p:nvPr>
-            <p:custDataLst>
-              <p:tags r:id="rId3"/>
-            </p:custDataLst>
-          </p:nvPr>
-        </p:nvSpPr>
-        <p:spPr>
-          <a:xfrm>
-            <a:off x="972845" y="1285566"/>
-            <a:ext cx="4575699" cy="2363156"/>
-          </a:xfrm>
-          <a:prstGeom prst="rect">
-            <a:avLst/>
-          </a:prstGeom>
-        </p:spPr>
-        <p:style>
-          <a:lnRef idx="2">
-            <a:schemeClr val="accent1"/>
-          </a:lnRef>
-          <a:fillRef idx="1">
-            <a:schemeClr val="lt1"/>
-          </a:fillRef>
-          <a:effectRef idx="0">
-            <a:schemeClr val="accent1"/>
-          </a:effectRef>
-          <a:fontRef idx="minor">
-            <a:schemeClr val="dk1"/>
-          </a:fontRef>
-        </p:style>
-        <p:txBody>
-          <a:bodyPr vert="horz" lIns="91440" tIns="45720" rIns="91440" bIns="45720" rtlCol="0">
-            <a:normAutofit/>
-          </a:bodyPr>
-          <a:lstStyle>
-            <a:lvl1pPr marL="228600" indent="-228600" algn="l" defTabSz="914400" rtl="0" eaLnBrk="1" latinLnBrk="0" hangingPunct="1">
-              <a:lnSpc>
-                <a:spcPct val="90000"/>
-              </a:lnSpc>
-              <a:spcBef>
-                <a:spcPts val="1000"/>
-              </a:spcBef>
-              <a:buFont typeface="Arial" panose="020B0604020202020204" pitchFamily="34" charset="0"/>
-              <a:buChar char="•"/>
-              <a:defRPr sz="2800" kern="1200">
-                <a:solidFill>
-                  <a:schemeClr val="tx1"/>
-                </a:solidFill>
-                <a:latin typeface="+mn-lt"/>
-                <a:ea typeface="+mn-ea"/>
-                <a:cs typeface="+mn-cs"/>
-              </a:defRPr>
-            </a:lvl1pPr>
-            <a:lvl2pPr marL="685800" indent="-228600" algn="l" defTabSz="914400" rtl="0" eaLnBrk="1" latinLnBrk="0" hangingPunct="1">
-              <a:lnSpc>
-                <a:spcPct val="90000"/>
-              </a:lnSpc>
-              <a:spcBef>
-                <a:spcPts val="500"/>
-              </a:spcBef>
-              <a:buFont typeface="Arial" panose="020B0604020202020204" pitchFamily="34" charset="0"/>
-              <a:buChar char="•"/>
-              <a:defRPr sz="2400" kern="1200">
-                <a:solidFill>
-                  <a:schemeClr val="tx1"/>
-                </a:solidFill>
-                <a:latin typeface="+mn-lt"/>
-                <a:ea typeface="+mn-ea"/>
-                <a:cs typeface="+mn-cs"/>
-              </a:defRPr>
-            </a:lvl2pPr>
-            <a:lvl3pPr marL="1143000" indent="-228600" algn="l" defTabSz="914400" rtl="0" eaLnBrk="1" latinLnBrk="0" hangingPunct="1">
-              <a:lnSpc>
-                <a:spcPct val="90000"/>
-              </a:lnSpc>
-              <a:spcBef>
-                <a:spcPts val="500"/>
-              </a:spcBef>
-              <a:buFont typeface="Arial" panose="020B0604020202020204" pitchFamily="34" charset="0"/>
-              <a:buChar char="•"/>
-              <a:defRPr sz="2000" kern="1200">
-                <a:solidFill>
-                  <a:schemeClr val="tx1"/>
-                </a:solidFill>
-                <a:latin typeface="+mn-lt"/>
-                <a:ea typeface="+mn-ea"/>
-                <a:cs typeface="+mn-cs"/>
-              </a:defRPr>
-            </a:lvl3pPr>
-            <a:lvl4pPr marL="1600200" indent="-228600" algn="l" defTabSz="914400" rtl="0" eaLnBrk="1" latinLnBrk="0" hangingPunct="1">
-              <a:lnSpc>
-                <a:spcPct val="90000"/>
-              </a:lnSpc>
-              <a:spcBef>
-                <a:spcPts val="500"/>
-              </a:spcBef>
-              <a:buFont typeface="Arial" panose="020B0604020202020204" pitchFamily="34" charset="0"/>
-              <a:buChar char="•"/>
-              <a:defRPr sz="1800" kern="1200">
-                <a:solidFill>
-                  <a:schemeClr val="tx1"/>
-                </a:solidFill>
-                <a:latin typeface="+mn-lt"/>
-                <a:ea typeface="+mn-ea"/>
-                <a:cs typeface="+mn-cs"/>
-              </a:defRPr>
-            </a:lvl4pPr>
-            <a:lvl5pPr marL="2057400" indent="-228600" algn="l" defTabSz="914400" rtl="0" eaLnBrk="1" latinLnBrk="0" hangingPunct="1">
-              <a:lnSpc>
-                <a:spcPct val="90000"/>
-              </a:lnSpc>
-              <a:spcBef>
-                <a:spcPts val="500"/>
-              </a:spcBef>
-              <a:buFont typeface="Arial" panose="020B0604020202020204" pitchFamily="34" charset="0"/>
-              <a:buChar char="•"/>
-              <a:defRPr sz="1800" kern="1200">
-                <a:solidFill>
-                  <a:schemeClr val="tx1"/>
-                </a:solidFill>
-                <a:latin typeface="+mn-lt"/>
-                <a:ea typeface="+mn-ea"/>
-                <a:cs typeface="+mn-cs"/>
-              </a:defRPr>
-            </a:lvl5pPr>
-            <a:lvl6pPr marL="2514600" indent="-228600" algn="l" defTabSz="914400" rtl="0" eaLnBrk="1" latinLnBrk="0" hangingPunct="1">
-              <a:lnSpc>
-                <a:spcPct val="90000"/>
-              </a:lnSpc>
-              <a:spcBef>
-                <a:spcPts val="500"/>
-              </a:spcBef>
-              <a:buFont typeface="Arial" panose="020B0604020202020204" pitchFamily="34" charset="0"/>
-              <a:buChar char="•"/>
-              <a:defRPr sz="1800" kern="1200">
-                <a:solidFill>
-                  <a:schemeClr val="tx1"/>
-                </a:solidFill>
-                <a:latin typeface="+mn-lt"/>
-                <a:ea typeface="+mn-ea"/>
-                <a:cs typeface="+mn-cs"/>
-              </a:defRPr>
-            </a:lvl6pPr>
-            <a:lvl7pPr marL="2971800" indent="-228600" algn="l" defTabSz="914400" rtl="0" eaLnBrk="1" latinLnBrk="0" hangingPunct="1">
-              <a:lnSpc>
-                <a:spcPct val="90000"/>
-              </a:lnSpc>
-              <a:spcBef>
-                <a:spcPts val="500"/>
-              </a:spcBef>
-              <a:buFont typeface="Arial" panose="020B0604020202020204" pitchFamily="34" charset="0"/>
-              <a:buChar char="•"/>
-              <a:defRPr sz="1800" kern="1200">
-                <a:solidFill>
-                  <a:schemeClr val="tx1"/>
-                </a:solidFill>
-                <a:latin typeface="+mn-lt"/>
-                <a:ea typeface="+mn-ea"/>
-                <a:cs typeface="+mn-cs"/>
-              </a:defRPr>
-            </a:lvl7pPr>
-            <a:lvl8pPr marL="3429000" indent="-228600" algn="l" defTabSz="914400" rtl="0" eaLnBrk="1" latinLnBrk="0" hangingPunct="1">
-              <a:lnSpc>
-                <a:spcPct val="90000"/>
-              </a:lnSpc>
-              <a:spcBef>
-                <a:spcPts val="500"/>
-              </a:spcBef>
-              <a:buFont typeface="Arial" panose="020B0604020202020204" pitchFamily="34" charset="0"/>
-              <a:buChar char="•"/>
-              <a:defRPr sz="1800" kern="1200">
-                <a:solidFill>
-                  <a:schemeClr val="tx1"/>
-                </a:solidFill>
-                <a:latin typeface="+mn-lt"/>
-                <a:ea typeface="+mn-ea"/>
-                <a:cs typeface="+mn-cs"/>
-              </a:defRPr>
-            </a:lvl8pPr>
-            <a:lvl9pPr marL="3886200" indent="-228600" algn="l" defTabSz="914400" rtl="0" eaLnBrk="1" latinLnBrk="0" hangingPunct="1">
-              <a:lnSpc>
-                <a:spcPct val="90000"/>
-              </a:lnSpc>
-              <a:spcBef>
-                <a:spcPts val="500"/>
-              </a:spcBef>
-              <a:buFont typeface="Arial" panose="020B0604020202020204" pitchFamily="34" charset="0"/>
-              <a:buChar char="•"/>
-              <a:defRPr sz="1800" kern="1200">
-                <a:solidFill>
-                  <a:schemeClr val="tx1"/>
-                </a:solidFill>
-                <a:latin typeface="+mn-lt"/>
-                <a:ea typeface="+mn-ea"/>
-                <a:cs typeface="+mn-cs"/>
-              </a:defRPr>
-            </a:lvl9pPr>
-          </a:lstStyle>
-          <a:p>
-            <a:r>
-              <a:rPr lang="fr-FR" dirty="0" smtClean="0"/>
-              <a:t>Plateforme complète</a:t>
-            </a:r>
-          </a:p>
-          <a:p>
-            <a:r>
-              <a:rPr lang="fr-FR" dirty="0" smtClean="0"/>
-              <a:t>Outils d’annotation</a:t>
-            </a:r>
-          </a:p>
-          <a:p>
-            <a:pPr lvl="1"/>
-            <a:r>
-              <a:rPr lang="fr-FR" dirty="0" smtClean="0"/>
-              <a:t>Assisté par modèle IA</a:t>
-            </a:r>
-          </a:p>
-          <a:p>
-            <a:pPr lvl="1"/>
-            <a:r>
-              <a:rPr lang="fr-FR" dirty="0" smtClean="0"/>
-              <a:t>manuel</a:t>
-            </a:r>
-          </a:p>
-          <a:p>
-            <a:r>
-              <a:rPr lang="fr-FR" dirty="0" smtClean="0"/>
-              <a:t>Sous-traitance</a:t>
-            </a:r>
-          </a:p>
-          <a:p>
-            <a:pPr marL="0" indent="0">
-              <a:buNone/>
-            </a:pPr>
-            <a:endParaRPr lang="en-CA" dirty="0"/>
-          </a:p>
-        </p:txBody>
-      </p:sp>
-    </p:spTree>
-    <p:extLst>
-      <p:ext uri="{BB962C8B-B14F-4D97-AF65-F5344CB8AC3E}">
-        <p14:creationId xmlns:p14="http://schemas.microsoft.com/office/powerpoint/2010/main" val="774615238"/>
-      </p:ext>
-    </p:extLst>
-  </p:cSld>
-  <p:clrMapOvr>
-    <a:masterClrMapping/>
-  </p:clrMapOvr>
-  <p:timing>
-    <p:tnLst>
-      <p:par>
-        <p:cTn id="1" dur="indefinite" restart="never" nodeType="tmRoot"/>
-      </p:par>
-    </p:tnLst>
-  </p:timing>
-</p:sld>
-</file>
-
 <file path=ppt/slides/slide3.xml><?xml version="1.0" encoding="utf-8"?>
 <p:sld xmlns:a="http://schemas.openxmlformats.org/drawingml/2006/main" xmlns:r="http://schemas.openxmlformats.org/officeDocument/2006/relationships" xmlns:p="http://schemas.openxmlformats.org/presentationml/2006/main">
   <p:cSld>
@@ -4311,1665 +3634,6 @@
     <p:extLst>
       <p:ext uri="{BB962C8B-B14F-4D97-AF65-F5344CB8AC3E}">
         <p14:creationId xmlns:p14="http://schemas.microsoft.com/office/powerpoint/2010/main" val="3614485281"/>
-      </p:ext>
-    </p:extLst>
-  </p:cSld>
-  <p:clrMapOvr>
-    <a:masterClrMapping/>
-  </p:clrMapOvr>
-  <p:timing>
-    <p:tnLst>
-      <p:par>
-        <p:cTn id="1" dur="indefinite" restart="never" nodeType="tmRoot"/>
-      </p:par>
-    </p:tnLst>
-  </p:timing>
-</p:sld>
-</file>
-
-<file path=ppt/slides/slide4.xml><?xml version="1.0" encoding="utf-8"?>
-<p:sld xmlns:a="http://schemas.openxmlformats.org/drawingml/2006/main" xmlns:r="http://schemas.openxmlformats.org/officeDocument/2006/relationships" xmlns:p="http://schemas.openxmlformats.org/presentationml/2006/main">
-  <p:cSld>
-    <p:spTree>
-      <p:nvGrpSpPr>
-        <p:cNvPr id="1" name=""/>
-        <p:cNvGrpSpPr/>
-        <p:nvPr/>
-      </p:nvGrpSpPr>
-      <p:grpSpPr>
-        <a:xfrm>
-          <a:off x="0" y="0"/>
-          <a:ext cx="0" cy="0"/>
-          <a:chOff x="0" y="0"/>
-          <a:chExt cx="0" cy="0"/>
-        </a:xfrm>
-      </p:grpSpPr>
-      <p:sp>
-        <p:nvSpPr>
-          <p:cNvPr id="2" name="Title 1"/>
-          <p:cNvSpPr>
-            <a:spLocks noGrp="1"/>
-          </p:cNvSpPr>
-          <p:nvPr>
-            <p:ph type="title"/>
-            <p:custDataLst>
-              <p:tags r:id="rId1"/>
-            </p:custDataLst>
-          </p:nvPr>
-        </p:nvSpPr>
-        <p:spPr>
-          <a:xfrm>
-            <a:off x="838200" y="286444"/>
-            <a:ext cx="10515600" cy="788842"/>
-          </a:xfrm>
-        </p:spPr>
-        <p:txBody>
-          <a:bodyPr>
-            <a:normAutofit fontScale="90000"/>
-          </a:bodyPr>
-          <a:lstStyle/>
-          <a:p>
-            <a:r>
-              <a:rPr lang="fr-FR" dirty="0" smtClean="0"/>
-              <a:t>Fonctionnalités</a:t>
-            </a:r>
-            <a:br>
-              <a:rPr lang="fr-FR" dirty="0" smtClean="0"/>
-            </a:br>
-            <a:r>
-              <a:rPr lang="fr-FR" dirty="0"/>
-              <a:t> </a:t>
-            </a:r>
-            <a:r>
-              <a:rPr lang="fr-FR" dirty="0" smtClean="0"/>
-              <a:t>       rencontrées </a:t>
-            </a:r>
-            <a:endParaRPr lang="en-CA" dirty="0"/>
-          </a:p>
-        </p:txBody>
-      </p:sp>
-      <p:sp>
-        <p:nvSpPr>
-          <p:cNvPr id="8" name="Content Placeholder 7"/>
-          <p:cNvSpPr>
-            <a:spLocks noGrp="1"/>
-          </p:cNvSpPr>
-          <p:nvPr>
-            <p:ph idx="1"/>
-            <p:custDataLst>
-              <p:tags r:id="rId2"/>
-            </p:custDataLst>
-          </p:nvPr>
-        </p:nvSpPr>
-        <p:spPr>
-          <a:xfrm>
-            <a:off x="838200" y="1320724"/>
-            <a:ext cx="5944340" cy="2409024"/>
-          </a:xfrm>
-        </p:spPr>
-        <p:style>
-          <a:lnRef idx="2">
-            <a:schemeClr val="accent3"/>
-          </a:lnRef>
-          <a:fillRef idx="1">
-            <a:schemeClr val="lt1"/>
-          </a:fillRef>
-          <a:effectRef idx="0">
-            <a:schemeClr val="accent3"/>
-          </a:effectRef>
-          <a:fontRef idx="minor">
-            <a:schemeClr val="dk1"/>
-          </a:fontRef>
-        </p:style>
-        <p:txBody>
-          <a:bodyPr>
-            <a:normAutofit/>
-          </a:bodyPr>
-          <a:lstStyle/>
-          <a:p>
-            <a:r>
-              <a:rPr lang="fr-FR" sz="2400" dirty="0" smtClean="0"/>
-              <a:t>Web</a:t>
-            </a:r>
-          </a:p>
-          <a:p>
-            <a:r>
-              <a:rPr lang="fr-FR" sz="2400" dirty="0" smtClean="0"/>
-              <a:t>On-</a:t>
-            </a:r>
-            <a:r>
-              <a:rPr lang="fr-FR" sz="2400" dirty="0" err="1" smtClean="0"/>
-              <a:t>premise</a:t>
-            </a:r>
-            <a:r>
-              <a:rPr lang="fr-FR" sz="2400" dirty="0" smtClean="0"/>
-              <a:t>  / </a:t>
-            </a:r>
-            <a:r>
-              <a:rPr lang="fr-FR" sz="2400" dirty="0" err="1" smtClean="0"/>
-              <a:t>hosted</a:t>
-            </a:r>
-            <a:r>
-              <a:rPr lang="fr-FR" sz="2400" dirty="0" smtClean="0"/>
-              <a:t> / Saas cloud</a:t>
-            </a:r>
-            <a:endParaRPr lang="fr-FR" sz="2400" dirty="0"/>
-          </a:p>
-          <a:p>
-            <a:r>
-              <a:rPr lang="en-CA" sz="2400" dirty="0" smtClean="0"/>
-              <a:t>Vector, Bitmap, Pixel editor</a:t>
-            </a:r>
-          </a:p>
-          <a:p>
-            <a:r>
-              <a:rPr lang="fr-FR" sz="2400" dirty="0" smtClean="0"/>
-              <a:t>2d, 3d, images, </a:t>
-            </a:r>
-            <a:r>
-              <a:rPr lang="fr-FR" sz="2400" dirty="0" err="1" smtClean="0"/>
-              <a:t>videos</a:t>
-            </a:r>
-            <a:endParaRPr lang="fr-FR" sz="2400" dirty="0" smtClean="0"/>
-          </a:p>
-          <a:p>
-            <a:r>
-              <a:rPr lang="fr-FR" sz="2400" dirty="0" smtClean="0"/>
-              <a:t>AI </a:t>
-            </a:r>
-            <a:r>
-              <a:rPr lang="fr-FR" sz="2400" dirty="0" err="1" smtClean="0"/>
-              <a:t>assisted</a:t>
-            </a:r>
-            <a:r>
-              <a:rPr lang="fr-FR" sz="2400" dirty="0" smtClean="0"/>
-              <a:t>, </a:t>
-            </a:r>
-            <a:r>
-              <a:rPr lang="fr-FR" sz="2400" dirty="0" err="1" smtClean="0"/>
-              <a:t>manual</a:t>
-            </a:r>
-            <a:r>
-              <a:rPr lang="fr-FR" sz="2400" dirty="0" smtClean="0"/>
-              <a:t> annotation</a:t>
-            </a:r>
-            <a:endParaRPr lang="en-CA" sz="2400" dirty="0" smtClean="0"/>
-          </a:p>
-        </p:txBody>
-      </p:sp>
-      <p:sp>
-        <p:nvSpPr>
-          <p:cNvPr id="9" name="Rectangle 8"/>
-          <p:cNvSpPr/>
-          <p:nvPr>
-            <p:custDataLst>
-              <p:tags r:id="rId3"/>
-            </p:custDataLst>
-          </p:nvPr>
-        </p:nvSpPr>
-        <p:spPr>
-          <a:xfrm>
-            <a:off x="5893663" y="223229"/>
-            <a:ext cx="4959658" cy="1938992"/>
-          </a:xfrm>
-          <a:prstGeom prst="rect">
-            <a:avLst/>
-          </a:prstGeom>
-        </p:spPr>
-        <p:style>
-          <a:lnRef idx="2">
-            <a:schemeClr val="accent3"/>
-          </a:lnRef>
-          <a:fillRef idx="1">
-            <a:schemeClr val="lt1"/>
-          </a:fillRef>
-          <a:effectRef idx="0">
-            <a:schemeClr val="accent3"/>
-          </a:effectRef>
-          <a:fontRef idx="minor">
-            <a:schemeClr val="dk1"/>
-          </a:fontRef>
-        </p:style>
-        <p:txBody>
-          <a:bodyPr wrap="square">
-            <a:spAutoFit/>
-          </a:bodyPr>
-          <a:lstStyle/>
-          <a:p>
-            <a:pPr marL="342900" indent="-342900">
-              <a:buFont typeface="Arial" panose="020B0604020202020204" pitchFamily="34" charset="0"/>
-              <a:buChar char="•"/>
-            </a:pPr>
-            <a:r>
-              <a:rPr lang="en-CA" sz="2400" dirty="0" smtClean="0"/>
-              <a:t>Project management </a:t>
-            </a:r>
-          </a:p>
-          <a:p>
-            <a:pPr marL="342900" indent="-342900">
-              <a:buFont typeface="Arial" panose="020B0604020202020204" pitchFamily="34" charset="0"/>
-              <a:buChar char="•"/>
-            </a:pPr>
-            <a:r>
-              <a:rPr lang="en-CA" sz="2400" dirty="0" smtClean="0"/>
-              <a:t>Quality management </a:t>
-            </a:r>
-          </a:p>
-          <a:p>
-            <a:pPr marL="342900" indent="-342900">
-              <a:buFont typeface="Arial" panose="020B0604020202020204" pitchFamily="34" charset="0"/>
-              <a:buChar char="•"/>
-            </a:pPr>
-            <a:r>
-              <a:rPr lang="en-CA" sz="2400" dirty="0" smtClean="0"/>
-              <a:t>Dashboards and analytics </a:t>
-            </a:r>
-          </a:p>
-          <a:p>
-            <a:pPr marL="342900" indent="-342900">
-              <a:buFont typeface="Arial" panose="020B0604020202020204" pitchFamily="34" charset="0"/>
-              <a:buChar char="•"/>
-            </a:pPr>
-            <a:r>
-              <a:rPr lang="en-CA" sz="2400" dirty="0" smtClean="0"/>
-              <a:t>User roles </a:t>
-            </a:r>
-          </a:p>
-          <a:p>
-            <a:pPr marL="342900" indent="-342900">
-              <a:buFont typeface="Arial" panose="020B0604020202020204" pitchFamily="34" charset="0"/>
-              <a:buChar char="•"/>
-            </a:pPr>
-            <a:r>
-              <a:rPr lang="en-CA" sz="2400" dirty="0" smtClean="0"/>
-              <a:t>Documentation and email Support </a:t>
-            </a:r>
-          </a:p>
-        </p:txBody>
-      </p:sp>
-      <p:sp>
-        <p:nvSpPr>
-          <p:cNvPr id="10" name="Rectangle 9"/>
-          <p:cNvSpPr/>
-          <p:nvPr>
-            <p:custDataLst>
-              <p:tags r:id="rId4"/>
-            </p:custDataLst>
-          </p:nvPr>
-        </p:nvSpPr>
-        <p:spPr>
-          <a:xfrm>
-            <a:off x="1330726" y="4028596"/>
-            <a:ext cx="4959289" cy="1938992"/>
-          </a:xfrm>
-          <a:prstGeom prst="rect">
-            <a:avLst/>
-          </a:prstGeom>
-        </p:spPr>
-        <p:style>
-          <a:lnRef idx="2">
-            <a:schemeClr val="accent3"/>
-          </a:lnRef>
-          <a:fillRef idx="1">
-            <a:schemeClr val="lt1"/>
-          </a:fillRef>
-          <a:effectRef idx="0">
-            <a:schemeClr val="accent3"/>
-          </a:effectRef>
-          <a:fontRef idx="minor">
-            <a:schemeClr val="dk1"/>
-          </a:fontRef>
-        </p:style>
-        <p:txBody>
-          <a:bodyPr wrap="square">
-            <a:spAutoFit/>
-          </a:bodyPr>
-          <a:lstStyle/>
-          <a:p>
-            <a:pPr marL="342900" indent="-342900">
-              <a:buFont typeface="Arial" panose="020B0604020202020204" pitchFamily="34" charset="0"/>
-              <a:buChar char="•"/>
-            </a:pPr>
-            <a:r>
-              <a:rPr lang="en-CA" sz="2400" dirty="0" smtClean="0"/>
-              <a:t>Annotator Metrics</a:t>
-            </a:r>
-          </a:p>
-          <a:p>
-            <a:pPr marL="342900" indent="-342900">
-              <a:buFont typeface="Arial" panose="020B0604020202020204" pitchFamily="34" charset="0"/>
-              <a:buChar char="•"/>
-            </a:pPr>
-            <a:r>
-              <a:rPr lang="en-CA" sz="2400" dirty="0" smtClean="0"/>
-              <a:t>Review and QA</a:t>
-            </a:r>
-          </a:p>
-          <a:p>
-            <a:pPr marL="342900" indent="-342900">
-              <a:buFont typeface="Arial" panose="020B0604020202020204" pitchFamily="34" charset="0"/>
-              <a:buChar char="•"/>
-            </a:pPr>
-            <a:r>
-              <a:rPr lang="en-CA" sz="2400" dirty="0" smtClean="0"/>
-              <a:t>Secure</a:t>
-            </a:r>
-          </a:p>
-          <a:p>
-            <a:pPr marL="342900" indent="-342900">
-              <a:buFont typeface="Arial" panose="020B0604020202020204" pitchFamily="34" charset="0"/>
-              <a:buChar char="•"/>
-            </a:pPr>
-            <a:r>
-              <a:rPr lang="en-CA" sz="2400" dirty="0" smtClean="0"/>
-              <a:t>Medically Compliant</a:t>
-            </a:r>
-          </a:p>
-          <a:p>
-            <a:pPr marL="342900" indent="-342900">
-              <a:buFont typeface="Arial" panose="020B0604020202020204" pitchFamily="34" charset="0"/>
-              <a:buChar char="•"/>
-            </a:pPr>
-            <a:r>
-              <a:rPr lang="en-CA" sz="2400" dirty="0" smtClean="0"/>
-              <a:t>File management </a:t>
-            </a:r>
-          </a:p>
-        </p:txBody>
-      </p:sp>
-      <p:sp>
-        <p:nvSpPr>
-          <p:cNvPr id="11" name="Rectangle 10"/>
-          <p:cNvSpPr/>
-          <p:nvPr>
-            <p:custDataLst>
-              <p:tags r:id="rId5"/>
-            </p:custDataLst>
-          </p:nvPr>
-        </p:nvSpPr>
-        <p:spPr>
-          <a:xfrm>
-            <a:off x="5373949" y="2323699"/>
-            <a:ext cx="5571477" cy="1938992"/>
-          </a:xfrm>
-          <a:prstGeom prst="rect">
-            <a:avLst/>
-          </a:prstGeom>
-        </p:spPr>
-        <p:style>
-          <a:lnRef idx="2">
-            <a:schemeClr val="accent3"/>
-          </a:lnRef>
-          <a:fillRef idx="1">
-            <a:schemeClr val="lt1"/>
-          </a:fillRef>
-          <a:effectRef idx="0">
-            <a:schemeClr val="accent3"/>
-          </a:effectRef>
-          <a:fontRef idx="minor">
-            <a:schemeClr val="dk1"/>
-          </a:fontRef>
-        </p:style>
-        <p:txBody>
-          <a:bodyPr wrap="square">
-            <a:spAutoFit/>
-          </a:bodyPr>
-          <a:lstStyle/>
-          <a:p>
-            <a:pPr marL="342900" indent="-342900">
-              <a:buFont typeface="Arial" panose="020B0604020202020204" pitchFamily="34" charset="0"/>
-              <a:buChar char="•"/>
-            </a:pPr>
-            <a:r>
-              <a:rPr lang="en-CA" sz="2400" dirty="0" smtClean="0"/>
-              <a:t>Statistics Role management Integrations </a:t>
-            </a:r>
-          </a:p>
-          <a:p>
-            <a:pPr marL="342900" indent="-342900">
-              <a:buFont typeface="Arial" panose="020B0604020202020204" pitchFamily="34" charset="0"/>
-              <a:buChar char="•"/>
-            </a:pPr>
-            <a:r>
-              <a:rPr lang="en-CA" sz="2400" dirty="0" smtClean="0"/>
-              <a:t>API SDK</a:t>
-            </a:r>
-          </a:p>
-          <a:p>
-            <a:pPr marL="342900" indent="-342900">
-              <a:buFont typeface="Arial" panose="020B0604020202020204" pitchFamily="34" charset="0"/>
-              <a:buChar char="•"/>
-            </a:pPr>
-            <a:r>
-              <a:rPr lang="en-CA" sz="2400" dirty="0" smtClean="0"/>
-              <a:t>Dataset import</a:t>
-            </a:r>
-          </a:p>
-          <a:p>
-            <a:pPr marL="342900" indent="-342900">
-              <a:buFont typeface="Arial" panose="020B0604020202020204" pitchFamily="34" charset="0"/>
-              <a:buChar char="•"/>
-            </a:pPr>
-            <a:r>
-              <a:rPr lang="fr-FR" sz="2400" dirty="0" smtClean="0"/>
-              <a:t>Smart export</a:t>
-            </a:r>
-          </a:p>
-          <a:p>
-            <a:pPr marL="342900" indent="-342900">
-              <a:buFont typeface="Arial" panose="020B0604020202020204" pitchFamily="34" charset="0"/>
-              <a:buChar char="•"/>
-            </a:pPr>
-            <a:r>
-              <a:rPr lang="fr-FR" sz="2400" dirty="0" err="1" smtClean="0"/>
-              <a:t>Integration</a:t>
-            </a:r>
-            <a:r>
-              <a:rPr lang="fr-FR" sz="2400" dirty="0" smtClean="0"/>
-              <a:t> </a:t>
-            </a:r>
-            <a:r>
-              <a:rPr lang="fr-FR" sz="2400" dirty="0" err="1" smtClean="0"/>
-              <a:t>into</a:t>
-            </a:r>
-            <a:r>
-              <a:rPr lang="fr-FR" sz="2400" dirty="0" smtClean="0"/>
-              <a:t> workflows</a:t>
-            </a:r>
-            <a:endParaRPr lang="en-CA" sz="2400" dirty="0" smtClean="0"/>
-          </a:p>
-        </p:txBody>
-      </p:sp>
-      <p:sp>
-        <p:nvSpPr>
-          <p:cNvPr id="12" name="Rectangle 11"/>
-          <p:cNvSpPr/>
-          <p:nvPr>
-            <p:custDataLst>
-              <p:tags r:id="rId6"/>
-            </p:custDataLst>
-          </p:nvPr>
-        </p:nvSpPr>
-        <p:spPr>
-          <a:xfrm>
-            <a:off x="4692218" y="4753568"/>
-            <a:ext cx="7362547" cy="1569660"/>
-          </a:xfrm>
-          <a:prstGeom prst="rect">
-            <a:avLst/>
-          </a:prstGeom>
-        </p:spPr>
-        <p:style>
-          <a:lnRef idx="2">
-            <a:schemeClr val="accent3"/>
-          </a:lnRef>
-          <a:fillRef idx="1">
-            <a:schemeClr val="lt1"/>
-          </a:fillRef>
-          <a:effectRef idx="0">
-            <a:schemeClr val="accent3"/>
-          </a:effectRef>
-          <a:fontRef idx="minor">
-            <a:schemeClr val="dk1"/>
-          </a:fontRef>
-        </p:style>
-        <p:txBody>
-          <a:bodyPr wrap="square">
-            <a:spAutoFit/>
-          </a:bodyPr>
-          <a:lstStyle/>
-          <a:p>
-            <a:pPr marL="285750" indent="-285750">
-              <a:buFont typeface="Arial" panose="020B0604020202020204" pitchFamily="34" charset="0"/>
-              <a:buChar char="•"/>
-            </a:pPr>
-            <a:r>
-              <a:rPr lang="en-CA" sz="2400" b="0" i="0" dirty="0" smtClean="0">
-                <a:solidFill>
-                  <a:srgbClr val="000000"/>
-                </a:solidFill>
-                <a:effectLst/>
-              </a:rPr>
-              <a:t>Leverage your models Turn predictions into ground truth </a:t>
-            </a:r>
-          </a:p>
-          <a:p>
-            <a:pPr marL="285750" indent="-285750">
-              <a:buFont typeface="Arial" panose="020B0604020202020204" pitchFamily="34" charset="0"/>
-              <a:buChar char="•"/>
-            </a:pPr>
-            <a:r>
-              <a:rPr lang="en-CA" sz="2400" b="0" i="0" dirty="0" smtClean="0">
-                <a:solidFill>
-                  <a:srgbClr val="000000"/>
-                </a:solidFill>
-                <a:effectLst/>
-              </a:rPr>
-              <a:t>Active learning Implement active learning pipelines </a:t>
-            </a:r>
-          </a:p>
-          <a:p>
-            <a:pPr marL="285750" indent="-285750">
-              <a:buFont typeface="Arial" panose="020B0604020202020204" pitchFamily="34" charset="0"/>
-              <a:buChar char="•"/>
-            </a:pPr>
-            <a:r>
-              <a:rPr lang="en-CA" sz="2400" b="0" i="0" dirty="0" smtClean="0">
-                <a:solidFill>
-                  <a:srgbClr val="000000"/>
-                </a:solidFill>
-                <a:effectLst/>
-              </a:rPr>
-              <a:t>Automation</a:t>
-            </a:r>
-          </a:p>
-        </p:txBody>
-      </p:sp>
-    </p:spTree>
-    <p:extLst>
-      <p:ext uri="{BB962C8B-B14F-4D97-AF65-F5344CB8AC3E}">
-        <p14:creationId xmlns:p14="http://schemas.microsoft.com/office/powerpoint/2010/main" val="3115654532"/>
-      </p:ext>
-    </p:extLst>
-  </p:cSld>
-  <p:clrMapOvr>
-    <a:masterClrMapping/>
-  </p:clrMapOvr>
-  <p:timing>
-    <p:tnLst>
-      <p:par>
-        <p:cTn id="1" dur="indefinite" restart="never" nodeType="tmRoot"/>
-      </p:par>
-    </p:tnLst>
-  </p:timing>
-</p:sld>
-</file>
-
-<file path=ppt/slides/slide5.xml><?xml version="1.0" encoding="utf-8"?>
-<p:sld xmlns:a="http://schemas.openxmlformats.org/drawingml/2006/main" xmlns:r="http://schemas.openxmlformats.org/officeDocument/2006/relationships" xmlns:p="http://schemas.openxmlformats.org/presentationml/2006/main">
-  <p:cSld>
-    <p:spTree>
-      <p:nvGrpSpPr>
-        <p:cNvPr id="1" name=""/>
-        <p:cNvGrpSpPr/>
-        <p:nvPr/>
-      </p:nvGrpSpPr>
-      <p:grpSpPr>
-        <a:xfrm>
-          <a:off x="0" y="0"/>
-          <a:ext cx="0" cy="0"/>
-          <a:chOff x="0" y="0"/>
-          <a:chExt cx="0" cy="0"/>
-        </a:xfrm>
-      </p:grpSpPr>
-      <p:sp>
-        <p:nvSpPr>
-          <p:cNvPr id="15" name="Title 14"/>
-          <p:cNvSpPr>
-            <a:spLocks noGrp="1"/>
-          </p:cNvSpPr>
-          <p:nvPr>
-            <p:ph type="title"/>
-            <p:custDataLst>
-              <p:tags r:id="rId1"/>
-            </p:custDataLst>
-          </p:nvPr>
-        </p:nvSpPr>
-        <p:spPr>
-          <a:xfrm>
-            <a:off x="296662" y="117693"/>
-            <a:ext cx="2499804" cy="767736"/>
-          </a:xfrm>
-        </p:spPr>
-        <p:txBody>
-          <a:bodyPr/>
-          <a:lstStyle/>
-          <a:p>
-            <a:r>
-              <a:rPr lang="fr-FR" dirty="0" smtClean="0"/>
-              <a:t>Choix</a:t>
-            </a:r>
-            <a:endParaRPr lang="en-CA" dirty="0"/>
-          </a:p>
-        </p:txBody>
-      </p:sp>
-      <p:sp>
-        <p:nvSpPr>
-          <p:cNvPr id="16" name="Rectangle 15"/>
-          <p:cNvSpPr/>
-          <p:nvPr>
-            <p:custDataLst>
-              <p:tags r:id="rId2"/>
-            </p:custDataLst>
-          </p:nvPr>
-        </p:nvSpPr>
-        <p:spPr>
-          <a:xfrm>
-            <a:off x="1988599" y="117693"/>
-            <a:ext cx="10085032" cy="6555641"/>
-          </a:xfrm>
-          <a:prstGeom prst="rect">
-            <a:avLst/>
-          </a:prstGeom>
-        </p:spPr>
-        <p:txBody>
-          <a:bodyPr wrap="square">
-            <a:spAutoFit/>
-          </a:bodyPr>
-          <a:lstStyle/>
-          <a:p>
-            <a:pPr marL="342900" indent="-342900">
-              <a:buFont typeface="+mj-lt"/>
-              <a:buAutoNum type="arabicPeriod"/>
-            </a:pPr>
-            <a:r>
-              <a:rPr lang="en-CA" sz="2100" dirty="0" smtClean="0">
-                <a:solidFill>
-                  <a:schemeClr val="accent2">
-                    <a:lumMod val="75000"/>
-                  </a:schemeClr>
-                </a:solidFill>
-              </a:rPr>
-              <a:t>V7labs Darwin </a:t>
-            </a:r>
-            <a:r>
-              <a:rPr lang="en-CA" sz="2100" dirty="0">
-                <a:solidFill>
-                  <a:schemeClr val="accent2">
-                    <a:lumMod val="75000"/>
-                  </a:schemeClr>
-                </a:solidFill>
-              </a:rPr>
-              <a:t>$ </a:t>
-            </a:r>
-            <a:r>
-              <a:rPr lang="en-CA" sz="2100" dirty="0" err="1" smtClean="0">
-                <a:solidFill>
-                  <a:schemeClr val="accent2">
-                    <a:lumMod val="75000"/>
-                  </a:schemeClr>
-                </a:solidFill>
-              </a:rPr>
-              <a:t>plateforme</a:t>
-            </a:r>
-            <a:r>
-              <a:rPr lang="en-CA" sz="2100" dirty="0" smtClean="0">
-                <a:solidFill>
-                  <a:schemeClr val="accent2">
-                    <a:lumMod val="75000"/>
-                  </a:schemeClr>
-                </a:solidFill>
-              </a:rPr>
-              <a:t> </a:t>
-            </a:r>
-            <a:r>
-              <a:rPr lang="en-CA" sz="2100" u="sng" dirty="0" smtClean="0">
-                <a:solidFill>
-                  <a:schemeClr val="accent2">
-                    <a:lumMod val="75000"/>
-                  </a:schemeClr>
-                </a:solidFill>
-                <a:hlinkClick r:id="rId4"/>
-              </a:rPr>
-              <a:t>https</a:t>
-            </a:r>
-            <a:r>
-              <a:rPr lang="en-CA" sz="2100" u="sng" dirty="0">
-                <a:solidFill>
-                  <a:schemeClr val="accent2">
-                    <a:lumMod val="75000"/>
-                  </a:schemeClr>
-                </a:solidFill>
-                <a:hlinkClick r:id="rId4"/>
-              </a:rPr>
-              <a:t>://</a:t>
-            </a:r>
-            <a:r>
-              <a:rPr lang="en-CA" sz="2100" u="sng" dirty="0" smtClean="0">
-                <a:solidFill>
-                  <a:schemeClr val="accent2">
-                    <a:lumMod val="75000"/>
-                  </a:schemeClr>
-                </a:solidFill>
-                <a:hlinkClick r:id="rId4"/>
-              </a:rPr>
-              <a:t>www.v7labs.com</a:t>
-            </a:r>
-            <a:endParaRPr lang="en-CA" sz="2100" dirty="0" smtClean="0">
-              <a:solidFill>
-                <a:schemeClr val="accent2">
-                  <a:lumMod val="75000"/>
-                </a:schemeClr>
-              </a:solidFill>
-            </a:endParaRPr>
-          </a:p>
-          <a:p>
-            <a:pPr marL="342900" indent="-342900">
-              <a:buFont typeface="+mj-lt"/>
-              <a:buAutoNum type="arabicPeriod"/>
-            </a:pPr>
-            <a:r>
-              <a:rPr lang="en-CA" sz="2100" dirty="0" err="1" smtClean="0">
-                <a:solidFill>
-                  <a:schemeClr val="accent2">
-                    <a:lumMod val="75000"/>
-                  </a:schemeClr>
-                </a:solidFill>
-              </a:rPr>
-              <a:t>SuperAnnotate</a:t>
-            </a:r>
-            <a:r>
-              <a:rPr lang="en-CA" sz="2100" dirty="0">
-                <a:solidFill>
-                  <a:schemeClr val="accent2">
-                    <a:lumMod val="75000"/>
-                  </a:schemeClr>
-                </a:solidFill>
-              </a:rPr>
-              <a:t> $ </a:t>
-            </a:r>
-            <a:r>
-              <a:rPr lang="en-CA" sz="2100" dirty="0" err="1" smtClean="0">
-                <a:solidFill>
-                  <a:schemeClr val="accent2">
-                    <a:lumMod val="75000"/>
-                  </a:schemeClr>
-                </a:solidFill>
-              </a:rPr>
-              <a:t>plateforme</a:t>
-            </a:r>
-            <a:r>
-              <a:rPr lang="en-CA" sz="2100" dirty="0" smtClean="0">
-                <a:solidFill>
-                  <a:schemeClr val="accent2">
-                    <a:lumMod val="75000"/>
-                  </a:schemeClr>
-                </a:solidFill>
-              </a:rPr>
-              <a:t> </a:t>
-            </a:r>
-            <a:r>
-              <a:rPr lang="en-CA" sz="2100" dirty="0" err="1" smtClean="0">
-                <a:solidFill>
-                  <a:schemeClr val="accent2">
-                    <a:lumMod val="75000"/>
-                  </a:schemeClr>
-                </a:solidFill>
-              </a:rPr>
-              <a:t>openCV</a:t>
-            </a:r>
-            <a:r>
-              <a:rPr lang="en-CA" sz="2100" dirty="0" smtClean="0">
-                <a:solidFill>
-                  <a:schemeClr val="accent2">
-                    <a:lumMod val="75000"/>
-                  </a:schemeClr>
-                </a:solidFill>
-              </a:rPr>
-              <a:t> </a:t>
-            </a:r>
-            <a:r>
-              <a:rPr lang="en-CA" sz="2100" u="sng" dirty="0" smtClean="0">
-                <a:solidFill>
-                  <a:schemeClr val="accent2">
-                    <a:lumMod val="75000"/>
-                  </a:schemeClr>
-                </a:solidFill>
-                <a:hlinkClick r:id="rId5"/>
-              </a:rPr>
-              <a:t>https</a:t>
-            </a:r>
-            <a:r>
-              <a:rPr lang="en-CA" sz="2100" u="sng" dirty="0">
-                <a:solidFill>
-                  <a:schemeClr val="accent2">
-                    <a:lumMod val="75000"/>
-                  </a:schemeClr>
-                </a:solidFill>
-                <a:hlinkClick r:id="rId5"/>
-              </a:rPr>
-              <a:t>://superannotate.com</a:t>
-            </a:r>
-            <a:r>
-              <a:rPr lang="en-CA" sz="2100" u="sng" dirty="0" smtClean="0">
-                <a:solidFill>
-                  <a:schemeClr val="accent2">
-                    <a:lumMod val="75000"/>
-                  </a:schemeClr>
-                </a:solidFill>
-                <a:hlinkClick r:id="rId5"/>
-              </a:rPr>
-              <a:t>/</a:t>
-            </a:r>
-            <a:endParaRPr lang="en-CA" sz="2100" dirty="0" smtClean="0">
-              <a:solidFill>
-                <a:schemeClr val="accent2">
-                  <a:lumMod val="75000"/>
-                </a:schemeClr>
-              </a:solidFill>
-            </a:endParaRPr>
-          </a:p>
-          <a:p>
-            <a:pPr marL="342900" indent="-342900">
-              <a:buFont typeface="+mj-lt"/>
-              <a:buAutoNum type="arabicPeriod"/>
-            </a:pPr>
-            <a:r>
-              <a:rPr lang="en-CA" sz="2100" dirty="0" smtClean="0">
-                <a:solidFill>
-                  <a:schemeClr val="accent2">
-                    <a:lumMod val="75000"/>
-                  </a:schemeClr>
-                </a:solidFill>
-              </a:rPr>
-              <a:t>Supervise.ly $* </a:t>
-            </a:r>
-            <a:r>
-              <a:rPr lang="en-CA" sz="2100" dirty="0" err="1" smtClean="0">
-                <a:solidFill>
-                  <a:schemeClr val="accent2">
-                    <a:lumMod val="75000"/>
-                  </a:schemeClr>
-                </a:solidFill>
-              </a:rPr>
-              <a:t>plateforme</a:t>
-            </a:r>
-            <a:r>
-              <a:rPr lang="en-CA" sz="2100" dirty="0" smtClean="0">
-                <a:solidFill>
-                  <a:schemeClr val="accent2">
-                    <a:lumMod val="75000"/>
-                  </a:schemeClr>
-                </a:solidFill>
-              </a:rPr>
-              <a:t> </a:t>
-            </a:r>
-            <a:r>
-              <a:rPr lang="en-CA" sz="2100" u="sng" dirty="0" smtClean="0">
-                <a:solidFill>
-                  <a:schemeClr val="accent2">
-                    <a:lumMod val="75000"/>
-                  </a:schemeClr>
-                </a:solidFill>
-                <a:hlinkClick r:id="rId6"/>
-              </a:rPr>
-              <a:t>https</a:t>
-            </a:r>
-            <a:r>
-              <a:rPr lang="en-CA" sz="2100" u="sng" dirty="0">
-                <a:solidFill>
-                  <a:schemeClr val="accent2">
-                    <a:lumMod val="75000"/>
-                  </a:schemeClr>
-                </a:solidFill>
-                <a:hlinkClick r:id="rId6"/>
-              </a:rPr>
-              <a:t>://supervise.ly/</a:t>
-            </a:r>
-            <a:endParaRPr lang="en-CA" sz="2100" dirty="0" smtClean="0">
-              <a:solidFill>
-                <a:schemeClr val="accent2">
-                  <a:lumMod val="75000"/>
-                </a:schemeClr>
-              </a:solidFill>
-            </a:endParaRPr>
-          </a:p>
-          <a:p>
-            <a:pPr marL="342900" indent="-342900">
-              <a:buFont typeface="+mj-lt"/>
-              <a:buAutoNum type="arabicPeriod"/>
-            </a:pPr>
-            <a:r>
-              <a:rPr lang="en-CA" sz="2100" dirty="0" err="1" smtClean="0">
-                <a:solidFill>
-                  <a:schemeClr val="accent2">
-                    <a:lumMod val="75000"/>
-                  </a:schemeClr>
-                </a:solidFill>
-              </a:rPr>
-              <a:t>LabelBox</a:t>
-            </a:r>
-            <a:r>
-              <a:rPr lang="en-CA" sz="2100" dirty="0" smtClean="0">
-                <a:solidFill>
-                  <a:schemeClr val="accent2">
-                    <a:lumMod val="75000"/>
-                  </a:schemeClr>
-                </a:solidFill>
-              </a:rPr>
-              <a:t> $ </a:t>
-            </a:r>
-            <a:r>
-              <a:rPr lang="en-CA" sz="2100" dirty="0" err="1" smtClean="0">
-                <a:solidFill>
-                  <a:schemeClr val="accent2">
-                    <a:lumMod val="75000"/>
-                  </a:schemeClr>
-                </a:solidFill>
-              </a:rPr>
-              <a:t>plateforme</a:t>
-            </a:r>
-            <a:r>
-              <a:rPr lang="en-CA" sz="2100" dirty="0" smtClean="0">
-                <a:solidFill>
-                  <a:schemeClr val="accent2">
-                    <a:lumMod val="75000"/>
-                  </a:schemeClr>
-                </a:solidFill>
-              </a:rPr>
-              <a:t> </a:t>
-            </a:r>
-            <a:r>
-              <a:rPr lang="en-CA" sz="2100" u="sng" dirty="0" smtClean="0">
-                <a:solidFill>
-                  <a:schemeClr val="accent2">
-                    <a:lumMod val="75000"/>
-                  </a:schemeClr>
-                </a:solidFill>
-                <a:hlinkClick r:id="rId7"/>
-              </a:rPr>
-              <a:t>https</a:t>
-            </a:r>
-            <a:r>
-              <a:rPr lang="en-CA" sz="2100" u="sng" dirty="0">
-                <a:solidFill>
-                  <a:schemeClr val="accent2">
-                    <a:lumMod val="75000"/>
-                  </a:schemeClr>
-                </a:solidFill>
-                <a:hlinkClick r:id="rId7"/>
-              </a:rPr>
-              <a:t>://labelbox.com/</a:t>
-            </a:r>
-            <a:endParaRPr lang="en-CA" sz="2100" dirty="0" smtClean="0">
-              <a:solidFill>
-                <a:schemeClr val="accent2">
-                  <a:lumMod val="75000"/>
-                </a:schemeClr>
-              </a:solidFill>
-            </a:endParaRPr>
-          </a:p>
-          <a:p>
-            <a:pPr marL="342900" indent="-342900">
-              <a:buFont typeface="+mj-lt"/>
-              <a:buAutoNum type="arabicPeriod"/>
-            </a:pPr>
-            <a:r>
-              <a:rPr lang="en-CA" sz="2100" dirty="0" smtClean="0"/>
-              <a:t>CVAT </a:t>
-            </a:r>
-            <a:r>
-              <a:rPr lang="en-CA" sz="2100" dirty="0" err="1" smtClean="0"/>
-              <a:t>gratuit</a:t>
-            </a:r>
-            <a:r>
-              <a:rPr lang="en-CA" sz="2100" dirty="0" smtClean="0"/>
-              <a:t> </a:t>
-            </a:r>
-            <a:r>
-              <a:rPr lang="en-CA" sz="2100" dirty="0" err="1" smtClean="0"/>
-              <a:t>outil</a:t>
-            </a:r>
-            <a:r>
-              <a:rPr lang="en-CA" sz="2100" dirty="0" smtClean="0"/>
-              <a:t> Intel </a:t>
-            </a:r>
-            <a:r>
-              <a:rPr lang="en-CA" sz="2100" u="sng" dirty="0" smtClean="0">
-                <a:hlinkClick r:id="rId8"/>
-              </a:rPr>
-              <a:t>https</a:t>
-            </a:r>
-            <a:r>
-              <a:rPr lang="en-CA" sz="2100" u="sng" dirty="0">
-                <a:hlinkClick r:id="rId8"/>
-              </a:rPr>
-              <a:t>://github.com/openvinotoolkit/cvat</a:t>
-            </a:r>
-            <a:endParaRPr lang="en-CA" sz="2100" dirty="0" smtClean="0"/>
-          </a:p>
-          <a:p>
-            <a:pPr marL="342900" indent="-342900">
-              <a:buFont typeface="+mj-lt"/>
-              <a:buAutoNum type="arabicPeriod"/>
-            </a:pPr>
-            <a:r>
-              <a:rPr lang="en-CA" sz="2100" dirty="0" smtClean="0">
-                <a:solidFill>
-                  <a:schemeClr val="accent2">
-                    <a:lumMod val="75000"/>
-                  </a:schemeClr>
-                </a:solidFill>
-              </a:rPr>
-              <a:t>Hasty.ai $ </a:t>
-            </a:r>
-            <a:r>
-              <a:rPr lang="en-CA" sz="2100" dirty="0" err="1" smtClean="0">
-                <a:solidFill>
-                  <a:schemeClr val="accent2">
-                    <a:lumMod val="75000"/>
-                  </a:schemeClr>
-                </a:solidFill>
-              </a:rPr>
-              <a:t>plateforme</a:t>
-            </a:r>
-            <a:r>
-              <a:rPr lang="en-CA" sz="2100" dirty="0" smtClean="0">
-                <a:solidFill>
-                  <a:schemeClr val="accent2">
-                    <a:lumMod val="75000"/>
-                  </a:schemeClr>
-                </a:solidFill>
-              </a:rPr>
-              <a:t> </a:t>
-            </a:r>
-            <a:r>
-              <a:rPr lang="en-CA" sz="2100" u="sng" dirty="0">
-                <a:solidFill>
-                  <a:schemeClr val="accent2">
-                    <a:lumMod val="75000"/>
-                  </a:schemeClr>
-                </a:solidFill>
-                <a:hlinkClick r:id="rId9"/>
-              </a:rPr>
-              <a:t>https://hasty.ai/</a:t>
-            </a:r>
-            <a:endParaRPr lang="en-CA" sz="2100" dirty="0" smtClean="0">
-              <a:solidFill>
-                <a:schemeClr val="accent2">
-                  <a:lumMod val="75000"/>
-                </a:schemeClr>
-              </a:solidFill>
-            </a:endParaRPr>
-          </a:p>
-          <a:p>
-            <a:pPr marL="342900" indent="-342900">
-              <a:buFont typeface="+mj-lt"/>
-              <a:buAutoNum type="arabicPeriod"/>
-            </a:pPr>
-            <a:r>
-              <a:rPr lang="en-CA" sz="2100" dirty="0" smtClean="0"/>
-              <a:t>AIDE Annotation Interface for Data-driven Ecology </a:t>
-            </a:r>
-            <a:r>
-              <a:rPr lang="en-CA" sz="2100" dirty="0" err="1" smtClean="0"/>
-              <a:t>gratuit</a:t>
-            </a:r>
-            <a:r>
-              <a:rPr lang="en-CA" sz="2100" dirty="0" smtClean="0"/>
-              <a:t> </a:t>
-            </a:r>
-            <a:r>
-              <a:rPr lang="en-CA" sz="2100" dirty="0" err="1" smtClean="0"/>
-              <a:t>plateforme</a:t>
-            </a:r>
-            <a:r>
-              <a:rPr lang="en-CA" sz="2100" dirty="0" smtClean="0"/>
-              <a:t> Microsoft </a:t>
-            </a:r>
-            <a:r>
-              <a:rPr lang="en-CA" sz="2100" u="sng" dirty="0" smtClean="0">
-                <a:hlinkClick r:id="rId10"/>
-              </a:rPr>
-              <a:t>https</a:t>
-            </a:r>
-            <a:r>
-              <a:rPr lang="en-CA" sz="2100" u="sng" dirty="0">
-                <a:hlinkClick r:id="rId10"/>
-              </a:rPr>
-              <a:t>://github.com/microsoft/aerial_wildlife_detection</a:t>
-            </a:r>
-            <a:endParaRPr lang="en-CA" sz="2100" dirty="0" smtClean="0"/>
-          </a:p>
-          <a:p>
-            <a:pPr marL="342900" indent="-342900">
-              <a:buFont typeface="+mj-lt"/>
-              <a:buAutoNum type="arabicPeriod"/>
-            </a:pPr>
-            <a:r>
-              <a:rPr lang="en-CA" sz="2100" dirty="0" smtClean="0"/>
-              <a:t>VIA VGG Image Annotator </a:t>
-            </a:r>
-            <a:r>
-              <a:rPr lang="en-CA" sz="2100" dirty="0" err="1" smtClean="0"/>
-              <a:t>gratuit</a:t>
-            </a:r>
-            <a:r>
-              <a:rPr lang="en-CA" sz="2100" dirty="0" smtClean="0"/>
-              <a:t> </a:t>
-            </a:r>
-            <a:r>
-              <a:rPr lang="en-CA" sz="2100" dirty="0" err="1" smtClean="0"/>
-              <a:t>outil</a:t>
-            </a:r>
-            <a:r>
-              <a:rPr lang="en-CA" sz="2100" dirty="0"/>
-              <a:t> </a:t>
-            </a:r>
-            <a:r>
-              <a:rPr lang="en-CA" sz="2100" u="sng" dirty="0" smtClean="0">
-                <a:hlinkClick r:id="rId11"/>
-              </a:rPr>
-              <a:t>https</a:t>
-            </a:r>
-            <a:r>
-              <a:rPr lang="en-CA" sz="2100" u="sng" dirty="0">
-                <a:hlinkClick r:id="rId11"/>
-              </a:rPr>
-              <a:t>://www.robots.ox.ac.uk/~vgg/software/via/</a:t>
-            </a:r>
-            <a:endParaRPr lang="en-CA" sz="2100" dirty="0" smtClean="0"/>
-          </a:p>
-          <a:p>
-            <a:pPr marL="342900" indent="-342900">
-              <a:buFont typeface="+mj-lt"/>
-              <a:buAutoNum type="arabicPeriod"/>
-            </a:pPr>
-            <a:r>
-              <a:rPr lang="en-CA" sz="2100" dirty="0" err="1" smtClean="0"/>
-              <a:t>VoTT</a:t>
-            </a:r>
-            <a:r>
-              <a:rPr lang="en-CA" sz="2100" dirty="0" smtClean="0"/>
-              <a:t> Visual Object Tagging Tool </a:t>
-            </a:r>
-            <a:r>
-              <a:rPr lang="en-CA" sz="2100" dirty="0" err="1" smtClean="0"/>
-              <a:t>gratuit</a:t>
-            </a:r>
-            <a:r>
-              <a:rPr lang="en-CA" sz="2100" dirty="0" smtClean="0"/>
-              <a:t> </a:t>
-            </a:r>
-            <a:r>
-              <a:rPr lang="en-CA" sz="2100" dirty="0" err="1" smtClean="0"/>
-              <a:t>outil</a:t>
-            </a:r>
-            <a:r>
-              <a:rPr lang="en-CA" sz="2100" dirty="0" smtClean="0"/>
-              <a:t> Microsoft </a:t>
-            </a:r>
-            <a:r>
-              <a:rPr lang="en-CA" sz="2100" u="sng" dirty="0" smtClean="0">
-                <a:hlinkClick r:id="rId12"/>
-              </a:rPr>
-              <a:t>https</a:t>
-            </a:r>
-            <a:r>
-              <a:rPr lang="en-CA" sz="2100" u="sng" dirty="0">
-                <a:hlinkClick r:id="rId12"/>
-              </a:rPr>
-              <a:t>://github.com/microsoft/VoTT</a:t>
-            </a:r>
-            <a:endParaRPr lang="en-CA" sz="2100" dirty="0" smtClean="0"/>
-          </a:p>
-          <a:p>
-            <a:pPr marL="342900" indent="-342900">
-              <a:buFont typeface="+mj-lt"/>
-              <a:buAutoNum type="arabicPeriod"/>
-            </a:pPr>
-            <a:r>
-              <a:rPr lang="en-CA" sz="2100" dirty="0" err="1" smtClean="0"/>
-              <a:t>Slava</a:t>
-            </a:r>
-            <a:r>
-              <a:rPr lang="en-CA" sz="2100" dirty="0" smtClean="0"/>
-              <a:t> label-tool </a:t>
-            </a:r>
-            <a:r>
-              <a:rPr lang="en-CA" sz="2100" dirty="0" err="1" smtClean="0"/>
-              <a:t>gratuit</a:t>
-            </a:r>
-            <a:r>
-              <a:rPr lang="en-CA" sz="2100" dirty="0" smtClean="0"/>
-              <a:t> </a:t>
-            </a:r>
-            <a:r>
-              <a:rPr lang="en-CA" sz="2100" dirty="0" err="1" smtClean="0"/>
-              <a:t>outil</a:t>
-            </a:r>
-            <a:r>
-              <a:rPr lang="en-CA" sz="2100" dirty="0" smtClean="0"/>
-              <a:t> </a:t>
-            </a:r>
-            <a:r>
-              <a:rPr lang="en-CA" sz="2100" u="sng" dirty="0" smtClean="0">
-                <a:hlinkClick r:id="rId13"/>
-              </a:rPr>
-              <a:t>https</a:t>
-            </a:r>
-            <a:r>
-              <a:rPr lang="en-CA" sz="2100" u="sng" dirty="0">
-                <a:hlinkClick r:id="rId13"/>
-              </a:rPr>
-              <a:t>://github.com/Slava/label-tool</a:t>
-            </a:r>
-            <a:endParaRPr lang="en-CA" sz="2100" dirty="0" smtClean="0"/>
-          </a:p>
-          <a:p>
-            <a:pPr marL="342900" indent="-342900">
-              <a:buFont typeface="+mj-lt"/>
-              <a:buAutoNum type="arabicPeriod"/>
-            </a:pPr>
-            <a:r>
-              <a:rPr lang="en-CA" sz="2100" dirty="0" smtClean="0"/>
-              <a:t>semantic-segmentation-editor </a:t>
-            </a:r>
-            <a:r>
-              <a:rPr lang="en-CA" sz="2100" dirty="0" err="1" smtClean="0"/>
-              <a:t>gratuit</a:t>
-            </a:r>
-            <a:r>
-              <a:rPr lang="en-CA" sz="2100" dirty="0" smtClean="0"/>
-              <a:t> </a:t>
-            </a:r>
-            <a:r>
-              <a:rPr lang="en-CA" sz="2100" dirty="0" err="1" smtClean="0"/>
-              <a:t>outil</a:t>
-            </a:r>
-            <a:r>
-              <a:rPr lang="en-CA" sz="2100" dirty="0" smtClean="0"/>
-              <a:t> Hitachi </a:t>
-            </a:r>
-            <a:r>
-              <a:rPr lang="en-CA" sz="2100" dirty="0" smtClean="0">
-                <a:hlinkClick r:id="rId14"/>
-              </a:rPr>
-              <a:t>https://github.com/Hitachi-Automotive-And-Industry-Lab/semantic-segmentation-editor</a:t>
-            </a:r>
-            <a:endParaRPr lang="en-CA" sz="2100" dirty="0" smtClean="0"/>
-          </a:p>
-          <a:p>
-            <a:pPr marL="342900" indent="-342900">
-              <a:buFont typeface="+mj-lt"/>
-              <a:buAutoNum type="arabicPeriod"/>
-            </a:pPr>
-            <a:r>
-              <a:rPr lang="en-CA" sz="2100" dirty="0" smtClean="0">
-                <a:solidFill>
-                  <a:schemeClr val="accent2">
-                    <a:lumMod val="75000"/>
-                  </a:schemeClr>
-                </a:solidFill>
-              </a:rPr>
-              <a:t>Playment.io $* </a:t>
-            </a:r>
-            <a:r>
-              <a:rPr lang="en-CA" sz="2100" dirty="0" err="1" smtClean="0">
-                <a:solidFill>
-                  <a:schemeClr val="accent2">
-                    <a:lumMod val="75000"/>
-                  </a:schemeClr>
-                </a:solidFill>
-              </a:rPr>
-              <a:t>plateforme</a:t>
-            </a:r>
-            <a:r>
-              <a:rPr lang="en-CA" sz="2100" dirty="0" smtClean="0">
-                <a:solidFill>
-                  <a:schemeClr val="accent2">
-                    <a:lumMod val="75000"/>
-                  </a:schemeClr>
-                </a:solidFill>
-              </a:rPr>
-              <a:t> </a:t>
-            </a:r>
-            <a:r>
-              <a:rPr lang="en-CA" sz="2100" u="sng" dirty="0" smtClean="0">
-                <a:solidFill>
-                  <a:schemeClr val="accent2">
-                    <a:lumMod val="75000"/>
-                  </a:schemeClr>
-                </a:solidFill>
-                <a:hlinkClick r:id="rId15"/>
-              </a:rPr>
-              <a:t>https</a:t>
-            </a:r>
-            <a:r>
-              <a:rPr lang="en-CA" sz="2100" u="sng" dirty="0">
-                <a:solidFill>
-                  <a:schemeClr val="accent2">
-                    <a:lumMod val="75000"/>
-                  </a:schemeClr>
-                </a:solidFill>
-                <a:hlinkClick r:id="rId15"/>
-              </a:rPr>
-              <a:t>://playment.io/</a:t>
-            </a:r>
-            <a:endParaRPr lang="en-CA" sz="2100" dirty="0" smtClean="0">
-              <a:solidFill>
-                <a:schemeClr val="accent2">
-                  <a:lumMod val="75000"/>
-                </a:schemeClr>
-              </a:solidFill>
-            </a:endParaRPr>
-          </a:p>
-          <a:p>
-            <a:pPr marL="342900" indent="-342900">
-              <a:buFont typeface="+mj-lt"/>
-              <a:buAutoNum type="arabicPeriod"/>
-            </a:pPr>
-            <a:r>
-              <a:rPr lang="en-CA" sz="2100" dirty="0" err="1" smtClean="0">
-                <a:solidFill>
-                  <a:schemeClr val="accent2">
-                    <a:lumMod val="75000"/>
-                  </a:schemeClr>
-                </a:solidFill>
-              </a:rPr>
-              <a:t>Anolytics</a:t>
-            </a:r>
-            <a:r>
-              <a:rPr lang="en-CA" sz="2100" dirty="0" smtClean="0">
-                <a:solidFill>
-                  <a:schemeClr val="accent2">
-                    <a:lumMod val="75000"/>
-                  </a:schemeClr>
-                </a:solidFill>
-              </a:rPr>
-              <a:t> outsource </a:t>
-            </a:r>
-            <a:r>
-              <a:rPr lang="en-CA" sz="2100" u="sng" dirty="0">
-                <a:solidFill>
-                  <a:schemeClr val="accent2">
-                    <a:lumMod val="75000"/>
-                  </a:schemeClr>
-                </a:solidFill>
-                <a:hlinkClick r:id="rId16"/>
-              </a:rPr>
-              <a:t>https://www.anolytics.ai/semantic-segmentation-services/</a:t>
-            </a:r>
-            <a:endParaRPr lang="en-CA" sz="2100" dirty="0" smtClean="0">
-              <a:solidFill>
-                <a:schemeClr val="accent2">
-                  <a:lumMod val="75000"/>
-                </a:schemeClr>
-              </a:solidFill>
-            </a:endParaRPr>
-          </a:p>
-          <a:p>
-            <a:pPr marL="342900" indent="-342900">
-              <a:buFont typeface="+mj-lt"/>
-              <a:buAutoNum type="arabicPeriod"/>
-            </a:pPr>
-            <a:r>
-              <a:rPr lang="en-CA" sz="2100" dirty="0" err="1" smtClean="0">
-                <a:solidFill>
-                  <a:schemeClr val="accent2">
-                    <a:lumMod val="75000"/>
-                  </a:schemeClr>
-                </a:solidFill>
-              </a:rPr>
-              <a:t>segments.ia</a:t>
-            </a:r>
-            <a:r>
-              <a:rPr lang="en-CA" sz="2100" dirty="0" smtClean="0">
-                <a:solidFill>
-                  <a:schemeClr val="accent2">
-                    <a:lumMod val="75000"/>
-                  </a:schemeClr>
-                </a:solidFill>
-              </a:rPr>
-              <a:t> outsource </a:t>
-            </a:r>
-            <a:r>
-              <a:rPr lang="en-CA" sz="2100" u="sng" dirty="0" smtClean="0">
-                <a:solidFill>
-                  <a:schemeClr val="accent2">
-                    <a:lumMod val="75000"/>
-                  </a:schemeClr>
-                </a:solidFill>
-                <a:hlinkClick r:id="rId17"/>
-              </a:rPr>
-              <a:t>https</a:t>
-            </a:r>
-            <a:r>
-              <a:rPr lang="en-CA" sz="2100" u="sng" dirty="0">
-                <a:solidFill>
-                  <a:schemeClr val="accent2">
-                    <a:lumMod val="75000"/>
-                  </a:schemeClr>
-                </a:solidFill>
-                <a:hlinkClick r:id="rId17"/>
-              </a:rPr>
-              <a:t>://segments.ai</a:t>
-            </a:r>
-            <a:endParaRPr lang="en-CA" sz="2100" dirty="0" smtClean="0">
-              <a:solidFill>
-                <a:schemeClr val="accent2">
-                  <a:lumMod val="75000"/>
-                </a:schemeClr>
-              </a:solidFill>
-            </a:endParaRPr>
-          </a:p>
-          <a:p>
-            <a:pPr marL="342900" indent="-342900">
-              <a:buFont typeface="+mj-lt"/>
-              <a:buAutoNum type="arabicPeriod"/>
-            </a:pPr>
-            <a:r>
-              <a:rPr lang="en-CA" sz="2100" dirty="0" err="1" smtClean="0">
-                <a:solidFill>
-                  <a:schemeClr val="accent2">
-                    <a:lumMod val="75000"/>
-                  </a:schemeClr>
-                </a:solidFill>
-              </a:rPr>
-              <a:t>Xyonix</a:t>
-            </a:r>
-            <a:r>
-              <a:rPr lang="en-CA" sz="2100" dirty="0" smtClean="0">
-                <a:solidFill>
-                  <a:schemeClr val="accent2">
-                    <a:lumMod val="75000"/>
-                  </a:schemeClr>
-                </a:solidFill>
-              </a:rPr>
-              <a:t> outsource </a:t>
-            </a:r>
-            <a:r>
-              <a:rPr lang="en-CA" sz="2100" u="sng" dirty="0">
-                <a:solidFill>
-                  <a:schemeClr val="accent2">
-                    <a:lumMod val="75000"/>
-                  </a:schemeClr>
-                </a:solidFill>
-                <a:hlinkClick r:id="rId18"/>
-              </a:rPr>
-              <a:t>https://www.xyonix.com</a:t>
-            </a:r>
-            <a:endParaRPr lang="en-CA" sz="2100" dirty="0" smtClean="0">
-              <a:solidFill>
-                <a:schemeClr val="accent2">
-                  <a:lumMod val="75000"/>
-                </a:schemeClr>
-              </a:solidFill>
-            </a:endParaRPr>
-          </a:p>
-          <a:p>
-            <a:pPr marL="342900" indent="-342900">
-              <a:buFont typeface="+mj-lt"/>
-              <a:buAutoNum type="arabicPeriod"/>
-            </a:pPr>
-            <a:r>
-              <a:rPr lang="en-CA" sz="2100" dirty="0" err="1" smtClean="0"/>
-              <a:t>Scalabel</a:t>
-            </a:r>
-            <a:r>
-              <a:rPr lang="en-CA" sz="2100" dirty="0" smtClean="0"/>
-              <a:t> </a:t>
-            </a:r>
-            <a:r>
-              <a:rPr lang="en-CA" sz="2100" dirty="0" err="1" smtClean="0"/>
-              <a:t>gratuit</a:t>
-            </a:r>
-            <a:r>
-              <a:rPr lang="en-CA" sz="2100" dirty="0"/>
-              <a:t> </a:t>
-            </a:r>
-            <a:r>
-              <a:rPr lang="en-CA" sz="2100" dirty="0" err="1" smtClean="0"/>
-              <a:t>plateforme</a:t>
-            </a:r>
-            <a:r>
-              <a:rPr lang="en-CA" sz="2100" dirty="0" smtClean="0"/>
-              <a:t> </a:t>
-            </a:r>
-            <a:r>
-              <a:rPr lang="en-CA" sz="2100" u="sng" dirty="0" smtClean="0">
-                <a:hlinkClick r:id="rId19"/>
-              </a:rPr>
-              <a:t>https</a:t>
-            </a:r>
-            <a:r>
-              <a:rPr lang="en-CA" sz="2100" u="sng" dirty="0">
-                <a:hlinkClick r:id="rId19"/>
-              </a:rPr>
-              <a:t>://www.scalabel.ai/</a:t>
-            </a:r>
-            <a:endParaRPr lang="en-CA" sz="2100" dirty="0" smtClean="0"/>
-          </a:p>
-          <a:p>
-            <a:pPr marL="342900" indent="-342900">
-              <a:buFont typeface="+mj-lt"/>
-              <a:buAutoNum type="arabicPeriod"/>
-            </a:pPr>
-            <a:r>
-              <a:rPr lang="en-CA" sz="2100" dirty="0" err="1" smtClean="0"/>
-              <a:t>Heartex</a:t>
-            </a:r>
-            <a:r>
-              <a:rPr lang="en-CA" sz="2100" dirty="0" smtClean="0"/>
-              <a:t> (Label Studio) </a:t>
-            </a:r>
-            <a:r>
-              <a:rPr lang="en-CA" sz="2100" dirty="0" err="1" smtClean="0"/>
-              <a:t>gratuit</a:t>
-            </a:r>
-            <a:r>
-              <a:rPr lang="en-CA" sz="2100" dirty="0" smtClean="0"/>
-              <a:t> </a:t>
-            </a:r>
-            <a:r>
-              <a:rPr lang="en-CA" sz="2100" dirty="0" err="1" smtClean="0"/>
-              <a:t>outil</a:t>
-            </a:r>
-            <a:r>
-              <a:rPr lang="en-CA" sz="2100" dirty="0" smtClean="0"/>
-              <a:t> </a:t>
-            </a:r>
-            <a:r>
-              <a:rPr lang="en-CA" sz="2100" u="sng" dirty="0">
-                <a:hlinkClick r:id="rId20"/>
-              </a:rPr>
-              <a:t>https://heartex.com/</a:t>
-            </a:r>
-            <a:endParaRPr lang="en-CA" sz="2100" dirty="0"/>
-          </a:p>
-        </p:txBody>
-      </p:sp>
-      <p:sp>
-        <p:nvSpPr>
-          <p:cNvPr id="2" name="TextBox 1"/>
-          <p:cNvSpPr txBox="1"/>
-          <p:nvPr/>
-        </p:nvSpPr>
-        <p:spPr>
-          <a:xfrm>
-            <a:off x="8966447" y="5473005"/>
-            <a:ext cx="2956264" cy="923330"/>
-          </a:xfrm>
-          <a:prstGeom prst="rect">
-            <a:avLst/>
-          </a:prstGeom>
-        </p:spPr>
-        <p:style>
-          <a:lnRef idx="2">
-            <a:schemeClr val="accent1"/>
-          </a:lnRef>
-          <a:fillRef idx="1">
-            <a:schemeClr val="lt1"/>
-          </a:fillRef>
-          <a:effectRef idx="0">
-            <a:schemeClr val="accent1"/>
-          </a:effectRef>
-          <a:fontRef idx="minor">
-            <a:schemeClr val="dk1"/>
-          </a:fontRef>
-        </p:style>
-        <p:txBody>
-          <a:bodyPr wrap="square" rtlCol="0">
-            <a:spAutoFit/>
-          </a:bodyPr>
-          <a:lstStyle/>
-          <a:p>
-            <a:r>
-              <a:rPr lang="fr-FR" dirty="0" smtClean="0"/>
-              <a:t>+ SIG (</a:t>
-            </a:r>
-            <a:r>
-              <a:rPr lang="fr-FR" dirty="0" err="1" smtClean="0"/>
-              <a:t>ArcGIS</a:t>
-            </a:r>
-            <a:r>
-              <a:rPr lang="fr-FR" dirty="0" smtClean="0"/>
-              <a:t>, QGIS, </a:t>
-            </a:r>
-            <a:r>
-              <a:rPr lang="fr-FR" dirty="0" err="1" smtClean="0"/>
-              <a:t>etc</a:t>
-            </a:r>
-            <a:r>
-              <a:rPr lang="fr-FR" dirty="0" smtClean="0"/>
-              <a:t>)</a:t>
-            </a:r>
-          </a:p>
-          <a:p>
-            <a:r>
-              <a:rPr lang="fr-FR" dirty="0" smtClean="0"/>
-              <a:t>+ </a:t>
-            </a:r>
-            <a:r>
-              <a:rPr lang="fr-FR" dirty="0" err="1" smtClean="0"/>
-              <a:t>usual</a:t>
-            </a:r>
-            <a:r>
-              <a:rPr lang="fr-FR" dirty="0" smtClean="0"/>
-              <a:t> image manipulation </a:t>
-            </a:r>
-            <a:r>
-              <a:rPr lang="fr-FR" dirty="0" err="1" smtClean="0"/>
-              <a:t>tools</a:t>
-            </a:r>
-            <a:r>
-              <a:rPr lang="fr-FR" dirty="0" smtClean="0"/>
-              <a:t> (</a:t>
-            </a:r>
-            <a:r>
-              <a:rPr lang="fr-FR" dirty="0" err="1" smtClean="0"/>
-              <a:t>Gimp</a:t>
-            </a:r>
-            <a:r>
-              <a:rPr lang="fr-FR" dirty="0" smtClean="0"/>
-              <a:t>, </a:t>
-            </a:r>
-            <a:r>
-              <a:rPr lang="fr-FR" dirty="0" err="1" smtClean="0"/>
-              <a:t>etc</a:t>
-            </a:r>
-            <a:r>
-              <a:rPr lang="fr-FR" smtClean="0"/>
-              <a:t>)</a:t>
-            </a:r>
-            <a:endParaRPr lang="en-CA" dirty="0"/>
-          </a:p>
-        </p:txBody>
-      </p:sp>
-    </p:spTree>
-    <p:extLst>
-      <p:ext uri="{BB962C8B-B14F-4D97-AF65-F5344CB8AC3E}">
-        <p14:creationId xmlns:p14="http://schemas.microsoft.com/office/powerpoint/2010/main" val="876564909"/>
       </p:ext>
     </p:extLst>
   </p:cSld>

</xml_diff>

<commit_message>
update segmentation annotation tool
</commit_message>
<xml_diff>
--- a/doc/Outils annotation mask segmentation 2021 Vincent Le Falher.pptx
+++ b/doc/Outils annotation mask segmentation 2021 Vincent Le Falher.pptx
@@ -1,3 +1,120 @@
+
+<file path=ppt/presentation.xml><?xml version="1.0" encoding="utf-8"?>
+<p:presentation xmlns:a="http://schemas.openxmlformats.org/drawingml/2006/main" xmlns:r="http://schemas.openxmlformats.org/officeDocument/2006/relationships" xmlns:p="http://schemas.openxmlformats.org/presentationml/2006/main" saveSubsetFonts="1">
+  <p:sldMasterIdLst>
+    <p:sldMasterId id="2147483648" r:id="rId1"/>
+  </p:sldMasterIdLst>
+  <p:sldIdLst>
+    <p:sldId id="256" r:id="rId2"/>
+    <p:sldId id="257" r:id="rId3"/>
+    <p:sldId id="258" r:id="rId4"/>
+    <p:sldId id="259" r:id="rId5"/>
+    <p:sldId id="260" r:id="rId6"/>
+  </p:sldIdLst>
+  <p:sldSz cx="12192000" cy="6858000"/>
+  <p:notesSz cx="6858000" cy="9144000"/>
+  <p:defaultTextStyle>
+    <a:defPPr>
+      <a:defRPr lang="en-US"/>
+    </a:defPPr>
+    <a:lvl1pPr marL="0" algn="l" defTabSz="914400" rtl="0" eaLnBrk="1" latinLnBrk="0" hangingPunct="1">
+      <a:defRPr sz="1800" kern="1200">
+        <a:solidFill>
+          <a:schemeClr val="tx1"/>
+        </a:solidFill>
+        <a:latin typeface="+mn-lt"/>
+        <a:ea typeface="+mn-ea"/>
+        <a:cs typeface="+mn-cs"/>
+      </a:defRPr>
+    </a:lvl1pPr>
+    <a:lvl2pPr marL="457200" algn="l" defTabSz="914400" rtl="0" eaLnBrk="1" latinLnBrk="0" hangingPunct="1">
+      <a:defRPr sz="1800" kern="1200">
+        <a:solidFill>
+          <a:schemeClr val="tx1"/>
+        </a:solidFill>
+        <a:latin typeface="+mn-lt"/>
+        <a:ea typeface="+mn-ea"/>
+        <a:cs typeface="+mn-cs"/>
+      </a:defRPr>
+    </a:lvl2pPr>
+    <a:lvl3pPr marL="914400" algn="l" defTabSz="914400" rtl="0" eaLnBrk="1" latinLnBrk="0" hangingPunct="1">
+      <a:defRPr sz="1800" kern="1200">
+        <a:solidFill>
+          <a:schemeClr val="tx1"/>
+        </a:solidFill>
+        <a:latin typeface="+mn-lt"/>
+        <a:ea typeface="+mn-ea"/>
+        <a:cs typeface="+mn-cs"/>
+      </a:defRPr>
+    </a:lvl3pPr>
+    <a:lvl4pPr marL="1371600" algn="l" defTabSz="914400" rtl="0" eaLnBrk="1" latinLnBrk="0" hangingPunct="1">
+      <a:defRPr sz="1800" kern="1200">
+        <a:solidFill>
+          <a:schemeClr val="tx1"/>
+        </a:solidFill>
+        <a:latin typeface="+mn-lt"/>
+        <a:ea typeface="+mn-ea"/>
+        <a:cs typeface="+mn-cs"/>
+      </a:defRPr>
+    </a:lvl4pPr>
+    <a:lvl5pPr marL="1828800" algn="l" defTabSz="914400" rtl="0" eaLnBrk="1" latinLnBrk="0" hangingPunct="1">
+      <a:defRPr sz="1800" kern="1200">
+        <a:solidFill>
+          <a:schemeClr val="tx1"/>
+        </a:solidFill>
+        <a:latin typeface="+mn-lt"/>
+        <a:ea typeface="+mn-ea"/>
+        <a:cs typeface="+mn-cs"/>
+      </a:defRPr>
+    </a:lvl5pPr>
+    <a:lvl6pPr marL="2286000" algn="l" defTabSz="914400" rtl="0" eaLnBrk="1" latinLnBrk="0" hangingPunct="1">
+      <a:defRPr sz="1800" kern="1200">
+        <a:solidFill>
+          <a:schemeClr val="tx1"/>
+        </a:solidFill>
+        <a:latin typeface="+mn-lt"/>
+        <a:ea typeface="+mn-ea"/>
+        <a:cs typeface="+mn-cs"/>
+      </a:defRPr>
+    </a:lvl6pPr>
+    <a:lvl7pPr marL="2743200" algn="l" defTabSz="914400" rtl="0" eaLnBrk="1" latinLnBrk="0" hangingPunct="1">
+      <a:defRPr sz="1800" kern="1200">
+        <a:solidFill>
+          <a:schemeClr val="tx1"/>
+        </a:solidFill>
+        <a:latin typeface="+mn-lt"/>
+        <a:ea typeface="+mn-ea"/>
+        <a:cs typeface="+mn-cs"/>
+      </a:defRPr>
+    </a:lvl7pPr>
+    <a:lvl8pPr marL="3200400" algn="l" defTabSz="914400" rtl="0" eaLnBrk="1" latinLnBrk="0" hangingPunct="1">
+      <a:defRPr sz="1800" kern="1200">
+        <a:solidFill>
+          <a:schemeClr val="tx1"/>
+        </a:solidFill>
+        <a:latin typeface="+mn-lt"/>
+        <a:ea typeface="+mn-ea"/>
+        <a:cs typeface="+mn-cs"/>
+      </a:defRPr>
+    </a:lvl8pPr>
+    <a:lvl9pPr marL="3657600" algn="l" defTabSz="914400" rtl="0" eaLnBrk="1" latinLnBrk="0" hangingPunct="1">
+      <a:defRPr sz="1800" kern="1200">
+        <a:solidFill>
+          <a:schemeClr val="tx1"/>
+        </a:solidFill>
+        <a:latin typeface="+mn-lt"/>
+        <a:ea typeface="+mn-ea"/>
+        <a:cs typeface="+mn-cs"/>
+      </a:defRPr>
+    </a:lvl9pPr>
+  </p:defaultTextStyle>
+  <p:extLst>
+    <p:ext uri="{EFAFB233-063F-42B5-8137-9DF3F51BA10A}">
+      <p15:sldGuideLst xmlns:p15="http://schemas.microsoft.com/office/powerpoint/2012/main"/>
+    </p:ext>
+  </p:extLst>
+</p:presentation>
+</file>
 
 <file path=ppt/slideLayouts/slideLayout1.xml><?xml version="1.0" encoding="utf-8"?>
 <p:sldLayout xmlns:a="http://schemas.openxmlformats.org/drawingml/2006/main" xmlns:r="http://schemas.openxmlformats.org/officeDocument/2006/relationships" xmlns:p="http://schemas.openxmlformats.org/presentationml/2006/main" type="title" preserve="1">
@@ -41,7 +158,7 @@
           </a:lstStyle>
           <a:p>
             <a:r>
-              <a:rPr lang="en-US" smtClean="0"/>
+              <a:rPr lang="en-US"/>
               <a:t>Click to edit Master title style</a:t>
             </a:r>
             <a:endParaRPr lang="en-CA"/>
@@ -106,7 +223,7 @@
           </a:lstStyle>
           <a:p>
             <a:r>
-              <a:rPr lang="en-US" smtClean="0"/>
+              <a:rPr lang="en-US"/>
               <a:t>Click to edit Master subtitle style</a:t>
             </a:r>
             <a:endParaRPr lang="en-CA"/>
@@ -130,7 +247,7 @@
           <a:p>
             <a:fld id="{51A424E1-37B2-4E45-9E9E-60517E7AE482}" type="datetimeFigureOut">
               <a:rPr lang="en-CA" smtClean="0"/>
-              <a:t>2021-07-07</a:t>
+              <a:t>2022-03-25</a:t>
             </a:fld>
             <a:endParaRPr lang="en-CA"/>
           </a:p>
@@ -172,7 +289,7 @@
           <a:p>
             <a:fld id="{94CD3ECE-4AE2-416D-8B90-70E208BDF6AB}" type="slidenum">
               <a:rPr lang="en-CA" smtClean="0"/>
-              <a:t>‹#›</a:t>
+              <a:t>‹N°›</a:t>
             </a:fld>
             <a:endParaRPr lang="en-CA"/>
           </a:p>
@@ -224,7 +341,7 @@
           <a:lstStyle/>
           <a:p>
             <a:r>
-              <a:rPr lang="en-US" smtClean="0"/>
+              <a:rPr lang="en-US"/>
               <a:t>Click to edit Master title style</a:t>
             </a:r>
             <a:endParaRPr lang="en-CA"/>
@@ -248,35 +365,35 @@
           <a:p>
             <a:pPr lvl="0"/>
             <a:r>
-              <a:rPr lang="en-US" smtClean="0"/>
+              <a:rPr lang="en-US"/>
               <a:t>Edit Master text styles</a:t>
             </a:r>
           </a:p>
           <a:p>
             <a:pPr lvl="1"/>
             <a:r>
-              <a:rPr lang="en-US" smtClean="0"/>
+              <a:rPr lang="en-US"/>
               <a:t>Second level</a:t>
             </a:r>
           </a:p>
           <a:p>
             <a:pPr lvl="2"/>
             <a:r>
-              <a:rPr lang="en-US" smtClean="0"/>
+              <a:rPr lang="en-US"/>
               <a:t>Third level</a:t>
             </a:r>
           </a:p>
           <a:p>
             <a:pPr lvl="3"/>
             <a:r>
-              <a:rPr lang="en-US" smtClean="0"/>
+              <a:rPr lang="en-US"/>
               <a:t>Fourth level</a:t>
             </a:r>
           </a:p>
           <a:p>
             <a:pPr lvl="4"/>
             <a:r>
-              <a:rPr lang="en-US" smtClean="0"/>
+              <a:rPr lang="en-US"/>
               <a:t>Fifth level</a:t>
             </a:r>
             <a:endParaRPr lang="en-CA"/>
@@ -300,7 +417,7 @@
           <a:p>
             <a:fld id="{51A424E1-37B2-4E45-9E9E-60517E7AE482}" type="datetimeFigureOut">
               <a:rPr lang="en-CA" smtClean="0"/>
-              <a:t>2021-07-07</a:t>
+              <a:t>2022-03-25</a:t>
             </a:fld>
             <a:endParaRPr lang="en-CA"/>
           </a:p>
@@ -342,7 +459,7 @@
           <a:p>
             <a:fld id="{94CD3ECE-4AE2-416D-8B90-70E208BDF6AB}" type="slidenum">
               <a:rPr lang="en-CA" smtClean="0"/>
-              <a:t>‹#›</a:t>
+              <a:t>‹N°›</a:t>
             </a:fld>
             <a:endParaRPr lang="en-CA"/>
           </a:p>
@@ -399,7 +516,7 @@
           <a:lstStyle/>
           <a:p>
             <a:r>
-              <a:rPr lang="en-US" smtClean="0"/>
+              <a:rPr lang="en-US"/>
               <a:t>Click to edit Master title style</a:t>
             </a:r>
             <a:endParaRPr lang="en-CA"/>
@@ -428,35 +545,35 @@
           <a:p>
             <a:pPr lvl="0"/>
             <a:r>
-              <a:rPr lang="en-US" smtClean="0"/>
+              <a:rPr lang="en-US"/>
               <a:t>Edit Master text styles</a:t>
             </a:r>
           </a:p>
           <a:p>
             <a:pPr lvl="1"/>
             <a:r>
-              <a:rPr lang="en-US" smtClean="0"/>
+              <a:rPr lang="en-US"/>
               <a:t>Second level</a:t>
             </a:r>
           </a:p>
           <a:p>
             <a:pPr lvl="2"/>
             <a:r>
-              <a:rPr lang="en-US" smtClean="0"/>
+              <a:rPr lang="en-US"/>
               <a:t>Third level</a:t>
             </a:r>
           </a:p>
           <a:p>
             <a:pPr lvl="3"/>
             <a:r>
-              <a:rPr lang="en-US" smtClean="0"/>
+              <a:rPr lang="en-US"/>
               <a:t>Fourth level</a:t>
             </a:r>
           </a:p>
           <a:p>
             <a:pPr lvl="4"/>
             <a:r>
-              <a:rPr lang="en-US" smtClean="0"/>
+              <a:rPr lang="en-US"/>
               <a:t>Fifth level</a:t>
             </a:r>
             <a:endParaRPr lang="en-CA"/>
@@ -480,7 +597,7 @@
           <a:p>
             <a:fld id="{51A424E1-37B2-4E45-9E9E-60517E7AE482}" type="datetimeFigureOut">
               <a:rPr lang="en-CA" smtClean="0"/>
-              <a:t>2021-07-07</a:t>
+              <a:t>2022-03-25</a:t>
             </a:fld>
             <a:endParaRPr lang="en-CA"/>
           </a:p>
@@ -522,7 +639,7 @@
           <a:p>
             <a:fld id="{94CD3ECE-4AE2-416D-8B90-70E208BDF6AB}" type="slidenum">
               <a:rPr lang="en-CA" smtClean="0"/>
-              <a:t>‹#›</a:t>
+              <a:t>‹N°›</a:t>
             </a:fld>
             <a:endParaRPr lang="en-CA"/>
           </a:p>
@@ -574,7 +691,7 @@
           <a:lstStyle/>
           <a:p>
             <a:r>
-              <a:rPr lang="en-US" smtClean="0"/>
+              <a:rPr lang="en-US"/>
               <a:t>Click to edit Master title style</a:t>
             </a:r>
             <a:endParaRPr lang="en-CA"/>
@@ -598,35 +715,35 @@
           <a:p>
             <a:pPr lvl="0"/>
             <a:r>
-              <a:rPr lang="en-US" smtClean="0"/>
+              <a:rPr lang="en-US"/>
               <a:t>Edit Master text styles</a:t>
             </a:r>
           </a:p>
           <a:p>
             <a:pPr lvl="1"/>
             <a:r>
-              <a:rPr lang="en-US" smtClean="0"/>
+              <a:rPr lang="en-US"/>
               <a:t>Second level</a:t>
             </a:r>
           </a:p>
           <a:p>
             <a:pPr lvl="2"/>
             <a:r>
-              <a:rPr lang="en-US" smtClean="0"/>
+              <a:rPr lang="en-US"/>
               <a:t>Third level</a:t>
             </a:r>
           </a:p>
           <a:p>
             <a:pPr lvl="3"/>
             <a:r>
-              <a:rPr lang="en-US" smtClean="0"/>
+              <a:rPr lang="en-US"/>
               <a:t>Fourth level</a:t>
             </a:r>
           </a:p>
           <a:p>
             <a:pPr lvl="4"/>
             <a:r>
-              <a:rPr lang="en-US" smtClean="0"/>
+              <a:rPr lang="en-US"/>
               <a:t>Fifth level</a:t>
             </a:r>
             <a:endParaRPr lang="en-CA"/>
@@ -650,7 +767,7 @@
           <a:p>
             <a:fld id="{51A424E1-37B2-4E45-9E9E-60517E7AE482}" type="datetimeFigureOut">
               <a:rPr lang="en-CA" smtClean="0"/>
-              <a:t>2021-07-07</a:t>
+              <a:t>2022-03-25</a:t>
             </a:fld>
             <a:endParaRPr lang="en-CA"/>
           </a:p>
@@ -692,7 +809,7 @@
           <a:p>
             <a:fld id="{94CD3ECE-4AE2-416D-8B90-70E208BDF6AB}" type="slidenum">
               <a:rPr lang="en-CA" smtClean="0"/>
-              <a:t>‹#›</a:t>
+              <a:t>‹N°›</a:t>
             </a:fld>
             <a:endParaRPr lang="en-CA"/>
           </a:p>
@@ -753,7 +870,7 @@
           </a:lstStyle>
           <a:p>
             <a:r>
-              <a:rPr lang="en-US" smtClean="0"/>
+              <a:rPr lang="en-US"/>
               <a:t>Click to edit Master title style</a:t>
             </a:r>
             <a:endParaRPr lang="en-CA"/>
@@ -873,7 +990,7 @@
           <a:p>
             <a:pPr lvl="0"/>
             <a:r>
-              <a:rPr lang="en-US" smtClean="0"/>
+              <a:rPr lang="en-US"/>
               <a:t>Edit Master text styles</a:t>
             </a:r>
           </a:p>
@@ -896,7 +1013,7 @@
           <a:p>
             <a:fld id="{51A424E1-37B2-4E45-9E9E-60517E7AE482}" type="datetimeFigureOut">
               <a:rPr lang="en-CA" smtClean="0"/>
-              <a:t>2021-07-07</a:t>
+              <a:t>2022-03-25</a:t>
             </a:fld>
             <a:endParaRPr lang="en-CA"/>
           </a:p>
@@ -938,7 +1055,7 @@
           <a:p>
             <a:fld id="{94CD3ECE-4AE2-416D-8B90-70E208BDF6AB}" type="slidenum">
               <a:rPr lang="en-CA" smtClean="0"/>
-              <a:t>‹#›</a:t>
+              <a:t>‹N°›</a:t>
             </a:fld>
             <a:endParaRPr lang="en-CA"/>
           </a:p>
@@ -990,7 +1107,7 @@
           <a:lstStyle/>
           <a:p>
             <a:r>
-              <a:rPr lang="en-US" smtClean="0"/>
+              <a:rPr lang="en-US"/>
               <a:t>Click to edit Master title style</a:t>
             </a:r>
             <a:endParaRPr lang="en-CA"/>
@@ -1019,35 +1136,35 @@
           <a:p>
             <a:pPr lvl="0"/>
             <a:r>
-              <a:rPr lang="en-US" smtClean="0"/>
+              <a:rPr lang="en-US"/>
               <a:t>Edit Master text styles</a:t>
             </a:r>
           </a:p>
           <a:p>
             <a:pPr lvl="1"/>
             <a:r>
-              <a:rPr lang="en-US" smtClean="0"/>
+              <a:rPr lang="en-US"/>
               <a:t>Second level</a:t>
             </a:r>
           </a:p>
           <a:p>
             <a:pPr lvl="2"/>
             <a:r>
-              <a:rPr lang="en-US" smtClean="0"/>
+              <a:rPr lang="en-US"/>
               <a:t>Third level</a:t>
             </a:r>
           </a:p>
           <a:p>
             <a:pPr lvl="3"/>
             <a:r>
-              <a:rPr lang="en-US" smtClean="0"/>
+              <a:rPr lang="en-US"/>
               <a:t>Fourth level</a:t>
             </a:r>
           </a:p>
           <a:p>
             <a:pPr lvl="4"/>
             <a:r>
-              <a:rPr lang="en-US" smtClean="0"/>
+              <a:rPr lang="en-US"/>
               <a:t>Fifth level</a:t>
             </a:r>
             <a:endParaRPr lang="en-CA"/>
@@ -1076,35 +1193,35 @@
           <a:p>
             <a:pPr lvl="0"/>
             <a:r>
-              <a:rPr lang="en-US" smtClean="0"/>
+              <a:rPr lang="en-US"/>
               <a:t>Edit Master text styles</a:t>
             </a:r>
           </a:p>
           <a:p>
             <a:pPr lvl="1"/>
             <a:r>
-              <a:rPr lang="en-US" smtClean="0"/>
+              <a:rPr lang="en-US"/>
               <a:t>Second level</a:t>
             </a:r>
           </a:p>
           <a:p>
             <a:pPr lvl="2"/>
             <a:r>
-              <a:rPr lang="en-US" smtClean="0"/>
+              <a:rPr lang="en-US"/>
               <a:t>Third level</a:t>
             </a:r>
           </a:p>
           <a:p>
             <a:pPr lvl="3"/>
             <a:r>
-              <a:rPr lang="en-US" smtClean="0"/>
+              <a:rPr lang="en-US"/>
               <a:t>Fourth level</a:t>
             </a:r>
           </a:p>
           <a:p>
             <a:pPr lvl="4"/>
             <a:r>
-              <a:rPr lang="en-US" smtClean="0"/>
+              <a:rPr lang="en-US"/>
               <a:t>Fifth level</a:t>
             </a:r>
             <a:endParaRPr lang="en-CA"/>
@@ -1128,7 +1245,7 @@
           <a:p>
             <a:fld id="{51A424E1-37B2-4E45-9E9E-60517E7AE482}" type="datetimeFigureOut">
               <a:rPr lang="en-CA" smtClean="0"/>
-              <a:t>2021-07-07</a:t>
+              <a:t>2022-03-25</a:t>
             </a:fld>
             <a:endParaRPr lang="en-CA"/>
           </a:p>
@@ -1170,7 +1287,7 @@
           <a:p>
             <a:fld id="{94CD3ECE-4AE2-416D-8B90-70E208BDF6AB}" type="slidenum">
               <a:rPr lang="en-CA" smtClean="0"/>
-              <a:t>‹#›</a:t>
+              <a:t>‹N°›</a:t>
             </a:fld>
             <a:endParaRPr lang="en-CA"/>
           </a:p>
@@ -1227,7 +1344,7 @@
           <a:lstStyle/>
           <a:p>
             <a:r>
-              <a:rPr lang="en-US" smtClean="0"/>
+              <a:rPr lang="en-US"/>
               <a:t>Click to edit Master title style</a:t>
             </a:r>
             <a:endParaRPr lang="en-CA"/>
@@ -1293,7 +1410,7 @@
           <a:p>
             <a:pPr lvl="0"/>
             <a:r>
-              <a:rPr lang="en-US" smtClean="0"/>
+              <a:rPr lang="en-US"/>
               <a:t>Edit Master text styles</a:t>
             </a:r>
           </a:p>
@@ -1321,35 +1438,35 @@
           <a:p>
             <a:pPr lvl="0"/>
             <a:r>
-              <a:rPr lang="en-US" smtClean="0"/>
+              <a:rPr lang="en-US"/>
               <a:t>Edit Master text styles</a:t>
             </a:r>
           </a:p>
           <a:p>
             <a:pPr lvl="1"/>
             <a:r>
-              <a:rPr lang="en-US" smtClean="0"/>
+              <a:rPr lang="en-US"/>
               <a:t>Second level</a:t>
             </a:r>
           </a:p>
           <a:p>
             <a:pPr lvl="2"/>
             <a:r>
-              <a:rPr lang="en-US" smtClean="0"/>
+              <a:rPr lang="en-US"/>
               <a:t>Third level</a:t>
             </a:r>
           </a:p>
           <a:p>
             <a:pPr lvl="3"/>
             <a:r>
-              <a:rPr lang="en-US" smtClean="0"/>
+              <a:rPr lang="en-US"/>
               <a:t>Fourth level</a:t>
             </a:r>
           </a:p>
           <a:p>
             <a:pPr lvl="4"/>
             <a:r>
-              <a:rPr lang="en-US" smtClean="0"/>
+              <a:rPr lang="en-US"/>
               <a:t>Fifth level</a:t>
             </a:r>
             <a:endParaRPr lang="en-CA"/>
@@ -1415,7 +1532,7 @@
           <a:p>
             <a:pPr lvl="0"/>
             <a:r>
-              <a:rPr lang="en-US" smtClean="0"/>
+              <a:rPr lang="en-US"/>
               <a:t>Edit Master text styles</a:t>
             </a:r>
           </a:p>
@@ -1443,35 +1560,35 @@
           <a:p>
             <a:pPr lvl="0"/>
             <a:r>
-              <a:rPr lang="en-US" smtClean="0"/>
+              <a:rPr lang="en-US"/>
               <a:t>Edit Master text styles</a:t>
             </a:r>
           </a:p>
           <a:p>
             <a:pPr lvl="1"/>
             <a:r>
-              <a:rPr lang="en-US" smtClean="0"/>
+              <a:rPr lang="en-US"/>
               <a:t>Second level</a:t>
             </a:r>
           </a:p>
           <a:p>
             <a:pPr lvl="2"/>
             <a:r>
-              <a:rPr lang="en-US" smtClean="0"/>
+              <a:rPr lang="en-US"/>
               <a:t>Third level</a:t>
             </a:r>
           </a:p>
           <a:p>
             <a:pPr lvl="3"/>
             <a:r>
-              <a:rPr lang="en-US" smtClean="0"/>
+              <a:rPr lang="en-US"/>
               <a:t>Fourth level</a:t>
             </a:r>
           </a:p>
           <a:p>
             <a:pPr lvl="4"/>
             <a:r>
-              <a:rPr lang="en-US" smtClean="0"/>
+              <a:rPr lang="en-US"/>
               <a:t>Fifth level</a:t>
             </a:r>
             <a:endParaRPr lang="en-CA"/>
@@ -1495,7 +1612,7 @@
           <a:p>
             <a:fld id="{51A424E1-37B2-4E45-9E9E-60517E7AE482}" type="datetimeFigureOut">
               <a:rPr lang="en-CA" smtClean="0"/>
-              <a:t>2021-07-07</a:t>
+              <a:t>2022-03-25</a:t>
             </a:fld>
             <a:endParaRPr lang="en-CA"/>
           </a:p>
@@ -1537,7 +1654,7 @@
           <a:p>
             <a:fld id="{94CD3ECE-4AE2-416D-8B90-70E208BDF6AB}" type="slidenum">
               <a:rPr lang="en-CA" smtClean="0"/>
-              <a:t>‹#›</a:t>
+              <a:t>‹N°›</a:t>
             </a:fld>
             <a:endParaRPr lang="en-CA"/>
           </a:p>
@@ -1589,7 +1706,7 @@
           <a:lstStyle/>
           <a:p>
             <a:r>
-              <a:rPr lang="en-US" smtClean="0"/>
+              <a:rPr lang="en-US"/>
               <a:t>Click to edit Master title style</a:t>
             </a:r>
             <a:endParaRPr lang="en-CA"/>
@@ -1613,7 +1730,7 @@
           <a:p>
             <a:fld id="{51A424E1-37B2-4E45-9E9E-60517E7AE482}" type="datetimeFigureOut">
               <a:rPr lang="en-CA" smtClean="0"/>
-              <a:t>2021-07-07</a:t>
+              <a:t>2022-03-25</a:t>
             </a:fld>
             <a:endParaRPr lang="en-CA"/>
           </a:p>
@@ -1655,7 +1772,7 @@
           <a:p>
             <a:fld id="{94CD3ECE-4AE2-416D-8B90-70E208BDF6AB}" type="slidenum">
               <a:rPr lang="en-CA" smtClean="0"/>
-              <a:t>‹#›</a:t>
+              <a:t>‹N°›</a:t>
             </a:fld>
             <a:endParaRPr lang="en-CA"/>
           </a:p>
@@ -1708,7 +1825,7 @@
           <a:p>
             <a:fld id="{51A424E1-37B2-4E45-9E9E-60517E7AE482}" type="datetimeFigureOut">
               <a:rPr lang="en-CA" smtClean="0"/>
-              <a:t>2021-07-07</a:t>
+              <a:t>2022-03-25</a:t>
             </a:fld>
             <a:endParaRPr lang="en-CA"/>
           </a:p>
@@ -1750,7 +1867,7 @@
           <a:p>
             <a:fld id="{94CD3ECE-4AE2-416D-8B90-70E208BDF6AB}" type="slidenum">
               <a:rPr lang="en-CA" smtClean="0"/>
-              <a:t>‹#›</a:t>
+              <a:t>‹N°›</a:t>
             </a:fld>
             <a:endParaRPr lang="en-CA"/>
           </a:p>
@@ -1811,7 +1928,7 @@
           </a:lstStyle>
           <a:p>
             <a:r>
-              <a:rPr lang="en-US" smtClean="0"/>
+              <a:rPr lang="en-US"/>
               <a:t>Click to edit Master title style</a:t>
             </a:r>
             <a:endParaRPr lang="en-CA"/>
@@ -1868,35 +1985,35 @@
           <a:p>
             <a:pPr lvl="0"/>
             <a:r>
-              <a:rPr lang="en-US" smtClean="0"/>
+              <a:rPr lang="en-US"/>
               <a:t>Edit Master text styles</a:t>
             </a:r>
           </a:p>
           <a:p>
             <a:pPr lvl="1"/>
             <a:r>
-              <a:rPr lang="en-US" smtClean="0"/>
+              <a:rPr lang="en-US"/>
               <a:t>Second level</a:t>
             </a:r>
           </a:p>
           <a:p>
             <a:pPr lvl="2"/>
             <a:r>
-              <a:rPr lang="en-US" smtClean="0"/>
+              <a:rPr lang="en-US"/>
               <a:t>Third level</a:t>
             </a:r>
           </a:p>
           <a:p>
             <a:pPr lvl="3"/>
             <a:r>
-              <a:rPr lang="en-US" smtClean="0"/>
+              <a:rPr lang="en-US"/>
               <a:t>Fourth level</a:t>
             </a:r>
           </a:p>
           <a:p>
             <a:pPr lvl="4"/>
             <a:r>
-              <a:rPr lang="en-US" smtClean="0"/>
+              <a:rPr lang="en-US"/>
               <a:t>Fifth level</a:t>
             </a:r>
             <a:endParaRPr lang="en-CA"/>
@@ -1962,7 +2079,7 @@
           <a:p>
             <a:pPr lvl="0"/>
             <a:r>
-              <a:rPr lang="en-US" smtClean="0"/>
+              <a:rPr lang="en-US"/>
               <a:t>Edit Master text styles</a:t>
             </a:r>
           </a:p>
@@ -1985,7 +2102,7 @@
           <a:p>
             <a:fld id="{51A424E1-37B2-4E45-9E9E-60517E7AE482}" type="datetimeFigureOut">
               <a:rPr lang="en-CA" smtClean="0"/>
-              <a:t>2021-07-07</a:t>
+              <a:t>2022-03-25</a:t>
             </a:fld>
             <a:endParaRPr lang="en-CA"/>
           </a:p>
@@ -2027,7 +2144,7 @@
           <a:p>
             <a:fld id="{94CD3ECE-4AE2-416D-8B90-70E208BDF6AB}" type="slidenum">
               <a:rPr lang="en-CA" smtClean="0"/>
-              <a:t>‹#›</a:t>
+              <a:t>‹N°›</a:t>
             </a:fld>
             <a:endParaRPr lang="en-CA"/>
           </a:p>
@@ -2088,7 +2205,7 @@
           </a:lstStyle>
           <a:p>
             <a:r>
-              <a:rPr lang="en-US" smtClean="0"/>
+              <a:rPr lang="en-US"/>
               <a:t>Click to edit Master title style</a:t>
             </a:r>
             <a:endParaRPr lang="en-CA"/>
@@ -2215,7 +2332,7 @@
           <a:p>
             <a:pPr lvl="0"/>
             <a:r>
-              <a:rPr lang="en-US" smtClean="0"/>
+              <a:rPr lang="en-US"/>
               <a:t>Edit Master text styles</a:t>
             </a:r>
           </a:p>
@@ -2238,7 +2355,7 @@
           <a:p>
             <a:fld id="{51A424E1-37B2-4E45-9E9E-60517E7AE482}" type="datetimeFigureOut">
               <a:rPr lang="en-CA" smtClean="0"/>
-              <a:t>2021-07-07</a:t>
+              <a:t>2022-03-25</a:t>
             </a:fld>
             <a:endParaRPr lang="en-CA"/>
           </a:p>
@@ -2280,7 +2397,7 @@
           <a:p>
             <a:fld id="{94CD3ECE-4AE2-416D-8B90-70E208BDF6AB}" type="slidenum">
               <a:rPr lang="en-CA" smtClean="0"/>
-              <a:t>‹#›</a:t>
+              <a:t>‹N°›</a:t>
             </a:fld>
             <a:endParaRPr lang="en-CA"/>
           </a:p>
@@ -2347,7 +2464,7 @@
           <a:lstStyle/>
           <a:p>
             <a:r>
-              <a:rPr lang="en-US" smtClean="0"/>
+              <a:rPr lang="en-US"/>
               <a:t>Click to edit Master title style</a:t>
             </a:r>
             <a:endParaRPr lang="en-CA"/>
@@ -2381,35 +2498,35 @@
           <a:p>
             <a:pPr lvl="0"/>
             <a:r>
-              <a:rPr lang="en-US" smtClean="0"/>
+              <a:rPr lang="en-US"/>
               <a:t>Edit Master text styles</a:t>
             </a:r>
           </a:p>
           <a:p>
             <a:pPr lvl="1"/>
             <a:r>
-              <a:rPr lang="en-US" smtClean="0"/>
+              <a:rPr lang="en-US"/>
               <a:t>Second level</a:t>
             </a:r>
           </a:p>
           <a:p>
             <a:pPr lvl="2"/>
             <a:r>
-              <a:rPr lang="en-US" smtClean="0"/>
+              <a:rPr lang="en-US"/>
               <a:t>Third level</a:t>
             </a:r>
           </a:p>
           <a:p>
             <a:pPr lvl="3"/>
             <a:r>
-              <a:rPr lang="en-US" smtClean="0"/>
+              <a:rPr lang="en-US"/>
               <a:t>Fourth level</a:t>
             </a:r>
           </a:p>
           <a:p>
             <a:pPr lvl="4"/>
             <a:r>
-              <a:rPr lang="en-US" smtClean="0"/>
+              <a:rPr lang="en-US"/>
               <a:t>Fifth level</a:t>
             </a:r>
             <a:endParaRPr lang="en-CA"/>
@@ -2451,7 +2568,7 @@
           <a:p>
             <a:fld id="{51A424E1-37B2-4E45-9E9E-60517E7AE482}" type="datetimeFigureOut">
               <a:rPr lang="en-CA" smtClean="0"/>
-              <a:t>2021-07-07</a:t>
+              <a:t>2022-03-25</a:t>
             </a:fld>
             <a:endParaRPr lang="en-CA"/>
           </a:p>
@@ -2529,7 +2646,7 @@
           <a:p>
             <a:fld id="{94CD3ECE-4AE2-416D-8B90-70E208BDF6AB}" type="slidenum">
               <a:rPr lang="en-CA" smtClean="0"/>
-              <a:t>‹#›</a:t>
+              <a:t>‹N°›</a:t>
             </a:fld>
             <a:endParaRPr lang="en-CA"/>
           </a:p>
@@ -2839,6 +2956,549 @@
 </p:sldMaster>
 </file>
 
+<file path=ppt/slides/slide1.xml><?xml version="1.0" encoding="utf-8"?>
+<p:sld xmlns:a="http://schemas.openxmlformats.org/drawingml/2006/main" xmlns:r="http://schemas.openxmlformats.org/officeDocument/2006/relationships" xmlns:p="http://schemas.openxmlformats.org/presentationml/2006/main">
+  <p:cSld>
+    <p:spTree>
+      <p:nvGrpSpPr>
+        <p:cNvPr id="1" name=""/>
+        <p:cNvGrpSpPr/>
+        <p:nvPr/>
+      </p:nvGrpSpPr>
+      <p:grpSpPr>
+        <a:xfrm>
+          <a:off x="0" y="0"/>
+          <a:ext cx="0" cy="0"/>
+          <a:chOff x="0" y="0"/>
+          <a:chExt cx="0" cy="0"/>
+        </a:xfrm>
+      </p:grpSpPr>
+      <p:sp>
+        <p:nvSpPr>
+          <p:cNvPr id="2" name="Title 1"/>
+          <p:cNvSpPr>
+            <a:spLocks noGrp="1"/>
+          </p:cNvSpPr>
+          <p:nvPr>
+            <p:ph type="ctrTitle"/>
+            <p:custDataLst>
+              <p:tags r:id="rId1"/>
+            </p:custDataLst>
+          </p:nvPr>
+        </p:nvSpPr>
+        <p:spPr>
+          <a:xfrm>
+            <a:off x="1524000" y="603682"/>
+            <a:ext cx="9144000" cy="3231471"/>
+          </a:xfrm>
+        </p:spPr>
+        <p:txBody>
+          <a:bodyPr>
+            <a:normAutofit fontScale="90000"/>
+          </a:bodyPr>
+          <a:lstStyle/>
+          <a:p>
+            <a:r>
+              <a:rPr lang="fr-FR" dirty="0"/>
+              <a:t>Outils </a:t>
+            </a:r>
+            <a:br>
+              <a:rPr lang="fr-FR" dirty="0"/>
+            </a:br>
+            <a:r>
+              <a:rPr lang="fr-FR" dirty="0"/>
+              <a:t>d’annotation (</a:t>
+            </a:r>
+            <a:r>
+              <a:rPr lang="fr-FR" dirty="0" err="1"/>
+              <a:t>mask</a:t>
+            </a:r>
+            <a:r>
+              <a:rPr lang="fr-FR" dirty="0"/>
+              <a:t>)</a:t>
+            </a:r>
+            <a:br>
+              <a:rPr lang="fr-FR" dirty="0"/>
+            </a:br>
+            <a:r>
+              <a:rPr lang="fr-FR" dirty="0"/>
+              <a:t>Segmentation</a:t>
+            </a:r>
+            <a:br>
+              <a:rPr lang="fr-FR" dirty="0"/>
+            </a:br>
+            <a:r>
+              <a:rPr lang="fr-FR" dirty="0"/>
+              <a:t>pour le Active Learning</a:t>
+            </a:r>
+            <a:endParaRPr lang="en-CA" dirty="0"/>
+          </a:p>
+        </p:txBody>
+      </p:sp>
+      <p:sp>
+        <p:nvSpPr>
+          <p:cNvPr id="3" name="Subtitle 2"/>
+          <p:cNvSpPr>
+            <a:spLocks noGrp="1"/>
+          </p:cNvSpPr>
+          <p:nvPr>
+            <p:ph type="subTitle" idx="1"/>
+            <p:custDataLst>
+              <p:tags r:id="rId2"/>
+            </p:custDataLst>
+          </p:nvPr>
+        </p:nvSpPr>
+        <p:spPr>
+          <a:xfrm>
+            <a:off x="1524000" y="4785064"/>
+            <a:ext cx="9144000" cy="472736"/>
+          </a:xfrm>
+        </p:spPr>
+        <p:txBody>
+          <a:bodyPr/>
+          <a:lstStyle/>
+          <a:p>
+            <a:r>
+              <a:rPr lang="en-CA" dirty="0"/>
+              <a:t>Pixel annotation ground truth</a:t>
+            </a:r>
+          </a:p>
+        </p:txBody>
+      </p:sp>
+      <p:sp>
+        <p:nvSpPr>
+          <p:cNvPr id="4" name="TextBox 3"/>
+          <p:cNvSpPr txBox="1"/>
+          <p:nvPr>
+            <p:custDataLst>
+              <p:tags r:id="rId3"/>
+            </p:custDataLst>
+          </p:nvPr>
+        </p:nvSpPr>
+        <p:spPr>
+          <a:xfrm>
+            <a:off x="9798342" y="5607987"/>
+            <a:ext cx="2030380" cy="646331"/>
+          </a:xfrm>
+          <a:prstGeom prst="rect">
+            <a:avLst/>
+          </a:prstGeom>
+          <a:noFill/>
+        </p:spPr>
+        <p:txBody>
+          <a:bodyPr wrap="square" rtlCol="0">
+            <a:spAutoFit/>
+          </a:bodyPr>
+          <a:lstStyle/>
+          <a:p>
+            <a:r>
+              <a:rPr lang="fr-FR" dirty="0"/>
+              <a:t>Vincent Le Falher </a:t>
+            </a:r>
+          </a:p>
+          <a:p>
+            <a:r>
+              <a:rPr lang="fr-FR" dirty="0"/>
+              <a:t>Vincent L.F. (2021)</a:t>
+            </a:r>
+            <a:endParaRPr lang="en-CA" dirty="0"/>
+          </a:p>
+        </p:txBody>
+      </p:sp>
+    </p:spTree>
+    <p:extLst>
+      <p:ext uri="{BB962C8B-B14F-4D97-AF65-F5344CB8AC3E}">
+        <p14:creationId xmlns:p14="http://schemas.microsoft.com/office/powerpoint/2010/main" val="2468621629"/>
+      </p:ext>
+    </p:extLst>
+  </p:cSld>
+  <p:clrMapOvr>
+    <a:masterClrMapping/>
+  </p:clrMapOvr>
+</p:sld>
+</file>
+
+<file path=ppt/slides/slide2.xml><?xml version="1.0" encoding="utf-8"?>
+<p:sld xmlns:a="http://schemas.openxmlformats.org/drawingml/2006/main" xmlns:r="http://schemas.openxmlformats.org/officeDocument/2006/relationships" xmlns:p="http://schemas.openxmlformats.org/presentationml/2006/main">
+  <p:cSld>
+    <p:spTree>
+      <p:nvGrpSpPr>
+        <p:cNvPr id="1" name=""/>
+        <p:cNvGrpSpPr/>
+        <p:nvPr/>
+      </p:nvGrpSpPr>
+      <p:grpSpPr>
+        <a:xfrm>
+          <a:off x="0" y="0"/>
+          <a:ext cx="0" cy="0"/>
+          <a:chOff x="0" y="0"/>
+          <a:chExt cx="0" cy="0"/>
+        </a:xfrm>
+      </p:grpSpPr>
+      <p:sp>
+        <p:nvSpPr>
+          <p:cNvPr id="2" name="Title 1"/>
+          <p:cNvSpPr>
+            <a:spLocks noGrp="1"/>
+          </p:cNvSpPr>
+          <p:nvPr>
+            <p:ph type="title"/>
+            <p:custDataLst>
+              <p:tags r:id="rId1"/>
+            </p:custDataLst>
+          </p:nvPr>
+        </p:nvSpPr>
+        <p:spPr>
+          <a:xfrm>
+            <a:off x="838200" y="151120"/>
+            <a:ext cx="10515600" cy="700195"/>
+          </a:xfrm>
+        </p:spPr>
+        <p:txBody>
+          <a:bodyPr/>
+          <a:lstStyle/>
+          <a:p>
+            <a:r>
+              <a:rPr lang="fr-FR" dirty="0"/>
+              <a:t>Offres rencontrées</a:t>
+            </a:r>
+            <a:endParaRPr lang="en-CA" dirty="0"/>
+          </a:p>
+        </p:txBody>
+      </p:sp>
+      <p:sp>
+        <p:nvSpPr>
+          <p:cNvPr id="3" name="Content Placeholder 2"/>
+          <p:cNvSpPr>
+            <a:spLocks noGrp="1"/>
+          </p:cNvSpPr>
+          <p:nvPr>
+            <p:ph idx="1"/>
+            <p:custDataLst>
+              <p:tags r:id="rId2"/>
+            </p:custDataLst>
+          </p:nvPr>
+        </p:nvSpPr>
+        <p:spPr>
+          <a:xfrm>
+            <a:off x="6036816" y="1816748"/>
+            <a:ext cx="5316984" cy="3394444"/>
+          </a:xfrm>
+        </p:spPr>
+        <p:style>
+          <a:lnRef idx="2">
+            <a:schemeClr val="accent2"/>
+          </a:lnRef>
+          <a:fillRef idx="1">
+            <a:schemeClr val="lt1"/>
+          </a:fillRef>
+          <a:effectRef idx="0">
+            <a:schemeClr val="accent2"/>
+          </a:effectRef>
+          <a:fontRef idx="minor">
+            <a:schemeClr val="dk1"/>
+          </a:fontRef>
+        </p:style>
+        <p:txBody>
+          <a:bodyPr/>
+          <a:lstStyle/>
+          <a:p>
+            <a:r>
+              <a:rPr lang="fr-FR" dirty="0"/>
+              <a:t>Ouvert libre</a:t>
+            </a:r>
+          </a:p>
+          <a:p>
+            <a:pPr lvl="1"/>
+            <a:r>
+              <a:rPr lang="fr-FR" dirty="0"/>
+              <a:t>MIL </a:t>
+            </a:r>
+          </a:p>
+          <a:p>
+            <a:pPr lvl="1"/>
+            <a:r>
+              <a:rPr lang="fr-FR" dirty="0"/>
+              <a:t>Apache 2.0</a:t>
+            </a:r>
+          </a:p>
+          <a:p>
+            <a:r>
+              <a:rPr lang="fr-FR" dirty="0"/>
+              <a:t>Licence payant mois / utilisateur</a:t>
+            </a:r>
+          </a:p>
+          <a:p>
+            <a:r>
+              <a:rPr lang="fr-FR" dirty="0"/>
+              <a:t>Crédits</a:t>
+            </a:r>
+          </a:p>
+          <a:p>
+            <a:r>
+              <a:rPr lang="fr-FR" dirty="0"/>
+              <a:t>Gratuit communauté universitaire / recherche</a:t>
+            </a:r>
+            <a:endParaRPr lang="en-CA" dirty="0"/>
+          </a:p>
+        </p:txBody>
+      </p:sp>
+      <p:sp>
+        <p:nvSpPr>
+          <p:cNvPr id="4" name="Content Placeholder 2"/>
+          <p:cNvSpPr txBox="1">
+            <a:spLocks/>
+          </p:cNvSpPr>
+          <p:nvPr>
+            <p:custDataLst>
+              <p:tags r:id="rId3"/>
+            </p:custDataLst>
+          </p:nvPr>
+        </p:nvSpPr>
+        <p:spPr>
+          <a:xfrm>
+            <a:off x="972845" y="1285566"/>
+            <a:ext cx="4575699" cy="2363156"/>
+          </a:xfrm>
+          <a:prstGeom prst="rect">
+            <a:avLst/>
+          </a:prstGeom>
+        </p:spPr>
+        <p:style>
+          <a:lnRef idx="2">
+            <a:schemeClr val="accent1"/>
+          </a:lnRef>
+          <a:fillRef idx="1">
+            <a:schemeClr val="lt1"/>
+          </a:fillRef>
+          <a:effectRef idx="0">
+            <a:schemeClr val="accent1"/>
+          </a:effectRef>
+          <a:fontRef idx="minor">
+            <a:schemeClr val="dk1"/>
+          </a:fontRef>
+        </p:style>
+        <p:txBody>
+          <a:bodyPr vert="horz" lIns="91440" tIns="45720" rIns="91440" bIns="45720" rtlCol="0">
+            <a:normAutofit/>
+          </a:bodyPr>
+          <a:lstStyle>
+            <a:lvl1pPr marL="228600" indent="-228600" algn="l" defTabSz="914400" rtl="0" eaLnBrk="1" latinLnBrk="0" hangingPunct="1">
+              <a:lnSpc>
+                <a:spcPct val="90000"/>
+              </a:lnSpc>
+              <a:spcBef>
+                <a:spcPts val="1000"/>
+              </a:spcBef>
+              <a:buFont typeface="Arial" panose="020B0604020202020204" pitchFamily="34" charset="0"/>
+              <a:buChar char="•"/>
+              <a:defRPr sz="2800" kern="1200">
+                <a:solidFill>
+                  <a:schemeClr val="tx1"/>
+                </a:solidFill>
+                <a:latin typeface="+mn-lt"/>
+                <a:ea typeface="+mn-ea"/>
+                <a:cs typeface="+mn-cs"/>
+              </a:defRPr>
+            </a:lvl1pPr>
+            <a:lvl2pPr marL="685800" indent="-228600" algn="l" defTabSz="914400" rtl="0" eaLnBrk="1" latinLnBrk="0" hangingPunct="1">
+              <a:lnSpc>
+                <a:spcPct val="90000"/>
+              </a:lnSpc>
+              <a:spcBef>
+                <a:spcPts val="500"/>
+              </a:spcBef>
+              <a:buFont typeface="Arial" panose="020B0604020202020204" pitchFamily="34" charset="0"/>
+              <a:buChar char="•"/>
+              <a:defRPr sz="2400" kern="1200">
+                <a:solidFill>
+                  <a:schemeClr val="tx1"/>
+                </a:solidFill>
+                <a:latin typeface="+mn-lt"/>
+                <a:ea typeface="+mn-ea"/>
+                <a:cs typeface="+mn-cs"/>
+              </a:defRPr>
+            </a:lvl2pPr>
+            <a:lvl3pPr marL="1143000" indent="-228600" algn="l" defTabSz="914400" rtl="0" eaLnBrk="1" latinLnBrk="0" hangingPunct="1">
+              <a:lnSpc>
+                <a:spcPct val="90000"/>
+              </a:lnSpc>
+              <a:spcBef>
+                <a:spcPts val="500"/>
+              </a:spcBef>
+              <a:buFont typeface="Arial" panose="020B0604020202020204" pitchFamily="34" charset="0"/>
+              <a:buChar char="•"/>
+              <a:defRPr sz="2000" kern="1200">
+                <a:solidFill>
+                  <a:schemeClr val="tx1"/>
+                </a:solidFill>
+                <a:latin typeface="+mn-lt"/>
+                <a:ea typeface="+mn-ea"/>
+                <a:cs typeface="+mn-cs"/>
+              </a:defRPr>
+            </a:lvl3pPr>
+            <a:lvl4pPr marL="1600200" indent="-228600" algn="l" defTabSz="914400" rtl="0" eaLnBrk="1" latinLnBrk="0" hangingPunct="1">
+              <a:lnSpc>
+                <a:spcPct val="90000"/>
+              </a:lnSpc>
+              <a:spcBef>
+                <a:spcPts val="500"/>
+              </a:spcBef>
+              <a:buFont typeface="Arial" panose="020B0604020202020204" pitchFamily="34" charset="0"/>
+              <a:buChar char="•"/>
+              <a:defRPr sz="1800" kern="1200">
+                <a:solidFill>
+                  <a:schemeClr val="tx1"/>
+                </a:solidFill>
+                <a:latin typeface="+mn-lt"/>
+                <a:ea typeface="+mn-ea"/>
+                <a:cs typeface="+mn-cs"/>
+              </a:defRPr>
+            </a:lvl4pPr>
+            <a:lvl5pPr marL="2057400" indent="-228600" algn="l" defTabSz="914400" rtl="0" eaLnBrk="1" latinLnBrk="0" hangingPunct="1">
+              <a:lnSpc>
+                <a:spcPct val="90000"/>
+              </a:lnSpc>
+              <a:spcBef>
+                <a:spcPts val="500"/>
+              </a:spcBef>
+              <a:buFont typeface="Arial" panose="020B0604020202020204" pitchFamily="34" charset="0"/>
+              <a:buChar char="•"/>
+              <a:defRPr sz="1800" kern="1200">
+                <a:solidFill>
+                  <a:schemeClr val="tx1"/>
+                </a:solidFill>
+                <a:latin typeface="+mn-lt"/>
+                <a:ea typeface="+mn-ea"/>
+                <a:cs typeface="+mn-cs"/>
+              </a:defRPr>
+            </a:lvl5pPr>
+            <a:lvl6pPr marL="2514600" indent="-228600" algn="l" defTabSz="914400" rtl="0" eaLnBrk="1" latinLnBrk="0" hangingPunct="1">
+              <a:lnSpc>
+                <a:spcPct val="90000"/>
+              </a:lnSpc>
+              <a:spcBef>
+                <a:spcPts val="500"/>
+              </a:spcBef>
+              <a:buFont typeface="Arial" panose="020B0604020202020204" pitchFamily="34" charset="0"/>
+              <a:buChar char="•"/>
+              <a:defRPr sz="1800" kern="1200">
+                <a:solidFill>
+                  <a:schemeClr val="tx1"/>
+                </a:solidFill>
+                <a:latin typeface="+mn-lt"/>
+                <a:ea typeface="+mn-ea"/>
+                <a:cs typeface="+mn-cs"/>
+              </a:defRPr>
+            </a:lvl6pPr>
+            <a:lvl7pPr marL="2971800" indent="-228600" algn="l" defTabSz="914400" rtl="0" eaLnBrk="1" latinLnBrk="0" hangingPunct="1">
+              <a:lnSpc>
+                <a:spcPct val="90000"/>
+              </a:lnSpc>
+              <a:spcBef>
+                <a:spcPts val="500"/>
+              </a:spcBef>
+              <a:buFont typeface="Arial" panose="020B0604020202020204" pitchFamily="34" charset="0"/>
+              <a:buChar char="•"/>
+              <a:defRPr sz="1800" kern="1200">
+                <a:solidFill>
+                  <a:schemeClr val="tx1"/>
+                </a:solidFill>
+                <a:latin typeface="+mn-lt"/>
+                <a:ea typeface="+mn-ea"/>
+                <a:cs typeface="+mn-cs"/>
+              </a:defRPr>
+            </a:lvl7pPr>
+            <a:lvl8pPr marL="3429000" indent="-228600" algn="l" defTabSz="914400" rtl="0" eaLnBrk="1" latinLnBrk="0" hangingPunct="1">
+              <a:lnSpc>
+                <a:spcPct val="90000"/>
+              </a:lnSpc>
+              <a:spcBef>
+                <a:spcPts val="500"/>
+              </a:spcBef>
+              <a:buFont typeface="Arial" panose="020B0604020202020204" pitchFamily="34" charset="0"/>
+              <a:buChar char="•"/>
+              <a:defRPr sz="1800" kern="1200">
+                <a:solidFill>
+                  <a:schemeClr val="tx1"/>
+                </a:solidFill>
+                <a:latin typeface="+mn-lt"/>
+                <a:ea typeface="+mn-ea"/>
+                <a:cs typeface="+mn-cs"/>
+              </a:defRPr>
+            </a:lvl8pPr>
+            <a:lvl9pPr marL="3886200" indent="-228600" algn="l" defTabSz="914400" rtl="0" eaLnBrk="1" latinLnBrk="0" hangingPunct="1">
+              <a:lnSpc>
+                <a:spcPct val="90000"/>
+              </a:lnSpc>
+              <a:spcBef>
+                <a:spcPts val="500"/>
+              </a:spcBef>
+              <a:buFont typeface="Arial" panose="020B0604020202020204" pitchFamily="34" charset="0"/>
+              <a:buChar char="•"/>
+              <a:defRPr sz="1800" kern="1200">
+                <a:solidFill>
+                  <a:schemeClr val="tx1"/>
+                </a:solidFill>
+                <a:latin typeface="+mn-lt"/>
+                <a:ea typeface="+mn-ea"/>
+                <a:cs typeface="+mn-cs"/>
+              </a:defRPr>
+            </a:lvl9pPr>
+          </a:lstStyle>
+          <a:p>
+            <a:r>
+              <a:rPr lang="fr-FR" dirty="0"/>
+              <a:t>Plateforme complète</a:t>
+            </a:r>
+          </a:p>
+          <a:p>
+            <a:r>
+              <a:rPr lang="fr-FR" dirty="0"/>
+              <a:t>Outils d’annotation</a:t>
+            </a:r>
+          </a:p>
+          <a:p>
+            <a:pPr lvl="1"/>
+            <a:r>
+              <a:rPr lang="fr-FR" dirty="0"/>
+              <a:t>Assisté par modèle IA</a:t>
+            </a:r>
+          </a:p>
+          <a:p>
+            <a:pPr lvl="1"/>
+            <a:r>
+              <a:rPr lang="fr-FR" dirty="0"/>
+              <a:t>manuel</a:t>
+            </a:r>
+          </a:p>
+          <a:p>
+            <a:r>
+              <a:rPr lang="fr-FR" dirty="0"/>
+              <a:t>Sous-traitance</a:t>
+            </a:r>
+          </a:p>
+          <a:p>
+            <a:pPr marL="0" indent="0">
+              <a:buNone/>
+            </a:pPr>
+            <a:endParaRPr lang="en-CA" dirty="0"/>
+          </a:p>
+        </p:txBody>
+      </p:sp>
+    </p:spTree>
+    <p:extLst>
+      <p:ext uri="{BB962C8B-B14F-4D97-AF65-F5344CB8AC3E}">
+        <p14:creationId xmlns:p14="http://schemas.microsoft.com/office/powerpoint/2010/main" val="774615238"/>
+      </p:ext>
+    </p:extLst>
+  </p:cSld>
+  <p:clrMapOvr>
+    <a:masterClrMapping/>
+  </p:clrMapOvr>
+</p:sld>
+</file>
+
 <file path=ppt/slides/slide3.xml><?xml version="1.0" encoding="utf-8"?>
 <p:sld xmlns:a="http://schemas.openxmlformats.org/drawingml/2006/main" xmlns:r="http://schemas.openxmlformats.org/officeDocument/2006/relationships" xmlns:p="http://schemas.openxmlformats.org/presentationml/2006/main">
   <p:cSld>
@@ -2880,7 +3540,7 @@
           <a:lstStyle/>
           <a:p>
             <a:r>
-              <a:rPr lang="fr-FR" dirty="0" smtClean="0"/>
+              <a:rPr lang="fr-FR" dirty="0"/>
               <a:t>Outils rencontrés</a:t>
             </a:r>
             <a:endParaRPr lang="en-CA" dirty="0"/>
@@ -2927,33 +3587,33 @@
           <a:lstStyle/>
           <a:p>
             <a:r>
-              <a:rPr lang="fr-FR" sz="2000" dirty="0" err="1" smtClean="0"/>
+              <a:rPr lang="fr-FR" sz="2000" dirty="0" err="1"/>
               <a:t>Vector</a:t>
             </a:r>
-            <a:endParaRPr lang="fr-FR" sz="2000" dirty="0" smtClean="0"/>
-          </a:p>
-          <a:p>
-            <a:r>
-              <a:rPr lang="fr-FR" sz="2000" dirty="0" smtClean="0"/>
+            <a:endParaRPr lang="fr-FR" sz="2000" dirty="0"/>
+          </a:p>
+          <a:p>
+            <a:r>
+              <a:rPr lang="fr-FR" sz="2000" dirty="0"/>
               <a:t>Bitmap/pixel</a:t>
             </a:r>
           </a:p>
           <a:p>
             <a:r>
-              <a:rPr lang="fr-FR" sz="2000" dirty="0" err="1" smtClean="0"/>
+              <a:rPr lang="fr-FR" sz="2000" dirty="0" err="1"/>
               <a:t>Videos</a:t>
             </a:r>
-            <a:endParaRPr lang="fr-FR" sz="2000" dirty="0" smtClean="0"/>
-          </a:p>
-          <a:p>
-            <a:r>
-              <a:rPr lang="fr-FR" sz="2000" dirty="0" smtClean="0"/>
+            <a:endParaRPr lang="fr-FR" sz="2000" dirty="0"/>
+          </a:p>
+          <a:p>
+            <a:r>
+              <a:rPr lang="fr-FR" sz="2000" dirty="0"/>
               <a:t>2d</a:t>
             </a:r>
           </a:p>
           <a:p>
             <a:r>
-              <a:rPr lang="fr-FR" sz="2000" dirty="0" smtClean="0"/>
+              <a:rPr lang="fr-FR" sz="2000" dirty="0"/>
               <a:t>3d</a:t>
             </a:r>
             <a:endParaRPr lang="en-CA" sz="2000" dirty="0"/>
@@ -3168,90 +3828,90 @@
               <a:buNone/>
             </a:pPr>
             <a:r>
-              <a:rPr lang="fr-FR" sz="2400" u="sng" dirty="0" smtClean="0"/>
+              <a:rPr lang="fr-FR" sz="2400" u="sng" dirty="0"/>
               <a:t>Classiques</a:t>
             </a:r>
           </a:p>
           <a:p>
             <a:pPr lvl="1"/>
             <a:r>
-              <a:rPr lang="fr-FR" dirty="0" err="1" smtClean="0"/>
+              <a:rPr lang="fr-FR" dirty="0" err="1"/>
               <a:t>Restangle</a:t>
             </a:r>
             <a:r>
-              <a:rPr lang="fr-FR" dirty="0" smtClean="0"/>
+              <a:rPr lang="fr-FR" dirty="0"/>
               <a:t>, </a:t>
             </a:r>
             <a:r>
-              <a:rPr lang="fr-FR" dirty="0" err="1" smtClean="0"/>
+              <a:rPr lang="fr-FR" dirty="0" err="1"/>
               <a:t>polygon</a:t>
             </a:r>
             <a:r>
-              <a:rPr lang="fr-FR" dirty="0" smtClean="0"/>
+              <a:rPr lang="fr-FR" dirty="0"/>
               <a:t>, </a:t>
             </a:r>
             <a:r>
-              <a:rPr lang="fr-FR" dirty="0" err="1" smtClean="0"/>
+              <a:rPr lang="fr-FR" dirty="0" err="1"/>
               <a:t>polyline</a:t>
             </a:r>
             <a:r>
-              <a:rPr lang="fr-FR" dirty="0" smtClean="0"/>
+              <a:rPr lang="fr-FR" dirty="0"/>
               <a:t>, points, </a:t>
             </a:r>
             <a:r>
-              <a:rPr lang="fr-FR" dirty="0" err="1" smtClean="0"/>
+              <a:rPr lang="fr-FR" dirty="0" err="1"/>
               <a:t>brush</a:t>
             </a:r>
             <a:r>
-              <a:rPr lang="fr-FR" dirty="0" smtClean="0"/>
+              <a:rPr lang="fr-FR" dirty="0"/>
               <a:t>, </a:t>
             </a:r>
             <a:r>
-              <a:rPr lang="fr-FR" dirty="0" err="1" smtClean="0"/>
+              <a:rPr lang="fr-FR" dirty="0" err="1"/>
               <a:t>eraser</a:t>
             </a:r>
             <a:r>
-              <a:rPr lang="fr-FR" dirty="0" smtClean="0"/>
+              <a:rPr lang="fr-FR" dirty="0"/>
               <a:t>, </a:t>
             </a:r>
             <a:r>
-              <a:rPr lang="fr-FR" dirty="0" err="1" smtClean="0"/>
+              <a:rPr lang="fr-FR" dirty="0" err="1"/>
               <a:t>bounding</a:t>
             </a:r>
             <a:r>
-              <a:rPr lang="fr-FR" dirty="0" smtClean="0"/>
+              <a:rPr lang="fr-FR" dirty="0"/>
               <a:t> boxes, </a:t>
             </a:r>
             <a:r>
-              <a:rPr lang="fr-FR" dirty="0" err="1" smtClean="0"/>
+              <a:rPr lang="fr-FR" dirty="0" err="1"/>
               <a:t>cuboid</a:t>
             </a:r>
             <a:r>
-              <a:rPr lang="fr-FR" dirty="0" smtClean="0"/>
+              <a:rPr lang="fr-FR" dirty="0"/>
               <a:t> (3d), image tags, label </a:t>
             </a:r>
             <a:r>
-              <a:rPr lang="fr-FR" dirty="0" err="1" smtClean="0"/>
+              <a:rPr lang="fr-FR" dirty="0" err="1"/>
               <a:t>attributes</a:t>
             </a:r>
             <a:r>
-              <a:rPr lang="fr-FR" dirty="0" smtClean="0"/>
+              <a:rPr lang="fr-FR" dirty="0"/>
               <a:t>, </a:t>
             </a:r>
             <a:r>
-              <a:rPr lang="fr-FR" dirty="0" err="1" smtClean="0"/>
+              <a:rPr lang="fr-FR" dirty="0" err="1"/>
               <a:t>hotkeys</a:t>
             </a:r>
             <a:r>
-              <a:rPr lang="fr-FR" dirty="0" smtClean="0"/>
+              <a:rPr lang="fr-FR" dirty="0"/>
               <a:t>/</a:t>
             </a:r>
             <a:r>
-              <a:rPr lang="fr-FR" dirty="0" err="1" smtClean="0"/>
+              <a:rPr lang="fr-FR" dirty="0" err="1"/>
               <a:t>shortkeys</a:t>
             </a:r>
             <a:r>
-              <a:rPr lang="fr-FR" dirty="0" smtClean="0"/>
+              <a:rPr lang="fr-FR" dirty="0"/>
               <a:t> </a:t>
             </a:r>
           </a:p>
@@ -3283,14 +3943,13 @@
           <a:lstStyle/>
           <a:p>
             <a:r>
-              <a:rPr lang="en-CA" sz="1200" baseline="30000" dirty="0" smtClean="0"/>
+              <a:rPr lang="en-CA" sz="1200" baseline="30000" dirty="0"/>
               <a:t>1 </a:t>
             </a:r>
             <a:r>
-              <a:rPr lang="en-CA" sz="1200" dirty="0" smtClean="0"/>
+              <a:rPr lang="en-CA" sz="1200" dirty="0"/>
               <a:t>https://www.iro.umontreal.ca/~mignotte/IFT6150/Articles/SLIC_Superpixels.pdf</a:t>
             </a:r>
-            <a:endParaRPr lang="en-CA" sz="1200" dirty="0"/>
           </a:p>
         </p:txBody>
       </p:sp>
@@ -3334,7 +3993,7 @@
           <a:lstStyle/>
           <a:p>
             <a:r>
-              <a:rPr lang="fr-FR" sz="2400" u="sng" dirty="0" smtClean="0"/>
+              <a:rPr lang="fr-FR" sz="2400" u="sng" dirty="0"/>
               <a:t>Assistées par IA</a:t>
             </a:r>
           </a:p>
@@ -3344,15 +4003,15 @@
               <a:buChar char="•"/>
             </a:pPr>
             <a:r>
-              <a:rPr lang="fr-FR" sz="2400" dirty="0" smtClean="0"/>
+              <a:rPr lang="fr-FR" sz="2400" dirty="0"/>
               <a:t>Smart </a:t>
             </a:r>
             <a:r>
-              <a:rPr lang="fr-FR" sz="2400" dirty="0" err="1" smtClean="0"/>
+              <a:rPr lang="fr-FR" sz="2400" dirty="0" err="1"/>
               <a:t>tool</a:t>
             </a:r>
             <a:r>
-              <a:rPr lang="fr-FR" sz="2400" dirty="0" smtClean="0"/>
+              <a:rPr lang="fr-FR" sz="2400" dirty="0"/>
               <a:t> (supervise.ly)</a:t>
             </a:r>
           </a:p>
@@ -3362,15 +4021,15 @@
               <a:buChar char="•"/>
             </a:pPr>
             <a:r>
-              <a:rPr lang="fr-FR" sz="2400" dirty="0" smtClean="0"/>
+              <a:rPr lang="fr-FR" sz="2400" dirty="0"/>
               <a:t>AI </a:t>
             </a:r>
             <a:r>
-              <a:rPr lang="fr-FR" sz="2400" dirty="0" err="1" smtClean="0"/>
+              <a:rPr lang="fr-FR" sz="2400" dirty="0" err="1"/>
               <a:t>tools</a:t>
             </a:r>
             <a:r>
-              <a:rPr lang="fr-FR" sz="2400" dirty="0" smtClean="0"/>
+              <a:rPr lang="fr-FR" sz="2400" dirty="0"/>
               <a:t> (CVAT)</a:t>
             </a:r>
           </a:p>
@@ -3380,15 +4039,15 @@
               <a:buChar char="•"/>
             </a:pPr>
             <a:r>
-              <a:rPr lang="fr-FR" sz="2400" dirty="0" smtClean="0"/>
+              <a:rPr lang="fr-FR" sz="2400" dirty="0"/>
               <a:t>Auto-</a:t>
             </a:r>
             <a:r>
-              <a:rPr lang="fr-FR" sz="2400" dirty="0" err="1" smtClean="0"/>
+              <a:rPr lang="fr-FR" sz="2400" dirty="0" err="1"/>
               <a:t>Annotate</a:t>
             </a:r>
             <a:r>
-              <a:rPr lang="fr-FR" sz="2400" dirty="0" smtClean="0"/>
+              <a:rPr lang="fr-FR" sz="2400" dirty="0"/>
               <a:t> (V7Labs)</a:t>
             </a:r>
           </a:p>
@@ -3398,15 +4057,15 @@
               <a:buChar char="•"/>
             </a:pPr>
             <a:r>
-              <a:rPr lang="fr-FR" sz="2400" dirty="0" smtClean="0"/>
+              <a:rPr lang="fr-FR" sz="2400" dirty="0"/>
               <a:t>Smart segmentation (</a:t>
             </a:r>
             <a:r>
-              <a:rPr lang="fr-FR" sz="2400" dirty="0" err="1" smtClean="0"/>
+              <a:rPr lang="fr-FR" sz="2400" dirty="0" err="1"/>
               <a:t>SuperAnnotate</a:t>
             </a:r>
             <a:r>
-              <a:rPr lang="fr-FR" sz="2400" dirty="0" smtClean="0"/>
+              <a:rPr lang="fr-FR" sz="2400" dirty="0"/>
               <a:t>)</a:t>
             </a:r>
           </a:p>
@@ -3416,7 +4075,7 @@
               <a:buChar char="•"/>
             </a:pPr>
             <a:r>
-              <a:rPr lang="fr-FR" sz="2400" dirty="0" smtClean="0"/>
+              <a:rPr lang="fr-FR" sz="2400" dirty="0"/>
               <a:t>DEXTR (4 points) (Hasty.ai)</a:t>
             </a:r>
           </a:p>
@@ -3426,7 +4085,7 @@
               <a:buChar char="•"/>
             </a:pPr>
             <a:r>
-              <a:rPr lang="fr-FR" sz="2400" dirty="0" smtClean="0"/>
+              <a:rPr lang="fr-FR" sz="2400" dirty="0"/>
               <a:t>AI Assistant (Hasty.ai)</a:t>
             </a:r>
           </a:p>
@@ -3436,14 +4095,14 @@
               <a:buChar char="•"/>
             </a:pPr>
             <a:r>
-              <a:rPr lang="fr-FR" sz="2400" dirty="0" smtClean="0"/>
+              <a:rPr lang="fr-FR" sz="2400" dirty="0"/>
               <a:t>class </a:t>
             </a:r>
             <a:r>
-              <a:rPr lang="fr-FR" sz="2400" dirty="0" err="1" smtClean="0"/>
+              <a:rPr lang="fr-FR" sz="2400" dirty="0" err="1"/>
               <a:t>prediction</a:t>
             </a:r>
-            <a:endParaRPr lang="fr-FR" sz="2400" dirty="0" smtClean="0"/>
+            <a:endParaRPr lang="fr-FR" sz="2400" dirty="0"/>
           </a:p>
           <a:p>
             <a:pPr marL="1200150" lvl="2" indent="-285750">
@@ -3451,18 +4110,18 @@
               <a:buChar char="•"/>
             </a:pPr>
             <a:r>
-              <a:rPr lang="fr-FR" sz="2400" dirty="0" err="1" smtClean="0"/>
+              <a:rPr lang="fr-FR" sz="2400" dirty="0" err="1"/>
               <a:t>object</a:t>
             </a:r>
             <a:r>
-              <a:rPr lang="fr-FR" sz="2400" dirty="0" smtClean="0"/>
+              <a:rPr lang="fr-FR" sz="2400" dirty="0"/>
               <a:t> </a:t>
             </a:r>
             <a:r>
-              <a:rPr lang="fr-FR" sz="2400" dirty="0" err="1" smtClean="0"/>
+              <a:rPr lang="fr-FR" sz="2400" dirty="0" err="1"/>
               <a:t>detection</a:t>
             </a:r>
-            <a:endParaRPr lang="fr-FR" sz="2400" dirty="0" smtClean="0"/>
+            <a:endParaRPr lang="fr-FR" sz="2400" dirty="0"/>
           </a:p>
           <a:p>
             <a:pPr marL="1200150" lvl="2" indent="-285750">
@@ -3470,7 +4129,7 @@
               <a:buChar char="•"/>
             </a:pPr>
             <a:r>
-              <a:rPr lang="fr-FR" sz="2400" dirty="0" smtClean="0"/>
+              <a:rPr lang="fr-FR" sz="2400" dirty="0"/>
               <a:t>instance segmentation</a:t>
             </a:r>
           </a:p>
@@ -3516,7 +4175,7 @@
           <a:lstStyle/>
           <a:p>
             <a:r>
-              <a:rPr lang="fr-FR" sz="2400" u="sng" dirty="0" smtClean="0"/>
+              <a:rPr lang="fr-FR" sz="2400" u="sng" dirty="0"/>
               <a:t>Méthodes spéciales (non assistées par IA)</a:t>
             </a:r>
           </a:p>
@@ -3526,7 +4185,7 @@
               <a:buChar char="•"/>
             </a:pPr>
             <a:r>
-              <a:rPr lang="fr-FR" sz="2400" dirty="0" smtClean="0"/>
+              <a:rPr lang="fr-FR" sz="2400" dirty="0"/>
               <a:t>Contour (hasty.ai)</a:t>
             </a:r>
           </a:p>
@@ -3536,19 +4195,19 @@
               <a:buChar char="•"/>
             </a:pPr>
             <a:r>
-              <a:rPr lang="fr-FR" sz="2400" dirty="0" err="1" smtClean="0"/>
+              <a:rPr lang="fr-FR" sz="2400" dirty="0" err="1"/>
               <a:t>Magic</a:t>
             </a:r>
             <a:r>
-              <a:rPr lang="fr-FR" sz="2400" dirty="0" smtClean="0"/>
+              <a:rPr lang="fr-FR" sz="2400" dirty="0"/>
               <a:t> </a:t>
             </a:r>
             <a:r>
-              <a:rPr lang="fr-FR" sz="2400" dirty="0" err="1" smtClean="0"/>
+              <a:rPr lang="fr-FR" sz="2400" dirty="0" err="1"/>
               <a:t>wand</a:t>
             </a:r>
             <a:r>
-              <a:rPr lang="fr-FR" sz="2400" dirty="0" smtClean="0"/>
+              <a:rPr lang="fr-FR" sz="2400" dirty="0"/>
               <a:t> (hasty.ai)</a:t>
             </a:r>
           </a:p>
@@ -3558,11 +4217,11 @@
               <a:buChar char="•"/>
             </a:pPr>
             <a:r>
-              <a:rPr lang="fr-FR" sz="2400" dirty="0" err="1" smtClean="0"/>
+              <a:rPr lang="fr-FR" sz="2400" dirty="0" err="1"/>
               <a:t>GrabCut</a:t>
             </a:r>
             <a:r>
-              <a:rPr lang="fr-FR" sz="2400" dirty="0" smtClean="0"/>
+              <a:rPr lang="fr-FR" sz="2400" dirty="0"/>
               <a:t> (hasty.ai)</a:t>
             </a:r>
           </a:p>
@@ -3572,23 +4231,23 @@
               <a:buChar char="•"/>
             </a:pPr>
             <a:r>
-              <a:rPr lang="fr-FR" sz="2400" dirty="0" smtClean="0"/>
+              <a:rPr lang="fr-FR" sz="2400" dirty="0"/>
               <a:t>SLIC Superpixels</a:t>
             </a:r>
             <a:r>
-              <a:rPr lang="fr-FR" sz="2400" baseline="30000" dirty="0" smtClean="0"/>
+              <a:rPr lang="fr-FR" sz="2400" baseline="30000" dirty="0"/>
               <a:t>1</a:t>
             </a:r>
             <a:r>
-              <a:rPr lang="fr-FR" sz="2400" dirty="0" smtClean="0"/>
+              <a:rPr lang="fr-FR" sz="2400" dirty="0"/>
               <a:t> (puzzle / casse-tête) (</a:t>
             </a:r>
             <a:r>
-              <a:rPr lang="fr-FR" sz="2400" dirty="0" err="1" smtClean="0"/>
+              <a:rPr lang="fr-FR" sz="2400" dirty="0" err="1"/>
               <a:t>LabelBox</a:t>
             </a:r>
             <a:r>
-              <a:rPr lang="fr-FR" sz="2400" dirty="0" smtClean="0"/>
+              <a:rPr lang="fr-FR" sz="2400" dirty="0"/>
               <a:t>)</a:t>
             </a:r>
           </a:p>
@@ -3598,19 +4257,19 @@
               <a:buChar char="•"/>
             </a:pPr>
             <a:r>
-              <a:rPr lang="fr-FR" sz="2400" dirty="0" err="1" smtClean="0"/>
+              <a:rPr lang="fr-FR" sz="2400" dirty="0" err="1"/>
               <a:t>OpenCV</a:t>
             </a:r>
             <a:r>
-              <a:rPr lang="fr-FR" sz="2400" dirty="0" smtClean="0"/>
+              <a:rPr lang="fr-FR" sz="2400" dirty="0"/>
               <a:t> </a:t>
             </a:r>
             <a:r>
-              <a:rPr lang="fr-FR" sz="2400" dirty="0" err="1" smtClean="0"/>
+              <a:rPr lang="fr-FR" sz="2400" dirty="0" err="1"/>
               <a:t>tool</a:t>
             </a:r>
             <a:r>
-              <a:rPr lang="fr-FR" sz="2400" dirty="0" smtClean="0"/>
+              <a:rPr lang="fr-FR" sz="2400" dirty="0"/>
               <a:t> (CVAT)</a:t>
             </a:r>
           </a:p>
@@ -3620,11 +4279,11 @@
               <a:buChar char="•"/>
             </a:pPr>
             <a:r>
-              <a:rPr lang="fr-FR" sz="2400" dirty="0" err="1" smtClean="0"/>
+              <a:rPr lang="fr-FR" sz="2400" dirty="0" err="1"/>
               <a:t>Automatic</a:t>
             </a:r>
             <a:r>
-              <a:rPr lang="fr-FR" sz="2400" dirty="0" smtClean="0"/>
+              <a:rPr lang="fr-FR" sz="2400" dirty="0"/>
               <a:t> border</a:t>
             </a:r>
           </a:p>
@@ -3640,13 +4299,1099 @@
   <p:clrMapOvr>
     <a:masterClrMapping/>
   </p:clrMapOvr>
-  <p:timing>
-    <p:tnLst>
-      <p:par>
-        <p:cTn id="1" dur="indefinite" restart="never" nodeType="tmRoot"/>
-      </p:par>
-    </p:tnLst>
-  </p:timing>
+</p:sld>
+</file>
+
+<file path=ppt/slides/slide4.xml><?xml version="1.0" encoding="utf-8"?>
+<p:sld xmlns:a="http://schemas.openxmlformats.org/drawingml/2006/main" xmlns:r="http://schemas.openxmlformats.org/officeDocument/2006/relationships" xmlns:p="http://schemas.openxmlformats.org/presentationml/2006/main">
+  <p:cSld>
+    <p:spTree>
+      <p:nvGrpSpPr>
+        <p:cNvPr id="1" name=""/>
+        <p:cNvGrpSpPr/>
+        <p:nvPr/>
+      </p:nvGrpSpPr>
+      <p:grpSpPr>
+        <a:xfrm>
+          <a:off x="0" y="0"/>
+          <a:ext cx="0" cy="0"/>
+          <a:chOff x="0" y="0"/>
+          <a:chExt cx="0" cy="0"/>
+        </a:xfrm>
+      </p:grpSpPr>
+      <p:sp>
+        <p:nvSpPr>
+          <p:cNvPr id="2" name="Titre 1">
+            <a:extLst>
+              <a:ext uri="{FF2B5EF4-FFF2-40B4-BE49-F238E27FC236}">
+                <a16:creationId xmlns:a16="http://schemas.microsoft.com/office/drawing/2014/main" id="{1F20F79A-01B1-4D87-9D0A-B7524E7F2E8D}"/>
+              </a:ext>
+            </a:extLst>
+          </p:cNvPr>
+          <p:cNvSpPr>
+            <a:spLocks noGrp="1"/>
+          </p:cNvSpPr>
+          <p:nvPr>
+            <p:ph type="ctrTitle"/>
+          </p:nvPr>
+        </p:nvSpPr>
+        <p:spPr/>
+        <p:txBody>
+          <a:bodyPr/>
+          <a:lstStyle/>
+          <a:p>
+            <a:endParaRPr lang="en-CA"/>
+          </a:p>
+        </p:txBody>
+      </p:sp>
+      <p:sp>
+        <p:nvSpPr>
+          <p:cNvPr id="3" name="Sous-titre 2">
+            <a:extLst>
+              <a:ext uri="{FF2B5EF4-FFF2-40B4-BE49-F238E27FC236}">
+                <a16:creationId xmlns:a16="http://schemas.microsoft.com/office/drawing/2014/main" id="{359ED18D-7CAF-46DB-8618-53EC7A7659ED}"/>
+              </a:ext>
+            </a:extLst>
+          </p:cNvPr>
+          <p:cNvSpPr>
+            <a:spLocks noGrp="1"/>
+          </p:cNvSpPr>
+          <p:nvPr>
+            <p:ph type="subTitle" idx="1"/>
+          </p:nvPr>
+        </p:nvSpPr>
+        <p:spPr/>
+        <p:txBody>
+          <a:bodyPr/>
+          <a:lstStyle/>
+          <a:p>
+            <a:endParaRPr lang="en-CA"/>
+          </a:p>
+        </p:txBody>
+      </p:sp>
+    </p:spTree>
+  </p:cSld>
+  <p:clrMapOvr>
+    <a:masterClrMapping/>
+  </p:clrMapOvr>
+</p:sld>
+</file>
+
+<file path=ppt/slides/slide5.xml><?xml version="1.0" encoding="utf-8"?>
+<p:sld xmlns:a="http://schemas.openxmlformats.org/drawingml/2006/main" xmlns:r="http://schemas.openxmlformats.org/officeDocument/2006/relationships" xmlns:p="http://schemas.openxmlformats.org/presentationml/2006/main">
+  <p:cSld>
+    <p:spTree>
+      <p:nvGrpSpPr>
+        <p:cNvPr id="1" name=""/>
+        <p:cNvGrpSpPr/>
+        <p:nvPr/>
+      </p:nvGrpSpPr>
+      <p:grpSpPr>
+        <a:xfrm>
+          <a:off x="0" y="0"/>
+          <a:ext cx="0" cy="0"/>
+          <a:chOff x="0" y="0"/>
+          <a:chExt cx="0" cy="0"/>
+        </a:xfrm>
+      </p:grpSpPr>
+      <p:sp>
+        <p:nvSpPr>
+          <p:cNvPr id="15" name="Title 14"/>
+          <p:cNvSpPr>
+            <a:spLocks noGrp="1"/>
+          </p:cNvSpPr>
+          <p:nvPr>
+            <p:ph type="title"/>
+            <p:custDataLst>
+              <p:tags r:id="rId1"/>
+            </p:custDataLst>
+          </p:nvPr>
+        </p:nvSpPr>
+        <p:spPr>
+          <a:xfrm>
+            <a:off x="296662" y="117693"/>
+            <a:ext cx="2499804" cy="767736"/>
+          </a:xfrm>
+        </p:spPr>
+        <p:txBody>
+          <a:bodyPr/>
+          <a:lstStyle/>
+          <a:p>
+            <a:r>
+              <a:rPr lang="fr-FR" dirty="0"/>
+              <a:t>Choix</a:t>
+            </a:r>
+            <a:endParaRPr lang="en-CA" dirty="0"/>
+          </a:p>
+        </p:txBody>
+      </p:sp>
+      <p:sp>
+        <p:nvSpPr>
+          <p:cNvPr id="16" name="Rectangle 15"/>
+          <p:cNvSpPr/>
+          <p:nvPr>
+            <p:custDataLst>
+              <p:tags r:id="rId2"/>
+            </p:custDataLst>
+          </p:nvPr>
+        </p:nvSpPr>
+        <p:spPr>
+          <a:xfrm>
+            <a:off x="1988599" y="117693"/>
+            <a:ext cx="10085032" cy="6555641"/>
+          </a:xfrm>
+          <a:prstGeom prst="rect">
+            <a:avLst/>
+          </a:prstGeom>
+        </p:spPr>
+        <p:txBody>
+          <a:bodyPr wrap="square">
+            <a:spAutoFit/>
+          </a:bodyPr>
+          <a:lstStyle/>
+          <a:p>
+            <a:pPr marL="342900" indent="-342900">
+              <a:buFont typeface="+mj-lt"/>
+              <a:buAutoNum type="arabicPeriod"/>
+            </a:pPr>
+            <a:r>
+              <a:rPr lang="en-CA" sz="2000" dirty="0">
+                <a:solidFill>
+                  <a:schemeClr val="accent2">
+                    <a:lumMod val="75000"/>
+                  </a:schemeClr>
+                </a:solidFill>
+              </a:rPr>
+              <a:t>V7labs Darwin $ </a:t>
+            </a:r>
+            <a:r>
+              <a:rPr lang="en-CA" sz="2000" dirty="0" err="1">
+                <a:solidFill>
+                  <a:schemeClr val="accent2">
+                    <a:lumMod val="75000"/>
+                  </a:schemeClr>
+                </a:solidFill>
+              </a:rPr>
+              <a:t>plateforme</a:t>
+            </a:r>
+            <a:r>
+              <a:rPr lang="en-CA" sz="2000" dirty="0">
+                <a:solidFill>
+                  <a:schemeClr val="accent2">
+                    <a:lumMod val="75000"/>
+                  </a:schemeClr>
+                </a:solidFill>
+              </a:rPr>
+              <a:t> </a:t>
+            </a:r>
+            <a:r>
+              <a:rPr lang="en-CA" sz="2000" u="sng" dirty="0">
+                <a:solidFill>
+                  <a:schemeClr val="accent2">
+                    <a:lumMod val="75000"/>
+                  </a:schemeClr>
+                </a:solidFill>
+                <a:hlinkClick r:id="rId4"/>
+              </a:rPr>
+              <a:t>https://www.v7labs.com</a:t>
+            </a:r>
+            <a:endParaRPr lang="en-CA" sz="2000" dirty="0">
+              <a:solidFill>
+                <a:schemeClr val="accent2">
+                  <a:lumMod val="75000"/>
+                </a:schemeClr>
+              </a:solidFill>
+            </a:endParaRPr>
+          </a:p>
+          <a:p>
+            <a:pPr marL="342900" indent="-342900">
+              <a:buFont typeface="+mj-lt"/>
+              <a:buAutoNum type="arabicPeriod"/>
+            </a:pPr>
+            <a:r>
+              <a:rPr lang="en-CA" sz="2000" dirty="0" err="1">
+                <a:solidFill>
+                  <a:schemeClr val="accent2">
+                    <a:lumMod val="75000"/>
+                  </a:schemeClr>
+                </a:solidFill>
+              </a:rPr>
+              <a:t>SuperAnnotate</a:t>
+            </a:r>
+            <a:r>
+              <a:rPr lang="en-CA" sz="2000" dirty="0">
+                <a:solidFill>
+                  <a:schemeClr val="accent2">
+                    <a:lumMod val="75000"/>
+                  </a:schemeClr>
+                </a:solidFill>
+              </a:rPr>
+              <a:t> $ </a:t>
+            </a:r>
+            <a:r>
+              <a:rPr lang="en-CA" sz="2000" dirty="0" err="1">
+                <a:solidFill>
+                  <a:schemeClr val="accent2">
+                    <a:lumMod val="75000"/>
+                  </a:schemeClr>
+                </a:solidFill>
+              </a:rPr>
+              <a:t>plateforme</a:t>
+            </a:r>
+            <a:r>
+              <a:rPr lang="en-CA" sz="2000" dirty="0">
+                <a:solidFill>
+                  <a:schemeClr val="accent2">
+                    <a:lumMod val="75000"/>
+                  </a:schemeClr>
+                </a:solidFill>
+              </a:rPr>
+              <a:t> </a:t>
+            </a:r>
+            <a:r>
+              <a:rPr lang="en-CA" sz="2000" dirty="0" err="1">
+                <a:solidFill>
+                  <a:schemeClr val="accent2">
+                    <a:lumMod val="75000"/>
+                  </a:schemeClr>
+                </a:solidFill>
+              </a:rPr>
+              <a:t>openCV</a:t>
+            </a:r>
+            <a:r>
+              <a:rPr lang="en-CA" sz="2000" dirty="0">
+                <a:solidFill>
+                  <a:schemeClr val="accent2">
+                    <a:lumMod val="75000"/>
+                  </a:schemeClr>
+                </a:solidFill>
+              </a:rPr>
+              <a:t> </a:t>
+            </a:r>
+            <a:r>
+              <a:rPr lang="en-CA" sz="2000" u="sng" dirty="0">
+                <a:solidFill>
+                  <a:schemeClr val="accent2">
+                    <a:lumMod val="75000"/>
+                  </a:schemeClr>
+                </a:solidFill>
+                <a:hlinkClick r:id="rId5"/>
+              </a:rPr>
+              <a:t>https://superannotate.com/</a:t>
+            </a:r>
+            <a:endParaRPr lang="en-CA" sz="2000" dirty="0">
+              <a:solidFill>
+                <a:schemeClr val="accent2">
+                  <a:lumMod val="75000"/>
+                </a:schemeClr>
+              </a:solidFill>
+            </a:endParaRPr>
+          </a:p>
+          <a:p>
+            <a:pPr marL="342900" indent="-342900">
+              <a:buFont typeface="+mj-lt"/>
+              <a:buAutoNum type="arabicPeriod"/>
+            </a:pPr>
+            <a:r>
+              <a:rPr lang="en-CA" sz="2000" dirty="0">
+                <a:solidFill>
+                  <a:schemeClr val="accent2">
+                    <a:lumMod val="75000"/>
+                  </a:schemeClr>
+                </a:solidFill>
+              </a:rPr>
+              <a:t>Supervise.ly $* </a:t>
+            </a:r>
+            <a:r>
+              <a:rPr lang="en-CA" sz="2000" dirty="0" err="1">
+                <a:solidFill>
+                  <a:schemeClr val="accent2">
+                    <a:lumMod val="75000"/>
+                  </a:schemeClr>
+                </a:solidFill>
+              </a:rPr>
+              <a:t>plateforme</a:t>
+            </a:r>
+            <a:r>
+              <a:rPr lang="en-CA" sz="2000" dirty="0">
+                <a:solidFill>
+                  <a:schemeClr val="accent2">
+                    <a:lumMod val="75000"/>
+                  </a:schemeClr>
+                </a:solidFill>
+              </a:rPr>
+              <a:t> </a:t>
+            </a:r>
+            <a:r>
+              <a:rPr lang="en-CA" sz="2000" u="sng" dirty="0">
+                <a:solidFill>
+                  <a:schemeClr val="accent2">
+                    <a:lumMod val="75000"/>
+                  </a:schemeClr>
+                </a:solidFill>
+                <a:hlinkClick r:id="rId6"/>
+              </a:rPr>
+              <a:t>https://supervise.ly/</a:t>
+            </a:r>
+            <a:endParaRPr lang="en-CA" sz="2000" dirty="0">
+              <a:solidFill>
+                <a:schemeClr val="accent2">
+                  <a:lumMod val="75000"/>
+                </a:schemeClr>
+              </a:solidFill>
+            </a:endParaRPr>
+          </a:p>
+          <a:p>
+            <a:pPr marL="342900" indent="-342900">
+              <a:buFont typeface="+mj-lt"/>
+              <a:buAutoNum type="arabicPeriod"/>
+            </a:pPr>
+            <a:r>
+              <a:rPr lang="en-CA" sz="2000" dirty="0" err="1">
+                <a:solidFill>
+                  <a:schemeClr val="accent2">
+                    <a:lumMod val="75000"/>
+                  </a:schemeClr>
+                </a:solidFill>
+              </a:rPr>
+              <a:t>LabelBox</a:t>
+            </a:r>
+            <a:r>
+              <a:rPr lang="en-CA" sz="2000" dirty="0">
+                <a:solidFill>
+                  <a:schemeClr val="accent2">
+                    <a:lumMod val="75000"/>
+                  </a:schemeClr>
+                </a:solidFill>
+              </a:rPr>
+              <a:t> $ </a:t>
+            </a:r>
+            <a:r>
+              <a:rPr lang="en-CA" sz="2000" dirty="0" err="1">
+                <a:solidFill>
+                  <a:schemeClr val="accent2">
+                    <a:lumMod val="75000"/>
+                  </a:schemeClr>
+                </a:solidFill>
+              </a:rPr>
+              <a:t>plateforme</a:t>
+            </a:r>
+            <a:r>
+              <a:rPr lang="en-CA" sz="2000" dirty="0">
+                <a:solidFill>
+                  <a:schemeClr val="accent2">
+                    <a:lumMod val="75000"/>
+                  </a:schemeClr>
+                </a:solidFill>
+              </a:rPr>
+              <a:t> </a:t>
+            </a:r>
+            <a:r>
+              <a:rPr lang="en-CA" sz="2000" u="sng" dirty="0">
+                <a:solidFill>
+                  <a:schemeClr val="accent2">
+                    <a:lumMod val="75000"/>
+                  </a:schemeClr>
+                </a:solidFill>
+                <a:hlinkClick r:id="rId7"/>
+              </a:rPr>
+              <a:t>https://labelbox.com/</a:t>
+            </a:r>
+            <a:endParaRPr lang="en-CA" sz="2000" dirty="0">
+              <a:solidFill>
+                <a:schemeClr val="accent2">
+                  <a:lumMod val="75000"/>
+                </a:schemeClr>
+              </a:solidFill>
+            </a:endParaRPr>
+          </a:p>
+          <a:p>
+            <a:pPr marL="342900" indent="-342900">
+              <a:buFont typeface="+mj-lt"/>
+              <a:buAutoNum type="arabicPeriod"/>
+            </a:pPr>
+            <a:r>
+              <a:rPr lang="en-CA" sz="2000" dirty="0"/>
+              <a:t>CVAT </a:t>
+            </a:r>
+            <a:r>
+              <a:rPr lang="en-CA" sz="2000" dirty="0" err="1"/>
+              <a:t>gratuit</a:t>
+            </a:r>
+            <a:r>
+              <a:rPr lang="en-CA" sz="2000" dirty="0"/>
+              <a:t> </a:t>
+            </a:r>
+            <a:r>
+              <a:rPr lang="en-CA" sz="2000" dirty="0" err="1"/>
+              <a:t>outil</a:t>
+            </a:r>
+            <a:r>
+              <a:rPr lang="en-CA" sz="2000" dirty="0"/>
+              <a:t> Intel </a:t>
+            </a:r>
+            <a:r>
+              <a:rPr lang="en-CA" sz="2000" u="sng" dirty="0">
+                <a:hlinkClick r:id="rId8"/>
+              </a:rPr>
+              <a:t>https://github.com/openvinotoolkit/cvat</a:t>
+            </a:r>
+            <a:endParaRPr lang="en-CA" sz="2000" dirty="0"/>
+          </a:p>
+          <a:p>
+            <a:pPr marL="342900" indent="-342900">
+              <a:buFont typeface="+mj-lt"/>
+              <a:buAutoNum type="arabicPeriod"/>
+            </a:pPr>
+            <a:r>
+              <a:rPr lang="en-CA" sz="2000" dirty="0">
+                <a:solidFill>
+                  <a:schemeClr val="accent2">
+                    <a:lumMod val="75000"/>
+                  </a:schemeClr>
+                </a:solidFill>
+              </a:rPr>
+              <a:t>Hasty.ai $ </a:t>
+            </a:r>
+            <a:r>
+              <a:rPr lang="en-CA" sz="2000" dirty="0" err="1">
+                <a:solidFill>
+                  <a:schemeClr val="accent2">
+                    <a:lumMod val="75000"/>
+                  </a:schemeClr>
+                </a:solidFill>
+              </a:rPr>
+              <a:t>plateforme</a:t>
+            </a:r>
+            <a:r>
+              <a:rPr lang="en-CA" sz="2000" dirty="0">
+                <a:solidFill>
+                  <a:schemeClr val="accent2">
+                    <a:lumMod val="75000"/>
+                  </a:schemeClr>
+                </a:solidFill>
+              </a:rPr>
+              <a:t> </a:t>
+            </a:r>
+            <a:r>
+              <a:rPr lang="en-CA" sz="2000" u="sng" dirty="0">
+                <a:solidFill>
+                  <a:schemeClr val="accent2">
+                    <a:lumMod val="75000"/>
+                  </a:schemeClr>
+                </a:solidFill>
+                <a:hlinkClick r:id="rId9"/>
+              </a:rPr>
+              <a:t>https://hasty.ai/</a:t>
+            </a:r>
+            <a:endParaRPr lang="en-CA" sz="2000" dirty="0">
+              <a:solidFill>
+                <a:schemeClr val="accent2">
+                  <a:lumMod val="75000"/>
+                </a:schemeClr>
+              </a:solidFill>
+            </a:endParaRPr>
+          </a:p>
+          <a:p>
+            <a:pPr marL="342900" indent="-342900">
+              <a:buFont typeface="+mj-lt"/>
+              <a:buAutoNum type="arabicPeriod"/>
+            </a:pPr>
+            <a:r>
+              <a:rPr lang="en-CA" sz="2000" dirty="0"/>
+              <a:t>AIDE Annotation Interface for Data-driven Ecology </a:t>
+            </a:r>
+            <a:r>
+              <a:rPr lang="en-CA" sz="2000" dirty="0" err="1"/>
+              <a:t>gratuit</a:t>
+            </a:r>
+            <a:r>
+              <a:rPr lang="en-CA" sz="2000" dirty="0"/>
+              <a:t> </a:t>
+            </a:r>
+            <a:r>
+              <a:rPr lang="en-CA" sz="2000" dirty="0" err="1"/>
+              <a:t>plateforme</a:t>
+            </a:r>
+            <a:r>
+              <a:rPr lang="en-CA" sz="2000" dirty="0"/>
+              <a:t> Microsoft </a:t>
+            </a:r>
+            <a:r>
+              <a:rPr lang="en-CA" sz="2000" u="sng" dirty="0">
+                <a:hlinkClick r:id="rId10"/>
+              </a:rPr>
+              <a:t>https://github.com/microsoft/aerial_wildlife_detection</a:t>
+            </a:r>
+            <a:endParaRPr lang="en-CA" sz="2000" dirty="0"/>
+          </a:p>
+          <a:p>
+            <a:pPr marL="342900" indent="-342900">
+              <a:buFont typeface="+mj-lt"/>
+              <a:buAutoNum type="arabicPeriod"/>
+            </a:pPr>
+            <a:r>
+              <a:rPr lang="en-CA" sz="2000" dirty="0"/>
+              <a:t>VIA VGG Image Annotator </a:t>
+            </a:r>
+            <a:r>
+              <a:rPr lang="en-CA" sz="2000" dirty="0" err="1"/>
+              <a:t>gratuit</a:t>
+            </a:r>
+            <a:r>
+              <a:rPr lang="en-CA" sz="2000" dirty="0"/>
+              <a:t> </a:t>
+            </a:r>
+            <a:r>
+              <a:rPr lang="en-CA" sz="2000" dirty="0" err="1"/>
+              <a:t>outil</a:t>
+            </a:r>
+            <a:r>
+              <a:rPr lang="en-CA" sz="2000" dirty="0"/>
+              <a:t> </a:t>
+            </a:r>
+            <a:r>
+              <a:rPr lang="en-CA" sz="2000" u="sng" dirty="0">
+                <a:hlinkClick r:id="rId11"/>
+              </a:rPr>
+              <a:t>https://www.robots.ox.ac.uk/~vgg/software/via/</a:t>
+            </a:r>
+            <a:endParaRPr lang="en-CA" sz="2000" dirty="0"/>
+          </a:p>
+          <a:p>
+            <a:pPr marL="342900" indent="-342900">
+              <a:buFont typeface="+mj-lt"/>
+              <a:buAutoNum type="arabicPeriod"/>
+            </a:pPr>
+            <a:r>
+              <a:rPr lang="en-CA" sz="2000" dirty="0" err="1"/>
+              <a:t>VoTT</a:t>
+            </a:r>
+            <a:r>
+              <a:rPr lang="en-CA" sz="2000" dirty="0"/>
+              <a:t> Visual Object Tagging Tool </a:t>
+            </a:r>
+            <a:r>
+              <a:rPr lang="en-CA" sz="2000" dirty="0" err="1"/>
+              <a:t>gratuit</a:t>
+            </a:r>
+            <a:r>
+              <a:rPr lang="en-CA" sz="2000" dirty="0"/>
+              <a:t> </a:t>
+            </a:r>
+            <a:r>
+              <a:rPr lang="en-CA" sz="2000" dirty="0" err="1"/>
+              <a:t>outil</a:t>
+            </a:r>
+            <a:r>
+              <a:rPr lang="en-CA" sz="2000" dirty="0"/>
+              <a:t> Microsoft </a:t>
+            </a:r>
+            <a:r>
+              <a:rPr lang="en-CA" sz="2000" u="sng" dirty="0">
+                <a:hlinkClick r:id="rId12"/>
+              </a:rPr>
+              <a:t>https://github.com/microsoft/VoTT</a:t>
+            </a:r>
+            <a:endParaRPr lang="en-CA" sz="2000" dirty="0"/>
+          </a:p>
+          <a:p>
+            <a:pPr marL="342900" indent="-342900">
+              <a:buFont typeface="+mj-lt"/>
+              <a:buAutoNum type="arabicPeriod"/>
+            </a:pPr>
+            <a:r>
+              <a:rPr lang="en-CA" sz="2000" dirty="0" err="1"/>
+              <a:t>Slava</a:t>
+            </a:r>
+            <a:r>
+              <a:rPr lang="en-CA" sz="2000" dirty="0"/>
+              <a:t> label-tool </a:t>
+            </a:r>
+            <a:r>
+              <a:rPr lang="en-CA" sz="2000" dirty="0" err="1"/>
+              <a:t>gratuit</a:t>
+            </a:r>
+            <a:r>
+              <a:rPr lang="en-CA" sz="2000" dirty="0"/>
+              <a:t> </a:t>
+            </a:r>
+            <a:r>
+              <a:rPr lang="en-CA" sz="2000" dirty="0" err="1"/>
+              <a:t>outil</a:t>
+            </a:r>
+            <a:r>
+              <a:rPr lang="en-CA" sz="2000" dirty="0"/>
+              <a:t> </a:t>
+            </a:r>
+            <a:r>
+              <a:rPr lang="en-CA" sz="2000" u="sng" dirty="0">
+                <a:hlinkClick r:id="rId13"/>
+              </a:rPr>
+              <a:t>https://github.com/Slava/label-tool</a:t>
+            </a:r>
+            <a:endParaRPr lang="en-CA" sz="2000" dirty="0"/>
+          </a:p>
+          <a:p>
+            <a:pPr marL="342900" indent="-342900">
+              <a:buFont typeface="+mj-lt"/>
+              <a:buAutoNum type="arabicPeriod"/>
+            </a:pPr>
+            <a:r>
+              <a:rPr lang="en-CA" sz="2000" dirty="0"/>
+              <a:t>semantic-segmentation-editor </a:t>
+            </a:r>
+            <a:r>
+              <a:rPr lang="en-CA" sz="2000" dirty="0" err="1"/>
+              <a:t>gratuit</a:t>
+            </a:r>
+            <a:r>
+              <a:rPr lang="en-CA" sz="2000" dirty="0"/>
+              <a:t> </a:t>
+            </a:r>
+            <a:r>
+              <a:rPr lang="en-CA" sz="2000" dirty="0" err="1"/>
+              <a:t>outil</a:t>
+            </a:r>
+            <a:r>
+              <a:rPr lang="en-CA" sz="2000" dirty="0"/>
+              <a:t> Hitachi </a:t>
+            </a:r>
+            <a:r>
+              <a:rPr lang="en-CA" sz="2000" dirty="0">
+                <a:hlinkClick r:id="rId14"/>
+              </a:rPr>
+              <a:t>https://github.com/Hitachi-Automotive-And-Industry-Lab/semantic-segmentation-editor</a:t>
+            </a:r>
+            <a:endParaRPr lang="en-CA" sz="2000" dirty="0"/>
+          </a:p>
+          <a:p>
+            <a:pPr marL="342900" indent="-342900">
+              <a:buFont typeface="+mj-lt"/>
+              <a:buAutoNum type="arabicPeriod"/>
+            </a:pPr>
+            <a:r>
+              <a:rPr lang="en-CA" sz="2000" dirty="0" err="1"/>
+              <a:t>labelme</a:t>
+            </a:r>
+            <a:r>
+              <a:rPr lang="en-CA" sz="2000" dirty="0"/>
+              <a:t> </a:t>
+            </a:r>
+            <a:r>
+              <a:rPr lang="en-CA" sz="2000" dirty="0">
+                <a:hlinkClick r:id="rId15"/>
+              </a:rPr>
+              <a:t>https://github.com/wkentaro/labelme</a:t>
+            </a:r>
+            <a:r>
+              <a:rPr lang="en-CA" sz="2000" dirty="0"/>
+              <a:t> </a:t>
+            </a:r>
+          </a:p>
+          <a:p>
+            <a:pPr marL="342900" indent="-342900">
+              <a:buFont typeface="+mj-lt"/>
+              <a:buAutoNum type="arabicPeriod"/>
+            </a:pPr>
+            <a:r>
+              <a:rPr lang="en-CA" sz="2000" dirty="0">
+                <a:solidFill>
+                  <a:schemeClr val="accent2">
+                    <a:lumMod val="75000"/>
+                  </a:schemeClr>
+                </a:solidFill>
+              </a:rPr>
+              <a:t>Playment.io $* </a:t>
+            </a:r>
+            <a:r>
+              <a:rPr lang="en-CA" sz="2000" dirty="0" err="1">
+                <a:solidFill>
+                  <a:schemeClr val="accent2">
+                    <a:lumMod val="75000"/>
+                  </a:schemeClr>
+                </a:solidFill>
+              </a:rPr>
+              <a:t>plateforme</a:t>
+            </a:r>
+            <a:r>
+              <a:rPr lang="en-CA" sz="2000" dirty="0">
+                <a:solidFill>
+                  <a:schemeClr val="accent2">
+                    <a:lumMod val="75000"/>
+                  </a:schemeClr>
+                </a:solidFill>
+              </a:rPr>
+              <a:t> </a:t>
+            </a:r>
+            <a:r>
+              <a:rPr lang="en-CA" sz="2000" u="sng" dirty="0">
+                <a:solidFill>
+                  <a:schemeClr val="accent2">
+                    <a:lumMod val="75000"/>
+                  </a:schemeClr>
+                </a:solidFill>
+                <a:hlinkClick r:id="rId16"/>
+              </a:rPr>
+              <a:t>https://playment.io/</a:t>
+            </a:r>
+            <a:endParaRPr lang="en-CA" sz="2000" dirty="0">
+              <a:solidFill>
+                <a:schemeClr val="accent2">
+                  <a:lumMod val="75000"/>
+                </a:schemeClr>
+              </a:solidFill>
+            </a:endParaRPr>
+          </a:p>
+          <a:p>
+            <a:pPr marL="342900" indent="-342900">
+              <a:buFont typeface="+mj-lt"/>
+              <a:buAutoNum type="arabicPeriod"/>
+            </a:pPr>
+            <a:r>
+              <a:rPr lang="en-CA" sz="2000" dirty="0" err="1">
+                <a:solidFill>
+                  <a:schemeClr val="accent2">
+                    <a:lumMod val="75000"/>
+                  </a:schemeClr>
+                </a:solidFill>
+              </a:rPr>
+              <a:t>Anolytics</a:t>
+            </a:r>
+            <a:r>
+              <a:rPr lang="en-CA" sz="2000" dirty="0">
+                <a:solidFill>
+                  <a:schemeClr val="accent2">
+                    <a:lumMod val="75000"/>
+                  </a:schemeClr>
+                </a:solidFill>
+              </a:rPr>
+              <a:t> outsource </a:t>
+            </a:r>
+            <a:r>
+              <a:rPr lang="en-CA" sz="2000" u="sng" dirty="0">
+                <a:solidFill>
+                  <a:schemeClr val="accent2">
+                    <a:lumMod val="75000"/>
+                  </a:schemeClr>
+                </a:solidFill>
+                <a:hlinkClick r:id="rId17"/>
+              </a:rPr>
+              <a:t>https://www.anolytics.ai/semantic-segmentation-services/</a:t>
+            </a:r>
+            <a:endParaRPr lang="en-CA" sz="2000" dirty="0">
+              <a:solidFill>
+                <a:schemeClr val="accent2">
+                  <a:lumMod val="75000"/>
+                </a:schemeClr>
+              </a:solidFill>
+            </a:endParaRPr>
+          </a:p>
+          <a:p>
+            <a:pPr marL="342900" indent="-342900">
+              <a:buFont typeface="+mj-lt"/>
+              <a:buAutoNum type="arabicPeriod"/>
+            </a:pPr>
+            <a:r>
+              <a:rPr lang="en-CA" sz="2000" dirty="0" err="1">
+                <a:solidFill>
+                  <a:schemeClr val="accent2">
+                    <a:lumMod val="75000"/>
+                  </a:schemeClr>
+                </a:solidFill>
+              </a:rPr>
+              <a:t>segments.ia</a:t>
+            </a:r>
+            <a:r>
+              <a:rPr lang="en-CA" sz="2000" dirty="0">
+                <a:solidFill>
+                  <a:schemeClr val="accent2">
+                    <a:lumMod val="75000"/>
+                  </a:schemeClr>
+                </a:solidFill>
+              </a:rPr>
+              <a:t> outsource </a:t>
+            </a:r>
+            <a:r>
+              <a:rPr lang="en-CA" sz="2000" u="sng" dirty="0">
+                <a:solidFill>
+                  <a:schemeClr val="accent2">
+                    <a:lumMod val="75000"/>
+                  </a:schemeClr>
+                </a:solidFill>
+                <a:hlinkClick r:id="rId18"/>
+              </a:rPr>
+              <a:t>https://segments.ai</a:t>
+            </a:r>
+            <a:endParaRPr lang="en-CA" sz="2000" dirty="0">
+              <a:solidFill>
+                <a:schemeClr val="accent2">
+                  <a:lumMod val="75000"/>
+                </a:schemeClr>
+              </a:solidFill>
+            </a:endParaRPr>
+          </a:p>
+          <a:p>
+            <a:pPr marL="342900" indent="-342900">
+              <a:buFont typeface="+mj-lt"/>
+              <a:buAutoNum type="arabicPeriod"/>
+            </a:pPr>
+            <a:r>
+              <a:rPr lang="en-CA" sz="2000" dirty="0" err="1">
+                <a:solidFill>
+                  <a:schemeClr val="accent2">
+                    <a:lumMod val="75000"/>
+                  </a:schemeClr>
+                </a:solidFill>
+              </a:rPr>
+              <a:t>Xyonix</a:t>
+            </a:r>
+            <a:r>
+              <a:rPr lang="en-CA" sz="2000" dirty="0">
+                <a:solidFill>
+                  <a:schemeClr val="accent2">
+                    <a:lumMod val="75000"/>
+                  </a:schemeClr>
+                </a:solidFill>
+              </a:rPr>
+              <a:t> outsource </a:t>
+            </a:r>
+            <a:r>
+              <a:rPr lang="en-CA" sz="2000" u="sng" dirty="0">
+                <a:solidFill>
+                  <a:schemeClr val="accent2">
+                    <a:lumMod val="75000"/>
+                  </a:schemeClr>
+                </a:solidFill>
+                <a:hlinkClick r:id="rId19"/>
+              </a:rPr>
+              <a:t>https://www.xyonix.com</a:t>
+            </a:r>
+            <a:endParaRPr lang="en-CA" sz="2000" dirty="0">
+              <a:solidFill>
+                <a:schemeClr val="accent2">
+                  <a:lumMod val="75000"/>
+                </a:schemeClr>
+              </a:solidFill>
+            </a:endParaRPr>
+          </a:p>
+          <a:p>
+            <a:pPr marL="342900" indent="-342900">
+              <a:buFont typeface="+mj-lt"/>
+              <a:buAutoNum type="arabicPeriod"/>
+            </a:pPr>
+            <a:r>
+              <a:rPr lang="en-CA" sz="2000" dirty="0" err="1"/>
+              <a:t>Scalabel</a:t>
+            </a:r>
+            <a:r>
+              <a:rPr lang="en-CA" sz="2000" dirty="0"/>
+              <a:t> </a:t>
+            </a:r>
+            <a:r>
+              <a:rPr lang="en-CA" sz="2000" dirty="0" err="1"/>
+              <a:t>gratuit</a:t>
+            </a:r>
+            <a:r>
+              <a:rPr lang="en-CA" sz="2000" dirty="0"/>
+              <a:t> </a:t>
+            </a:r>
+            <a:r>
+              <a:rPr lang="en-CA" sz="2000" dirty="0" err="1"/>
+              <a:t>plateforme</a:t>
+            </a:r>
+            <a:r>
+              <a:rPr lang="en-CA" sz="2000" dirty="0"/>
+              <a:t> </a:t>
+            </a:r>
+            <a:r>
+              <a:rPr lang="en-CA" sz="2000" u="sng" dirty="0">
+                <a:hlinkClick r:id="rId20"/>
+              </a:rPr>
+              <a:t>https://www.scalabel.ai/</a:t>
+            </a:r>
+            <a:endParaRPr lang="en-CA" sz="2000" dirty="0"/>
+          </a:p>
+          <a:p>
+            <a:pPr marL="342900" indent="-342900">
+              <a:buFont typeface="+mj-lt"/>
+              <a:buAutoNum type="arabicPeriod"/>
+            </a:pPr>
+            <a:r>
+              <a:rPr lang="en-CA" sz="2000" dirty="0" err="1"/>
+              <a:t>Heartex</a:t>
+            </a:r>
+            <a:r>
+              <a:rPr lang="en-CA" sz="2000" dirty="0"/>
+              <a:t> (Label Studio) </a:t>
+            </a:r>
+            <a:r>
+              <a:rPr lang="en-CA" sz="2000" dirty="0" err="1"/>
+              <a:t>gratuit</a:t>
+            </a:r>
+            <a:r>
+              <a:rPr lang="en-CA" sz="2000" dirty="0"/>
+              <a:t> </a:t>
+            </a:r>
+            <a:r>
+              <a:rPr lang="en-CA" sz="2000" dirty="0" err="1"/>
+              <a:t>outil</a:t>
+            </a:r>
+            <a:r>
+              <a:rPr lang="en-CA" sz="2000" dirty="0"/>
+              <a:t> </a:t>
+            </a:r>
+            <a:r>
+              <a:rPr lang="en-CA" sz="2000" u="sng" dirty="0">
+                <a:hlinkClick r:id="rId21"/>
+              </a:rPr>
+              <a:t>https://heartex.com/</a:t>
+            </a:r>
+            <a:endParaRPr lang="en-CA" sz="2000" u="sng" dirty="0"/>
+          </a:p>
+          <a:p>
+            <a:pPr marL="342900" indent="-342900">
+              <a:buFont typeface="+mj-lt"/>
+              <a:buAutoNum type="arabicPeriod"/>
+            </a:pPr>
+            <a:r>
+              <a:rPr lang="en-CA" sz="2000" dirty="0" err="1"/>
+              <a:t>DiscoBox</a:t>
+            </a:r>
+            <a:r>
+              <a:rPr lang="en-CA" sz="2000" dirty="0"/>
+              <a:t> DL Framework</a:t>
+            </a:r>
+            <a:r>
+              <a:rPr lang="en-CA" sz="2000" u="sng" dirty="0"/>
+              <a:t> </a:t>
+            </a:r>
+            <a:r>
+              <a:rPr lang="en-CA" sz="2000" u="sng" dirty="0">
+                <a:hlinkClick r:id="rId22"/>
+              </a:rPr>
+              <a:t>https://github.com/NVlabs/DiscoBox</a:t>
+            </a:r>
+            <a:r>
+              <a:rPr lang="en-CA" sz="2000" u="sng" dirty="0"/>
+              <a:t> </a:t>
+            </a:r>
+            <a:endParaRPr lang="en-CA" sz="2000" dirty="0"/>
+          </a:p>
+        </p:txBody>
+      </p:sp>
+      <p:sp>
+        <p:nvSpPr>
+          <p:cNvPr id="2" name="TextBox 1"/>
+          <p:cNvSpPr txBox="1"/>
+          <p:nvPr/>
+        </p:nvSpPr>
+        <p:spPr>
+          <a:xfrm>
+            <a:off x="8934275" y="5271669"/>
+            <a:ext cx="3003259" cy="923330"/>
+          </a:xfrm>
+          <a:prstGeom prst="rect">
+            <a:avLst/>
+          </a:prstGeom>
+          <a:ln>
+            <a:solidFill>
+              <a:srgbClr val="C00000"/>
+            </a:solidFill>
+          </a:ln>
+        </p:spPr>
+        <p:style>
+          <a:lnRef idx="2">
+            <a:schemeClr val="accent1"/>
+          </a:lnRef>
+          <a:fillRef idx="1">
+            <a:schemeClr val="lt1"/>
+          </a:fillRef>
+          <a:effectRef idx="0">
+            <a:schemeClr val="accent1"/>
+          </a:effectRef>
+          <a:fontRef idx="minor">
+            <a:schemeClr val="dk1"/>
+          </a:fontRef>
+        </p:style>
+        <p:txBody>
+          <a:bodyPr wrap="square" rtlCol="0">
+            <a:spAutoFit/>
+          </a:bodyPr>
+          <a:lstStyle/>
+          <a:p>
+            <a:r>
+              <a:rPr lang="fr-FR" dirty="0"/>
+              <a:t>+ SIG (</a:t>
+            </a:r>
+            <a:r>
+              <a:rPr lang="fr-FR" dirty="0" err="1"/>
+              <a:t>ArcGIS</a:t>
+            </a:r>
+            <a:r>
+              <a:rPr lang="fr-FR" dirty="0"/>
+              <a:t>, QGIS, </a:t>
+            </a:r>
+            <a:r>
+              <a:rPr lang="fr-FR" dirty="0" err="1"/>
+              <a:t>etc</a:t>
+            </a:r>
+            <a:r>
+              <a:rPr lang="fr-FR" dirty="0"/>
+              <a:t>)</a:t>
+            </a:r>
+          </a:p>
+          <a:p>
+            <a:r>
+              <a:rPr lang="fr-FR" dirty="0"/>
+              <a:t>+ </a:t>
+            </a:r>
+            <a:r>
+              <a:rPr lang="fr-FR" dirty="0" err="1"/>
+              <a:t>usual</a:t>
+            </a:r>
+            <a:r>
+              <a:rPr lang="fr-FR" dirty="0"/>
+              <a:t> image manipulation </a:t>
+            </a:r>
+            <a:r>
+              <a:rPr lang="fr-FR" dirty="0" err="1"/>
+              <a:t>tools</a:t>
+            </a:r>
+            <a:r>
+              <a:rPr lang="fr-FR" dirty="0"/>
+              <a:t> (</a:t>
+            </a:r>
+            <a:r>
+              <a:rPr lang="fr-FR" dirty="0" err="1"/>
+              <a:t>Gimp</a:t>
+            </a:r>
+            <a:r>
+              <a:rPr lang="fr-FR" dirty="0"/>
+              <a:t>, </a:t>
+            </a:r>
+            <a:r>
+              <a:rPr lang="fr-FR" dirty="0" err="1"/>
+              <a:t>etc</a:t>
+            </a:r>
+            <a:r>
+              <a:rPr lang="fr-FR" dirty="0"/>
+              <a:t>)</a:t>
+            </a:r>
+            <a:endParaRPr lang="en-CA" dirty="0"/>
+          </a:p>
+        </p:txBody>
+      </p:sp>
+    </p:spTree>
+    <p:extLst>
+      <p:ext uri="{BB962C8B-B14F-4D97-AF65-F5344CB8AC3E}">
+        <p14:creationId xmlns:p14="http://schemas.microsoft.com/office/powerpoint/2010/main" val="876564909"/>
+      </p:ext>
+    </p:extLst>
+  </p:cSld>
+  <p:clrMapOvr>
+    <a:masterClrMapping/>
+  </p:clrMapOvr>
 </p:sld>
 </file>
 
@@ -3686,43 +5431,7 @@
 </p:tagLst>
 </file>
 
-<file path=ppt/tags/tag15.xml><?xml version="1.0" encoding="utf-8"?>
-<p:tagLst xmlns:a="http://schemas.openxmlformats.org/drawingml/2006/main" xmlns:r="http://schemas.openxmlformats.org/officeDocument/2006/relationships" xmlns:p="http://schemas.openxmlformats.org/presentationml/2006/main">
-  <p:tag name="NUM" val="3"/>
-</p:tagLst>
-</file>
-
-<file path=ppt/tags/tag16.xml><?xml version="1.0" encoding="utf-8"?>
-<p:tagLst xmlns:a="http://schemas.openxmlformats.org/drawingml/2006/main" xmlns:r="http://schemas.openxmlformats.org/officeDocument/2006/relationships" xmlns:p="http://schemas.openxmlformats.org/presentationml/2006/main">
-  <p:tag name="NUM" val="4"/>
-</p:tagLst>
-</file>
-
-<file path=ppt/tags/tag17.xml><?xml version="1.0" encoding="utf-8"?>
-<p:tagLst xmlns:a="http://schemas.openxmlformats.org/drawingml/2006/main" xmlns:r="http://schemas.openxmlformats.org/officeDocument/2006/relationships" xmlns:p="http://schemas.openxmlformats.org/presentationml/2006/main">
-  <p:tag name="NUM" val="5"/>
-</p:tagLst>
-</file>
-
-<file path=ppt/tags/tag18.xml><?xml version="1.0" encoding="utf-8"?>
-<p:tagLst xmlns:a="http://schemas.openxmlformats.org/drawingml/2006/main" xmlns:r="http://schemas.openxmlformats.org/officeDocument/2006/relationships" xmlns:p="http://schemas.openxmlformats.org/presentationml/2006/main">
-  <p:tag name="NUM" val="6"/>
-</p:tagLst>
-</file>
-
-<file path=ppt/tags/tag19.xml><?xml version="1.0" encoding="utf-8"?>
-<p:tagLst xmlns:a="http://schemas.openxmlformats.org/drawingml/2006/main" xmlns:r="http://schemas.openxmlformats.org/officeDocument/2006/relationships" xmlns:p="http://schemas.openxmlformats.org/presentationml/2006/main">
-  <p:tag name="NUM" val="1"/>
-</p:tagLst>
-</file>
-
 <file path=ppt/tags/tag2.xml><?xml version="1.0" encoding="utf-8"?>
-<p:tagLst xmlns:a="http://schemas.openxmlformats.org/drawingml/2006/main" xmlns:r="http://schemas.openxmlformats.org/officeDocument/2006/relationships" xmlns:p="http://schemas.openxmlformats.org/presentationml/2006/main">
-  <p:tag name="NUM" val="2"/>
-</p:tagLst>
-</file>
-
-<file path=ppt/tags/tag20.xml><?xml version="1.0" encoding="utf-8"?>
 <p:tagLst xmlns:a="http://schemas.openxmlformats.org/drawingml/2006/main" xmlns:r="http://schemas.openxmlformats.org/officeDocument/2006/relationships" xmlns:p="http://schemas.openxmlformats.org/presentationml/2006/main">
   <p:tag name="NUM" val="2"/>
 </p:tagLst>

</xml_diff>